<commit_message>
update biblio and figures
</commit_message>
<xml_diff>
--- a/man/figures/schema_methods/schema_analysisv3.pptx
+++ b/man/figures/schema_methods/schema_analysisv3.pptx
@@ -2,7 +2,7 @@
 <file path=ppt/presentation.xml><?xml version="1.0" encoding="utf-8"?>
 <p:presentation xmlns:a="http://schemas.openxmlformats.org/drawingml/2006/main" xmlns:r="http://schemas.openxmlformats.org/officeDocument/2006/relationships" xmlns:p="http://schemas.openxmlformats.org/presentationml/2006/main" saveSubsetFonts="1" autoCompressPictures="0">
   <p:sldMasterIdLst>
-    <p:sldMasterId id="2147483648" r:id="rId1"/>
+    <p:sldMasterId id="2147483660" r:id="rId1"/>
   </p:sldMasterIdLst>
   <p:notesMasterIdLst>
     <p:notesMasterId r:id="rId3"/>
@@ -10,13 +10,13 @@
   <p:sldIdLst>
     <p:sldId id="260" r:id="rId2"/>
   </p:sldIdLst>
-  <p:sldSz cx="12192000" cy="6858000"/>
+  <p:sldSz cx="15119350" cy="10439400"/>
   <p:notesSz cx="6858000" cy="9144000"/>
   <p:defaultTextStyle>
     <a:defPPr>
-      <a:defRPr lang="es-ES"/>
+      <a:defRPr lang="en-US"/>
     </a:defPPr>
-    <a:lvl1pPr marL="0" algn="l" defTabSz="914400" rtl="0" eaLnBrk="1" latinLnBrk="0" hangingPunct="1">
+    <a:lvl1pPr marL="0" algn="l" defTabSz="457200" rtl="0" eaLnBrk="1" latinLnBrk="0" hangingPunct="1">
       <a:defRPr sz="1800" kern="1200">
         <a:solidFill>
           <a:schemeClr val="tx1"/>
@@ -26,7 +26,7 @@
         <a:cs typeface="+mn-cs"/>
       </a:defRPr>
     </a:lvl1pPr>
-    <a:lvl2pPr marL="457200" algn="l" defTabSz="914400" rtl="0" eaLnBrk="1" latinLnBrk="0" hangingPunct="1">
+    <a:lvl2pPr marL="457200" algn="l" defTabSz="457200" rtl="0" eaLnBrk="1" latinLnBrk="0" hangingPunct="1">
       <a:defRPr sz="1800" kern="1200">
         <a:solidFill>
           <a:schemeClr val="tx1"/>
@@ -36,7 +36,7 @@
         <a:cs typeface="+mn-cs"/>
       </a:defRPr>
     </a:lvl2pPr>
-    <a:lvl3pPr marL="914400" algn="l" defTabSz="914400" rtl="0" eaLnBrk="1" latinLnBrk="0" hangingPunct="1">
+    <a:lvl3pPr marL="914400" algn="l" defTabSz="457200" rtl="0" eaLnBrk="1" latinLnBrk="0" hangingPunct="1">
       <a:defRPr sz="1800" kern="1200">
         <a:solidFill>
           <a:schemeClr val="tx1"/>
@@ -46,7 +46,7 @@
         <a:cs typeface="+mn-cs"/>
       </a:defRPr>
     </a:lvl3pPr>
-    <a:lvl4pPr marL="1371600" algn="l" defTabSz="914400" rtl="0" eaLnBrk="1" latinLnBrk="0" hangingPunct="1">
+    <a:lvl4pPr marL="1371600" algn="l" defTabSz="457200" rtl="0" eaLnBrk="1" latinLnBrk="0" hangingPunct="1">
       <a:defRPr sz="1800" kern="1200">
         <a:solidFill>
           <a:schemeClr val="tx1"/>
@@ -56,7 +56,7 @@
         <a:cs typeface="+mn-cs"/>
       </a:defRPr>
     </a:lvl4pPr>
-    <a:lvl5pPr marL="1828800" algn="l" defTabSz="914400" rtl="0" eaLnBrk="1" latinLnBrk="0" hangingPunct="1">
+    <a:lvl5pPr marL="1828800" algn="l" defTabSz="457200" rtl="0" eaLnBrk="1" latinLnBrk="0" hangingPunct="1">
       <a:defRPr sz="1800" kern="1200">
         <a:solidFill>
           <a:schemeClr val="tx1"/>
@@ -66,7 +66,7 @@
         <a:cs typeface="+mn-cs"/>
       </a:defRPr>
     </a:lvl5pPr>
-    <a:lvl6pPr marL="2286000" algn="l" defTabSz="914400" rtl="0" eaLnBrk="1" latinLnBrk="0" hangingPunct="1">
+    <a:lvl6pPr marL="2286000" algn="l" defTabSz="457200" rtl="0" eaLnBrk="1" latinLnBrk="0" hangingPunct="1">
       <a:defRPr sz="1800" kern="1200">
         <a:solidFill>
           <a:schemeClr val="tx1"/>
@@ -76,7 +76,7 @@
         <a:cs typeface="+mn-cs"/>
       </a:defRPr>
     </a:lvl6pPr>
-    <a:lvl7pPr marL="2743200" algn="l" defTabSz="914400" rtl="0" eaLnBrk="1" latinLnBrk="0" hangingPunct="1">
+    <a:lvl7pPr marL="2743200" algn="l" defTabSz="457200" rtl="0" eaLnBrk="1" latinLnBrk="0" hangingPunct="1">
       <a:defRPr sz="1800" kern="1200">
         <a:solidFill>
           <a:schemeClr val="tx1"/>
@@ -86,7 +86,7 @@
         <a:cs typeface="+mn-cs"/>
       </a:defRPr>
     </a:lvl7pPr>
-    <a:lvl8pPr marL="3200400" algn="l" defTabSz="914400" rtl="0" eaLnBrk="1" latinLnBrk="0" hangingPunct="1">
+    <a:lvl8pPr marL="3200400" algn="l" defTabSz="457200" rtl="0" eaLnBrk="1" latinLnBrk="0" hangingPunct="1">
       <a:defRPr sz="1800" kern="1200">
         <a:solidFill>
           <a:schemeClr val="tx1"/>
@@ -96,7 +96,7 @@
         <a:cs typeface="+mn-cs"/>
       </a:defRPr>
     </a:lvl8pPr>
-    <a:lvl9pPr marL="3657600" algn="l" defTabSz="914400" rtl="0" eaLnBrk="1" latinLnBrk="0" hangingPunct="1">
+    <a:lvl9pPr marL="3657600" algn="l" defTabSz="457200" rtl="0" eaLnBrk="1" latinLnBrk="0" hangingPunct="1">
       <a:defRPr sz="1800" kern="1200">
         <a:solidFill>
           <a:schemeClr val="tx1"/>
@@ -200,7 +200,7 @@
           <a:p>
             <a:fld id="{5D2DF749-CBA2-004B-B989-979A45ECFC58}" type="datetimeFigureOut">
               <a:rPr lang="es-ES" smtClean="0"/>
-              <a:t>10/6/20</a:t>
+              <a:t>12/6/20</a:t>
             </a:fld>
             <a:endParaRPr lang="es-ES"/>
           </a:p>
@@ -218,8 +218,8 @@
         </p:nvSpPr>
         <p:spPr>
           <a:xfrm>
-            <a:off x="685800" y="1143000"/>
-            <a:ext cx="5486400" cy="3086100"/>
+            <a:off x="1193800" y="1143000"/>
+            <a:ext cx="4470400" cy="3086100"/>
           </a:xfrm>
           <a:prstGeom prst="rect">
             <a:avLst/>
@@ -374,8 +374,8 @@
   </p:cSld>
   <p:clrMap bg1="lt1" tx1="dk1" bg2="lt2" tx2="dk2" accent1="accent1" accent2="accent2" accent3="accent3" accent4="accent4" accent5="accent5" accent6="accent6" hlink="hlink" folHlink="folHlink"/>
   <p:notesStyle>
-    <a:lvl1pPr marL="0" algn="l" defTabSz="914400" rtl="0" eaLnBrk="1" latinLnBrk="0" hangingPunct="1">
-      <a:defRPr sz="1200" kern="1200">
+    <a:lvl1pPr marL="0" algn="l" defTabSz="1226759" rtl="0" eaLnBrk="1" latinLnBrk="0" hangingPunct="1">
+      <a:defRPr sz="1610" kern="1200">
         <a:solidFill>
           <a:schemeClr val="tx1"/>
         </a:solidFill>
@@ -384,8 +384,8 @@
         <a:cs typeface="+mn-cs"/>
       </a:defRPr>
     </a:lvl1pPr>
-    <a:lvl2pPr marL="457200" algn="l" defTabSz="914400" rtl="0" eaLnBrk="1" latinLnBrk="0" hangingPunct="1">
-      <a:defRPr sz="1200" kern="1200">
+    <a:lvl2pPr marL="613380" algn="l" defTabSz="1226759" rtl="0" eaLnBrk="1" latinLnBrk="0" hangingPunct="1">
+      <a:defRPr sz="1610" kern="1200">
         <a:solidFill>
           <a:schemeClr val="tx1"/>
         </a:solidFill>
@@ -394,8 +394,8 @@
         <a:cs typeface="+mn-cs"/>
       </a:defRPr>
     </a:lvl2pPr>
-    <a:lvl3pPr marL="914400" algn="l" defTabSz="914400" rtl="0" eaLnBrk="1" latinLnBrk="0" hangingPunct="1">
-      <a:defRPr sz="1200" kern="1200">
+    <a:lvl3pPr marL="1226759" algn="l" defTabSz="1226759" rtl="0" eaLnBrk="1" latinLnBrk="0" hangingPunct="1">
+      <a:defRPr sz="1610" kern="1200">
         <a:solidFill>
           <a:schemeClr val="tx1"/>
         </a:solidFill>
@@ -404,8 +404,8 @@
         <a:cs typeface="+mn-cs"/>
       </a:defRPr>
     </a:lvl3pPr>
-    <a:lvl4pPr marL="1371600" algn="l" defTabSz="914400" rtl="0" eaLnBrk="1" latinLnBrk="0" hangingPunct="1">
-      <a:defRPr sz="1200" kern="1200">
+    <a:lvl4pPr marL="1840139" algn="l" defTabSz="1226759" rtl="0" eaLnBrk="1" latinLnBrk="0" hangingPunct="1">
+      <a:defRPr sz="1610" kern="1200">
         <a:solidFill>
           <a:schemeClr val="tx1"/>
         </a:solidFill>
@@ -414,8 +414,8 @@
         <a:cs typeface="+mn-cs"/>
       </a:defRPr>
     </a:lvl4pPr>
-    <a:lvl5pPr marL="1828800" algn="l" defTabSz="914400" rtl="0" eaLnBrk="1" latinLnBrk="0" hangingPunct="1">
-      <a:defRPr sz="1200" kern="1200">
+    <a:lvl5pPr marL="2453518" algn="l" defTabSz="1226759" rtl="0" eaLnBrk="1" latinLnBrk="0" hangingPunct="1">
+      <a:defRPr sz="1610" kern="1200">
         <a:solidFill>
           <a:schemeClr val="tx1"/>
         </a:solidFill>
@@ -424,8 +424,8 @@
         <a:cs typeface="+mn-cs"/>
       </a:defRPr>
     </a:lvl5pPr>
-    <a:lvl6pPr marL="2286000" algn="l" defTabSz="914400" rtl="0" eaLnBrk="1" latinLnBrk="0" hangingPunct="1">
-      <a:defRPr sz="1200" kern="1200">
+    <a:lvl6pPr marL="3066898" algn="l" defTabSz="1226759" rtl="0" eaLnBrk="1" latinLnBrk="0" hangingPunct="1">
+      <a:defRPr sz="1610" kern="1200">
         <a:solidFill>
           <a:schemeClr val="tx1"/>
         </a:solidFill>
@@ -434,8 +434,8 @@
         <a:cs typeface="+mn-cs"/>
       </a:defRPr>
     </a:lvl6pPr>
-    <a:lvl7pPr marL="2743200" algn="l" defTabSz="914400" rtl="0" eaLnBrk="1" latinLnBrk="0" hangingPunct="1">
-      <a:defRPr sz="1200" kern="1200">
+    <a:lvl7pPr marL="3680277" algn="l" defTabSz="1226759" rtl="0" eaLnBrk="1" latinLnBrk="0" hangingPunct="1">
+      <a:defRPr sz="1610" kern="1200">
         <a:solidFill>
           <a:schemeClr val="tx1"/>
         </a:solidFill>
@@ -444,8 +444,8 @@
         <a:cs typeface="+mn-cs"/>
       </a:defRPr>
     </a:lvl7pPr>
-    <a:lvl8pPr marL="3200400" algn="l" defTabSz="914400" rtl="0" eaLnBrk="1" latinLnBrk="0" hangingPunct="1">
-      <a:defRPr sz="1200" kern="1200">
+    <a:lvl8pPr marL="4293657" algn="l" defTabSz="1226759" rtl="0" eaLnBrk="1" latinLnBrk="0" hangingPunct="1">
+      <a:defRPr sz="1610" kern="1200">
         <a:solidFill>
           <a:schemeClr val="tx1"/>
         </a:solidFill>
@@ -454,8 +454,8 @@
         <a:cs typeface="+mn-cs"/>
       </a:defRPr>
     </a:lvl8pPr>
-    <a:lvl9pPr marL="3657600" algn="l" defTabSz="914400" rtl="0" eaLnBrk="1" latinLnBrk="0" hangingPunct="1">
-      <a:defRPr sz="1200" kern="1200">
+    <a:lvl9pPr marL="4907036" algn="l" defTabSz="1226759" rtl="0" eaLnBrk="1" latinLnBrk="0" hangingPunct="1">
+      <a:defRPr sz="1610" kern="1200">
         <a:solidFill>
           <a:schemeClr val="tx1"/>
         </a:solidFill>
@@ -495,24 +495,29 @@
             <p:ph type="sldImg"/>
           </p:nvPr>
         </p:nvSpPr>
+        <p:spPr>
+          <a:xfrm>
+            <a:off x="1193800" y="1143000"/>
+            <a:ext cx="4470400" cy="3086100"/>
+          </a:xfrm>
+        </p:spPr>
+      </p:sp>
+      <p:sp>
+        <p:nvSpPr>
+          <p:cNvPr id="3" name="Notes Placeholder 2"/>
+          <p:cNvSpPr>
+            <a:spLocks noGrp="1"/>
+          </p:cNvSpPr>
+          <p:nvPr>
+            <p:ph type="body" idx="1"/>
+          </p:nvPr>
+        </p:nvSpPr>
         <p:spPr/>
-      </p:sp>
-      <p:sp>
-        <p:nvSpPr>
-          <p:cNvPr id="3" name="Notes Placeholder 2"/>
-          <p:cNvSpPr>
-            <a:spLocks noGrp="1"/>
-          </p:cNvSpPr>
-          <p:nvPr>
-            <p:ph type="body" idx="1"/>
-          </p:nvPr>
-        </p:nvSpPr>
-        <p:spPr/>
         <p:txBody>
           <a:bodyPr/>
           <a:lstStyle/>
           <a:p>
-            <a:endParaRPr lang="es-ES"/>
+            <a:endParaRPr lang="es-ES" dirty="0"/>
           </a:p>
         </p:txBody>
       </p:sp>
@@ -571,13 +576,7 @@
       </p:grpSpPr>
       <p:sp>
         <p:nvSpPr>
-          <p:cNvPr id="2" name="Title 1">
-            <a:extLst>
-              <a:ext uri="{FF2B5EF4-FFF2-40B4-BE49-F238E27FC236}">
-                <a16:creationId xmlns:a16="http://schemas.microsoft.com/office/drawing/2014/main" id="{376BF6E6-717D-E64E-A287-492F8A059F8A}"/>
-              </a:ext>
-            </a:extLst>
-          </p:cNvPr>
+          <p:cNvPr id="2" name="Title 1"/>
           <p:cNvSpPr>
             <a:spLocks noGrp="1"/>
           </p:cNvSpPr>
@@ -587,15 +586,15 @@
         </p:nvSpPr>
         <p:spPr>
           <a:xfrm>
-            <a:off x="1524000" y="1122363"/>
-            <a:ext cx="9144000" cy="2387600"/>
+            <a:off x="1133951" y="1708486"/>
+            <a:ext cx="12851448" cy="3634458"/>
           </a:xfrm>
         </p:spPr>
         <p:txBody>
           <a:bodyPr anchor="b"/>
           <a:lstStyle>
             <a:lvl1pPr algn="ctr">
-              <a:defRPr sz="6000"/>
+              <a:defRPr sz="9133"/>
             </a:lvl1pPr>
           </a:lstStyle>
           <a:p>
@@ -603,19 +602,13 @@
               <a:rPr lang="en-GB"/>
               <a:t>Click to edit Master title style</a:t>
             </a:r>
-            <a:endParaRPr lang="es-ES"/>
-          </a:p>
-        </p:txBody>
-      </p:sp>
-      <p:sp>
-        <p:nvSpPr>
-          <p:cNvPr id="3" name="Subtitle 2">
-            <a:extLst>
-              <a:ext uri="{FF2B5EF4-FFF2-40B4-BE49-F238E27FC236}">
-                <a16:creationId xmlns:a16="http://schemas.microsoft.com/office/drawing/2014/main" id="{83E454C9-B4D4-8E49-8E25-2940640B8CC3}"/>
-              </a:ext>
-            </a:extLst>
-          </p:cNvPr>
+            <a:endParaRPr lang="en-US" dirty="0"/>
+          </a:p>
+        </p:txBody>
+      </p:sp>
+      <p:sp>
+        <p:nvSpPr>
+          <p:cNvPr id="3" name="Subtitle 2"/>
           <p:cNvSpPr>
             <a:spLocks noGrp="1"/>
           </p:cNvSpPr>
@@ -625,8 +618,8 @@
         </p:nvSpPr>
         <p:spPr>
           <a:xfrm>
-            <a:off x="1524000" y="3602038"/>
-            <a:ext cx="9144000" cy="1655762"/>
+            <a:off x="1889919" y="5483102"/>
+            <a:ext cx="11339513" cy="2520438"/>
           </a:xfrm>
         </p:spPr>
         <p:txBody>
@@ -634,39 +627,39 @@
           <a:lstStyle>
             <a:lvl1pPr marL="0" indent="0" algn="ctr">
               <a:buNone/>
-              <a:defRPr sz="2400"/>
+              <a:defRPr sz="3653"/>
             </a:lvl1pPr>
-            <a:lvl2pPr marL="457200" indent="0" algn="ctr">
+            <a:lvl2pPr marL="695950" indent="0" algn="ctr">
               <a:buNone/>
-              <a:defRPr sz="2000"/>
+              <a:defRPr sz="3044"/>
             </a:lvl2pPr>
-            <a:lvl3pPr marL="914400" indent="0" algn="ctr">
+            <a:lvl3pPr marL="1391900" indent="0" algn="ctr">
               <a:buNone/>
-              <a:defRPr sz="1800"/>
+              <a:defRPr sz="2740"/>
             </a:lvl3pPr>
-            <a:lvl4pPr marL="1371600" indent="0" algn="ctr">
+            <a:lvl4pPr marL="2087850" indent="0" algn="ctr">
               <a:buNone/>
-              <a:defRPr sz="1600"/>
+              <a:defRPr sz="2436"/>
             </a:lvl4pPr>
-            <a:lvl5pPr marL="1828800" indent="0" algn="ctr">
+            <a:lvl5pPr marL="2783799" indent="0" algn="ctr">
               <a:buNone/>
-              <a:defRPr sz="1600"/>
+              <a:defRPr sz="2436"/>
             </a:lvl5pPr>
-            <a:lvl6pPr marL="2286000" indent="0" algn="ctr">
+            <a:lvl6pPr marL="3479749" indent="0" algn="ctr">
               <a:buNone/>
-              <a:defRPr sz="1600"/>
+              <a:defRPr sz="2436"/>
             </a:lvl6pPr>
-            <a:lvl7pPr marL="2743200" indent="0" algn="ctr">
+            <a:lvl7pPr marL="4175699" indent="0" algn="ctr">
               <a:buNone/>
-              <a:defRPr sz="1600"/>
+              <a:defRPr sz="2436"/>
             </a:lvl7pPr>
-            <a:lvl8pPr marL="3200400" indent="0" algn="ctr">
+            <a:lvl8pPr marL="4871649" indent="0" algn="ctr">
               <a:buNone/>
-              <a:defRPr sz="1600"/>
+              <a:defRPr sz="2436"/>
             </a:lvl8pPr>
-            <a:lvl9pPr marL="3657600" indent="0" algn="ctr">
+            <a:lvl9pPr marL="5567599" indent="0" algn="ctr">
               <a:buNone/>
-              <a:defRPr sz="1600"/>
+              <a:defRPr sz="2436"/>
             </a:lvl9pPr>
           </a:lstStyle>
           <a:p>
@@ -674,19 +667,13 @@
               <a:rPr lang="en-GB"/>
               <a:t>Click to edit Master subtitle style</a:t>
             </a:r>
-            <a:endParaRPr lang="es-ES"/>
-          </a:p>
-        </p:txBody>
-      </p:sp>
-      <p:sp>
-        <p:nvSpPr>
-          <p:cNvPr id="4" name="Date Placeholder 3">
-            <a:extLst>
-              <a:ext uri="{FF2B5EF4-FFF2-40B4-BE49-F238E27FC236}">
-                <a16:creationId xmlns:a16="http://schemas.microsoft.com/office/drawing/2014/main" id="{DA084E69-C098-AB4A-8C14-05873E517B8E}"/>
-              </a:ext>
-            </a:extLst>
-          </p:cNvPr>
+            <a:endParaRPr lang="en-US" dirty="0"/>
+          </a:p>
+        </p:txBody>
+      </p:sp>
+      <p:sp>
+        <p:nvSpPr>
+          <p:cNvPr id="4" name="Date Placeholder 3"/>
           <p:cNvSpPr>
             <a:spLocks noGrp="1"/>
           </p:cNvSpPr>
@@ -701,7 +688,7 @@
           <a:p>
             <a:fld id="{F2878C72-540D-B747-AB9D-A738C0927A38}" type="datetimeFigureOut">
               <a:rPr lang="es-ES" smtClean="0"/>
-              <a:t>10/6/20</a:t>
+              <a:t>12/6/20</a:t>
             </a:fld>
             <a:endParaRPr lang="es-ES"/>
           </a:p>
@@ -709,13 +696,7 @@
       </p:sp>
       <p:sp>
         <p:nvSpPr>
-          <p:cNvPr id="5" name="Footer Placeholder 4">
-            <a:extLst>
-              <a:ext uri="{FF2B5EF4-FFF2-40B4-BE49-F238E27FC236}">
-                <a16:creationId xmlns:a16="http://schemas.microsoft.com/office/drawing/2014/main" id="{8EA25506-3B06-164F-8CBF-898B77D20568}"/>
-              </a:ext>
-            </a:extLst>
-          </p:cNvPr>
+          <p:cNvPr id="5" name="Footer Placeholder 4"/>
           <p:cNvSpPr>
             <a:spLocks noGrp="1"/>
           </p:cNvSpPr>
@@ -734,13 +715,7 @@
       </p:sp>
       <p:sp>
         <p:nvSpPr>
-          <p:cNvPr id="6" name="Slide Number Placeholder 5">
-            <a:extLst>
-              <a:ext uri="{FF2B5EF4-FFF2-40B4-BE49-F238E27FC236}">
-                <a16:creationId xmlns:a16="http://schemas.microsoft.com/office/drawing/2014/main" id="{A87E9645-9EA5-2542-B3B2-CD679F912E21}"/>
-              </a:ext>
-            </a:extLst>
-          </p:cNvPr>
+          <p:cNvPr id="6" name="Slide Number Placeholder 5"/>
           <p:cNvSpPr>
             <a:spLocks noGrp="1"/>
           </p:cNvSpPr>
@@ -764,7 +739,7 @@
     </p:spTree>
     <p:extLst>
       <p:ext uri="{BB962C8B-B14F-4D97-AF65-F5344CB8AC3E}">
-        <p14:creationId xmlns:p14="http://schemas.microsoft.com/office/powerpoint/2010/main" val="3132727890"/>
+        <p14:creationId xmlns:p14="http://schemas.microsoft.com/office/powerpoint/2010/main" val="2811628351"/>
       </p:ext>
     </p:extLst>
   </p:cSld>
@@ -793,13 +768,7 @@
       </p:grpSpPr>
       <p:sp>
         <p:nvSpPr>
-          <p:cNvPr id="2" name="Title 1">
-            <a:extLst>
-              <a:ext uri="{FF2B5EF4-FFF2-40B4-BE49-F238E27FC236}">
-                <a16:creationId xmlns:a16="http://schemas.microsoft.com/office/drawing/2014/main" id="{17BDE7F3-B3E5-EF4D-8962-7217C5612995}"/>
-              </a:ext>
-            </a:extLst>
-          </p:cNvPr>
+          <p:cNvPr id="2" name="Title 1"/>
           <p:cNvSpPr>
             <a:spLocks noGrp="1"/>
           </p:cNvSpPr>
@@ -816,19 +785,13 @@
               <a:rPr lang="en-GB"/>
               <a:t>Click to edit Master title style</a:t>
             </a:r>
-            <a:endParaRPr lang="es-ES"/>
-          </a:p>
-        </p:txBody>
-      </p:sp>
-      <p:sp>
-        <p:nvSpPr>
-          <p:cNvPr id="3" name="Vertical Text Placeholder 2">
-            <a:extLst>
-              <a:ext uri="{FF2B5EF4-FFF2-40B4-BE49-F238E27FC236}">
-                <a16:creationId xmlns:a16="http://schemas.microsoft.com/office/drawing/2014/main" id="{A3184DAD-6317-D049-AF9C-4EC632694AAA}"/>
-              </a:ext>
-            </a:extLst>
-          </p:cNvPr>
+            <a:endParaRPr lang="en-US" dirty="0"/>
+          </a:p>
+        </p:txBody>
+      </p:sp>
+      <p:sp>
+        <p:nvSpPr>
+          <p:cNvPr id="3" name="Vertical Text Placeholder 2"/>
           <p:cNvSpPr>
             <a:spLocks noGrp="1"/>
           </p:cNvSpPr>
@@ -874,19 +837,13 @@
               <a:rPr lang="en-GB"/>
               <a:t>Fifth level</a:t>
             </a:r>
-            <a:endParaRPr lang="es-ES"/>
-          </a:p>
-        </p:txBody>
-      </p:sp>
-      <p:sp>
-        <p:nvSpPr>
-          <p:cNvPr id="4" name="Date Placeholder 3">
-            <a:extLst>
-              <a:ext uri="{FF2B5EF4-FFF2-40B4-BE49-F238E27FC236}">
-                <a16:creationId xmlns:a16="http://schemas.microsoft.com/office/drawing/2014/main" id="{CCE96985-35B5-FA4D-9B0E-84862EB66209}"/>
-              </a:ext>
-            </a:extLst>
-          </p:cNvPr>
+            <a:endParaRPr lang="en-US" dirty="0"/>
+          </a:p>
+        </p:txBody>
+      </p:sp>
+      <p:sp>
+        <p:nvSpPr>
+          <p:cNvPr id="4" name="Date Placeholder 3"/>
           <p:cNvSpPr>
             <a:spLocks noGrp="1"/>
           </p:cNvSpPr>
@@ -901,7 +858,7 @@
           <a:p>
             <a:fld id="{F2878C72-540D-B747-AB9D-A738C0927A38}" type="datetimeFigureOut">
               <a:rPr lang="es-ES" smtClean="0"/>
-              <a:t>10/6/20</a:t>
+              <a:t>12/6/20</a:t>
             </a:fld>
             <a:endParaRPr lang="es-ES"/>
           </a:p>
@@ -909,13 +866,7 @@
       </p:sp>
       <p:sp>
         <p:nvSpPr>
-          <p:cNvPr id="5" name="Footer Placeholder 4">
-            <a:extLst>
-              <a:ext uri="{FF2B5EF4-FFF2-40B4-BE49-F238E27FC236}">
-                <a16:creationId xmlns:a16="http://schemas.microsoft.com/office/drawing/2014/main" id="{23F776A0-34E4-3D45-AC53-E5BCF9AE3EDE}"/>
-              </a:ext>
-            </a:extLst>
-          </p:cNvPr>
+          <p:cNvPr id="5" name="Footer Placeholder 4"/>
           <p:cNvSpPr>
             <a:spLocks noGrp="1"/>
           </p:cNvSpPr>
@@ -934,13 +885,7 @@
       </p:sp>
       <p:sp>
         <p:nvSpPr>
-          <p:cNvPr id="6" name="Slide Number Placeholder 5">
-            <a:extLst>
-              <a:ext uri="{FF2B5EF4-FFF2-40B4-BE49-F238E27FC236}">
-                <a16:creationId xmlns:a16="http://schemas.microsoft.com/office/drawing/2014/main" id="{0239F51B-8D1A-2A4F-B8CA-66AA198CD5F4}"/>
-              </a:ext>
-            </a:extLst>
-          </p:cNvPr>
+          <p:cNvPr id="6" name="Slide Number Placeholder 5"/>
           <p:cNvSpPr>
             <a:spLocks noGrp="1"/>
           </p:cNvSpPr>
@@ -964,7 +909,7 @@
     </p:spTree>
     <p:extLst>
       <p:ext uri="{BB962C8B-B14F-4D97-AF65-F5344CB8AC3E}">
-        <p14:creationId xmlns:p14="http://schemas.microsoft.com/office/powerpoint/2010/main" val="539544056"/>
+        <p14:creationId xmlns:p14="http://schemas.microsoft.com/office/powerpoint/2010/main" val="4027747014"/>
       </p:ext>
     </p:extLst>
   </p:cSld>
@@ -993,13 +938,7 @@
       </p:grpSpPr>
       <p:sp>
         <p:nvSpPr>
-          <p:cNvPr id="2" name="Vertical Title 1">
-            <a:extLst>
-              <a:ext uri="{FF2B5EF4-FFF2-40B4-BE49-F238E27FC236}">
-                <a16:creationId xmlns:a16="http://schemas.microsoft.com/office/drawing/2014/main" id="{53DAB7A8-E195-3240-A304-CC24F17C2888}"/>
-              </a:ext>
-            </a:extLst>
-          </p:cNvPr>
+          <p:cNvPr id="2" name="Vertical Title 1"/>
           <p:cNvSpPr>
             <a:spLocks noGrp="1"/>
           </p:cNvSpPr>
@@ -1009,8 +948,8 @@
         </p:nvSpPr>
         <p:spPr>
           <a:xfrm>
-            <a:off x="8724900" y="365125"/>
-            <a:ext cx="2628900" cy="5811838"/>
+            <a:off x="10819786" y="555801"/>
+            <a:ext cx="3260110" cy="8846909"/>
           </a:xfrm>
         </p:spPr>
         <p:txBody>
@@ -1021,19 +960,13 @@
               <a:rPr lang="en-GB"/>
               <a:t>Click to edit Master title style</a:t>
             </a:r>
-            <a:endParaRPr lang="es-ES"/>
-          </a:p>
-        </p:txBody>
-      </p:sp>
-      <p:sp>
-        <p:nvSpPr>
-          <p:cNvPr id="3" name="Vertical Text Placeholder 2">
-            <a:extLst>
-              <a:ext uri="{FF2B5EF4-FFF2-40B4-BE49-F238E27FC236}">
-                <a16:creationId xmlns:a16="http://schemas.microsoft.com/office/drawing/2014/main" id="{DD21666E-3825-0C47-8CD6-9D47E8247F31}"/>
-              </a:ext>
-            </a:extLst>
-          </p:cNvPr>
+            <a:endParaRPr lang="en-US" dirty="0"/>
+          </a:p>
+        </p:txBody>
+      </p:sp>
+      <p:sp>
+        <p:nvSpPr>
+          <p:cNvPr id="3" name="Vertical Text Placeholder 2"/>
           <p:cNvSpPr>
             <a:spLocks noGrp="1"/>
           </p:cNvSpPr>
@@ -1043,8 +976,8 @@
         </p:nvSpPr>
         <p:spPr>
           <a:xfrm>
-            <a:off x="838200" y="365125"/>
-            <a:ext cx="7734300" cy="5811838"/>
+            <a:off x="1039456" y="555801"/>
+            <a:ext cx="9591338" cy="8846909"/>
           </a:xfrm>
         </p:spPr>
         <p:txBody>
@@ -1084,19 +1017,13 @@
               <a:rPr lang="en-GB"/>
               <a:t>Fifth level</a:t>
             </a:r>
-            <a:endParaRPr lang="es-ES"/>
-          </a:p>
-        </p:txBody>
-      </p:sp>
-      <p:sp>
-        <p:nvSpPr>
-          <p:cNvPr id="4" name="Date Placeholder 3">
-            <a:extLst>
-              <a:ext uri="{FF2B5EF4-FFF2-40B4-BE49-F238E27FC236}">
-                <a16:creationId xmlns:a16="http://schemas.microsoft.com/office/drawing/2014/main" id="{8FF8ED91-2BB8-424C-9E2C-7C6409628C2E}"/>
-              </a:ext>
-            </a:extLst>
-          </p:cNvPr>
+            <a:endParaRPr lang="en-US" dirty="0"/>
+          </a:p>
+        </p:txBody>
+      </p:sp>
+      <p:sp>
+        <p:nvSpPr>
+          <p:cNvPr id="4" name="Date Placeholder 3"/>
           <p:cNvSpPr>
             <a:spLocks noGrp="1"/>
           </p:cNvSpPr>
@@ -1111,7 +1038,7 @@
           <a:p>
             <a:fld id="{F2878C72-540D-B747-AB9D-A738C0927A38}" type="datetimeFigureOut">
               <a:rPr lang="es-ES" smtClean="0"/>
-              <a:t>10/6/20</a:t>
+              <a:t>12/6/20</a:t>
             </a:fld>
             <a:endParaRPr lang="es-ES"/>
           </a:p>
@@ -1119,13 +1046,7 @@
       </p:sp>
       <p:sp>
         <p:nvSpPr>
-          <p:cNvPr id="5" name="Footer Placeholder 4">
-            <a:extLst>
-              <a:ext uri="{FF2B5EF4-FFF2-40B4-BE49-F238E27FC236}">
-                <a16:creationId xmlns:a16="http://schemas.microsoft.com/office/drawing/2014/main" id="{C9A98231-89E7-0C49-B648-392FADA57BE6}"/>
-              </a:ext>
-            </a:extLst>
-          </p:cNvPr>
+          <p:cNvPr id="5" name="Footer Placeholder 4"/>
           <p:cNvSpPr>
             <a:spLocks noGrp="1"/>
           </p:cNvSpPr>
@@ -1144,13 +1065,7 @@
       </p:sp>
       <p:sp>
         <p:nvSpPr>
-          <p:cNvPr id="6" name="Slide Number Placeholder 5">
-            <a:extLst>
-              <a:ext uri="{FF2B5EF4-FFF2-40B4-BE49-F238E27FC236}">
-                <a16:creationId xmlns:a16="http://schemas.microsoft.com/office/drawing/2014/main" id="{6794F634-44F8-B948-A421-B0A2A11B9C92}"/>
-              </a:ext>
-            </a:extLst>
-          </p:cNvPr>
+          <p:cNvPr id="6" name="Slide Number Placeholder 5"/>
           <p:cNvSpPr>
             <a:spLocks noGrp="1"/>
           </p:cNvSpPr>
@@ -1174,7 +1089,7 @@
     </p:spTree>
     <p:extLst>
       <p:ext uri="{BB962C8B-B14F-4D97-AF65-F5344CB8AC3E}">
-        <p14:creationId xmlns:p14="http://schemas.microsoft.com/office/powerpoint/2010/main" val="3191319684"/>
+        <p14:creationId xmlns:p14="http://schemas.microsoft.com/office/powerpoint/2010/main" val="2845753177"/>
       </p:ext>
     </p:extLst>
   </p:cSld>
@@ -1203,13 +1118,7 @@
       </p:grpSpPr>
       <p:sp>
         <p:nvSpPr>
-          <p:cNvPr id="2" name="Title 1">
-            <a:extLst>
-              <a:ext uri="{FF2B5EF4-FFF2-40B4-BE49-F238E27FC236}">
-                <a16:creationId xmlns:a16="http://schemas.microsoft.com/office/drawing/2014/main" id="{FF0059B8-B8C0-0747-8C1A-0EE349EBC07F}"/>
-              </a:ext>
-            </a:extLst>
-          </p:cNvPr>
+          <p:cNvPr id="2" name="Title 1"/>
           <p:cNvSpPr>
             <a:spLocks noGrp="1"/>
           </p:cNvSpPr>
@@ -1226,19 +1135,13 @@
               <a:rPr lang="en-GB"/>
               <a:t>Click to edit Master title style</a:t>
             </a:r>
-            <a:endParaRPr lang="es-ES"/>
-          </a:p>
-        </p:txBody>
-      </p:sp>
-      <p:sp>
-        <p:nvSpPr>
-          <p:cNvPr id="3" name="Content Placeholder 2">
-            <a:extLst>
-              <a:ext uri="{FF2B5EF4-FFF2-40B4-BE49-F238E27FC236}">
-                <a16:creationId xmlns:a16="http://schemas.microsoft.com/office/drawing/2014/main" id="{B44F09BD-D78B-7847-A06B-1C9BA8BB4F27}"/>
-              </a:ext>
-            </a:extLst>
-          </p:cNvPr>
+            <a:endParaRPr lang="en-US" dirty="0"/>
+          </a:p>
+        </p:txBody>
+      </p:sp>
+      <p:sp>
+        <p:nvSpPr>
+          <p:cNvPr id="3" name="Content Placeholder 2"/>
           <p:cNvSpPr>
             <a:spLocks noGrp="1"/>
           </p:cNvSpPr>
@@ -1284,19 +1187,13 @@
               <a:rPr lang="en-GB"/>
               <a:t>Fifth level</a:t>
             </a:r>
-            <a:endParaRPr lang="es-ES"/>
-          </a:p>
-        </p:txBody>
-      </p:sp>
-      <p:sp>
-        <p:nvSpPr>
-          <p:cNvPr id="4" name="Date Placeholder 3">
-            <a:extLst>
-              <a:ext uri="{FF2B5EF4-FFF2-40B4-BE49-F238E27FC236}">
-                <a16:creationId xmlns:a16="http://schemas.microsoft.com/office/drawing/2014/main" id="{F9707F34-1989-2448-9DD4-15912146558C}"/>
-              </a:ext>
-            </a:extLst>
-          </p:cNvPr>
+            <a:endParaRPr lang="en-US" dirty="0"/>
+          </a:p>
+        </p:txBody>
+      </p:sp>
+      <p:sp>
+        <p:nvSpPr>
+          <p:cNvPr id="4" name="Date Placeholder 3"/>
           <p:cNvSpPr>
             <a:spLocks noGrp="1"/>
           </p:cNvSpPr>
@@ -1311,7 +1208,7 @@
           <a:p>
             <a:fld id="{F2878C72-540D-B747-AB9D-A738C0927A38}" type="datetimeFigureOut">
               <a:rPr lang="es-ES" smtClean="0"/>
-              <a:t>10/6/20</a:t>
+              <a:t>12/6/20</a:t>
             </a:fld>
             <a:endParaRPr lang="es-ES"/>
           </a:p>
@@ -1319,13 +1216,7 @@
       </p:sp>
       <p:sp>
         <p:nvSpPr>
-          <p:cNvPr id="5" name="Footer Placeholder 4">
-            <a:extLst>
-              <a:ext uri="{FF2B5EF4-FFF2-40B4-BE49-F238E27FC236}">
-                <a16:creationId xmlns:a16="http://schemas.microsoft.com/office/drawing/2014/main" id="{CCB4D58F-1212-ED48-B3C2-DC2FF1CFC102}"/>
-              </a:ext>
-            </a:extLst>
-          </p:cNvPr>
+          <p:cNvPr id="5" name="Footer Placeholder 4"/>
           <p:cNvSpPr>
             <a:spLocks noGrp="1"/>
           </p:cNvSpPr>
@@ -1344,13 +1235,7 @@
       </p:sp>
       <p:sp>
         <p:nvSpPr>
-          <p:cNvPr id="6" name="Slide Number Placeholder 5">
-            <a:extLst>
-              <a:ext uri="{FF2B5EF4-FFF2-40B4-BE49-F238E27FC236}">
-                <a16:creationId xmlns:a16="http://schemas.microsoft.com/office/drawing/2014/main" id="{974D825F-6248-0648-8EEC-B3D1ACB52725}"/>
-              </a:ext>
-            </a:extLst>
-          </p:cNvPr>
+          <p:cNvPr id="6" name="Slide Number Placeholder 5"/>
           <p:cNvSpPr>
             <a:spLocks noGrp="1"/>
           </p:cNvSpPr>
@@ -1374,7 +1259,7 @@
     </p:spTree>
     <p:extLst>
       <p:ext uri="{BB962C8B-B14F-4D97-AF65-F5344CB8AC3E}">
-        <p14:creationId xmlns:p14="http://schemas.microsoft.com/office/powerpoint/2010/main" val="3214719124"/>
+        <p14:creationId xmlns:p14="http://schemas.microsoft.com/office/powerpoint/2010/main" val="1546473329"/>
       </p:ext>
     </p:extLst>
   </p:cSld>
@@ -1403,13 +1288,7 @@
       </p:grpSpPr>
       <p:sp>
         <p:nvSpPr>
-          <p:cNvPr id="2" name="Title 1">
-            <a:extLst>
-              <a:ext uri="{FF2B5EF4-FFF2-40B4-BE49-F238E27FC236}">
-                <a16:creationId xmlns:a16="http://schemas.microsoft.com/office/drawing/2014/main" id="{EE25617E-8B9B-8F42-B066-C5467DF6F907}"/>
-              </a:ext>
-            </a:extLst>
-          </p:cNvPr>
+          <p:cNvPr id="2" name="Title 1"/>
           <p:cNvSpPr>
             <a:spLocks noGrp="1"/>
           </p:cNvSpPr>
@@ -1419,15 +1298,15 @@
         </p:nvSpPr>
         <p:spPr>
           <a:xfrm>
-            <a:off x="831850" y="1709738"/>
-            <a:ext cx="10515600" cy="2852737"/>
+            <a:off x="1031582" y="2602603"/>
+            <a:ext cx="13040439" cy="4342500"/>
           </a:xfrm>
         </p:spPr>
         <p:txBody>
           <a:bodyPr anchor="b"/>
           <a:lstStyle>
             <a:lvl1pPr>
-              <a:defRPr sz="6000"/>
+              <a:defRPr sz="9133"/>
             </a:lvl1pPr>
           </a:lstStyle>
           <a:p>
@@ -1435,19 +1314,13 @@
               <a:rPr lang="en-GB"/>
               <a:t>Click to edit Master title style</a:t>
             </a:r>
-            <a:endParaRPr lang="es-ES"/>
-          </a:p>
-        </p:txBody>
-      </p:sp>
-      <p:sp>
-        <p:nvSpPr>
-          <p:cNvPr id="3" name="Text Placeholder 2">
-            <a:extLst>
-              <a:ext uri="{FF2B5EF4-FFF2-40B4-BE49-F238E27FC236}">
-                <a16:creationId xmlns:a16="http://schemas.microsoft.com/office/drawing/2014/main" id="{6DEFCA48-4067-5242-AED0-07B60E6BA0EC}"/>
-              </a:ext>
-            </a:extLst>
-          </p:cNvPr>
+            <a:endParaRPr lang="en-US" dirty="0"/>
+          </a:p>
+        </p:txBody>
+      </p:sp>
+      <p:sp>
+        <p:nvSpPr>
+          <p:cNvPr id="3" name="Text Placeholder 2"/>
           <p:cNvSpPr>
             <a:spLocks noGrp="1"/>
           </p:cNvSpPr>
@@ -1457,8 +1330,8 @@
         </p:nvSpPr>
         <p:spPr>
           <a:xfrm>
-            <a:off x="831850" y="4589463"/>
-            <a:ext cx="10515600" cy="1500187"/>
+            <a:off x="1031582" y="6986185"/>
+            <a:ext cx="13040439" cy="2283618"/>
           </a:xfrm>
         </p:spPr>
         <p:txBody>
@@ -1466,17 +1339,15 @@
           <a:lstStyle>
             <a:lvl1pPr marL="0" indent="0">
               <a:buNone/>
-              <a:defRPr sz="2400">
+              <a:defRPr sz="3653">
                 <a:solidFill>
-                  <a:schemeClr val="tx1">
-                    <a:tint val="75000"/>
-                  </a:schemeClr>
+                  <a:schemeClr val="tx1"/>
                 </a:solidFill>
               </a:defRPr>
             </a:lvl1pPr>
-            <a:lvl2pPr marL="457200" indent="0">
+            <a:lvl2pPr marL="695950" indent="0">
               <a:buNone/>
-              <a:defRPr sz="2000">
+              <a:defRPr sz="3044">
                 <a:solidFill>
                   <a:schemeClr val="tx1">
                     <a:tint val="75000"/>
@@ -1484,9 +1355,9 @@
                 </a:solidFill>
               </a:defRPr>
             </a:lvl2pPr>
-            <a:lvl3pPr marL="914400" indent="0">
+            <a:lvl3pPr marL="1391900" indent="0">
               <a:buNone/>
-              <a:defRPr sz="1800">
+              <a:defRPr sz="2740">
                 <a:solidFill>
                   <a:schemeClr val="tx1">
                     <a:tint val="75000"/>
@@ -1494,9 +1365,9 @@
                 </a:solidFill>
               </a:defRPr>
             </a:lvl3pPr>
-            <a:lvl4pPr marL="1371600" indent="0">
+            <a:lvl4pPr marL="2087850" indent="0">
               <a:buNone/>
-              <a:defRPr sz="1600">
+              <a:defRPr sz="2436">
                 <a:solidFill>
                   <a:schemeClr val="tx1">
                     <a:tint val="75000"/>
@@ -1504,9 +1375,9 @@
                 </a:solidFill>
               </a:defRPr>
             </a:lvl4pPr>
-            <a:lvl5pPr marL="1828800" indent="0">
+            <a:lvl5pPr marL="2783799" indent="0">
               <a:buNone/>
-              <a:defRPr sz="1600">
+              <a:defRPr sz="2436">
                 <a:solidFill>
                   <a:schemeClr val="tx1">
                     <a:tint val="75000"/>
@@ -1514,9 +1385,9 @@
                 </a:solidFill>
               </a:defRPr>
             </a:lvl5pPr>
-            <a:lvl6pPr marL="2286000" indent="0">
+            <a:lvl6pPr marL="3479749" indent="0">
               <a:buNone/>
-              <a:defRPr sz="1600">
+              <a:defRPr sz="2436">
                 <a:solidFill>
                   <a:schemeClr val="tx1">
                     <a:tint val="75000"/>
@@ -1524,9 +1395,9 @@
                 </a:solidFill>
               </a:defRPr>
             </a:lvl6pPr>
-            <a:lvl7pPr marL="2743200" indent="0">
+            <a:lvl7pPr marL="4175699" indent="0">
               <a:buNone/>
-              <a:defRPr sz="1600">
+              <a:defRPr sz="2436">
                 <a:solidFill>
                   <a:schemeClr val="tx1">
                     <a:tint val="75000"/>
@@ -1534,9 +1405,9 @@
                 </a:solidFill>
               </a:defRPr>
             </a:lvl7pPr>
-            <a:lvl8pPr marL="3200400" indent="0">
+            <a:lvl8pPr marL="4871649" indent="0">
               <a:buNone/>
-              <a:defRPr sz="1600">
+              <a:defRPr sz="2436">
                 <a:solidFill>
                   <a:schemeClr val="tx1">
                     <a:tint val="75000"/>
@@ -1544,9 +1415,9 @@
                 </a:solidFill>
               </a:defRPr>
             </a:lvl8pPr>
-            <a:lvl9pPr marL="3657600" indent="0">
+            <a:lvl9pPr marL="5567599" indent="0">
               <a:buNone/>
-              <a:defRPr sz="1600">
+              <a:defRPr sz="2436">
                 <a:solidFill>
                   <a:schemeClr val="tx1">
                     <a:tint val="75000"/>
@@ -1566,13 +1437,7 @@
       </p:sp>
       <p:sp>
         <p:nvSpPr>
-          <p:cNvPr id="4" name="Date Placeholder 3">
-            <a:extLst>
-              <a:ext uri="{FF2B5EF4-FFF2-40B4-BE49-F238E27FC236}">
-                <a16:creationId xmlns:a16="http://schemas.microsoft.com/office/drawing/2014/main" id="{E001B4A4-BFFC-FF42-B74B-75702A893B8E}"/>
-              </a:ext>
-            </a:extLst>
-          </p:cNvPr>
+          <p:cNvPr id="4" name="Date Placeholder 3"/>
           <p:cNvSpPr>
             <a:spLocks noGrp="1"/>
           </p:cNvSpPr>
@@ -1587,7 +1452,7 @@
           <a:p>
             <a:fld id="{F2878C72-540D-B747-AB9D-A738C0927A38}" type="datetimeFigureOut">
               <a:rPr lang="es-ES" smtClean="0"/>
-              <a:t>10/6/20</a:t>
+              <a:t>12/6/20</a:t>
             </a:fld>
             <a:endParaRPr lang="es-ES"/>
           </a:p>
@@ -1595,13 +1460,7 @@
       </p:sp>
       <p:sp>
         <p:nvSpPr>
-          <p:cNvPr id="5" name="Footer Placeholder 4">
-            <a:extLst>
-              <a:ext uri="{FF2B5EF4-FFF2-40B4-BE49-F238E27FC236}">
-                <a16:creationId xmlns:a16="http://schemas.microsoft.com/office/drawing/2014/main" id="{DDC82F3D-B704-FF45-B54D-10A3D0844E6B}"/>
-              </a:ext>
-            </a:extLst>
-          </p:cNvPr>
+          <p:cNvPr id="5" name="Footer Placeholder 4"/>
           <p:cNvSpPr>
             <a:spLocks noGrp="1"/>
           </p:cNvSpPr>
@@ -1620,13 +1479,7 @@
       </p:sp>
       <p:sp>
         <p:nvSpPr>
-          <p:cNvPr id="6" name="Slide Number Placeholder 5">
-            <a:extLst>
-              <a:ext uri="{FF2B5EF4-FFF2-40B4-BE49-F238E27FC236}">
-                <a16:creationId xmlns:a16="http://schemas.microsoft.com/office/drawing/2014/main" id="{C7FE01FD-886E-E245-A958-52657ACA5161}"/>
-              </a:ext>
-            </a:extLst>
-          </p:cNvPr>
+          <p:cNvPr id="6" name="Slide Number Placeholder 5"/>
           <p:cNvSpPr>
             <a:spLocks noGrp="1"/>
           </p:cNvSpPr>
@@ -1650,7 +1503,7 @@
     </p:spTree>
     <p:extLst>
       <p:ext uri="{BB962C8B-B14F-4D97-AF65-F5344CB8AC3E}">
-        <p14:creationId xmlns:p14="http://schemas.microsoft.com/office/powerpoint/2010/main" val="2390053807"/>
+        <p14:creationId xmlns:p14="http://schemas.microsoft.com/office/powerpoint/2010/main" val="3768272311"/>
       </p:ext>
     </p:extLst>
   </p:cSld>
@@ -1679,13 +1532,7 @@
       </p:grpSpPr>
       <p:sp>
         <p:nvSpPr>
-          <p:cNvPr id="2" name="Title 1">
-            <a:extLst>
-              <a:ext uri="{FF2B5EF4-FFF2-40B4-BE49-F238E27FC236}">
-                <a16:creationId xmlns:a16="http://schemas.microsoft.com/office/drawing/2014/main" id="{B0F6E883-19FB-AE49-8E3A-CCEFF9941747}"/>
-              </a:ext>
-            </a:extLst>
-          </p:cNvPr>
+          <p:cNvPr id="2" name="Title 1"/>
           <p:cNvSpPr>
             <a:spLocks noGrp="1"/>
           </p:cNvSpPr>
@@ -1702,19 +1549,13 @@
               <a:rPr lang="en-GB"/>
               <a:t>Click to edit Master title style</a:t>
             </a:r>
-            <a:endParaRPr lang="es-ES"/>
-          </a:p>
-        </p:txBody>
-      </p:sp>
-      <p:sp>
-        <p:nvSpPr>
-          <p:cNvPr id="3" name="Content Placeholder 2">
-            <a:extLst>
-              <a:ext uri="{FF2B5EF4-FFF2-40B4-BE49-F238E27FC236}">
-                <a16:creationId xmlns:a16="http://schemas.microsoft.com/office/drawing/2014/main" id="{54102150-AE9E-FE4E-80E2-7D9386CB9873}"/>
-              </a:ext>
-            </a:extLst>
-          </p:cNvPr>
+            <a:endParaRPr lang="en-US" dirty="0"/>
+          </a:p>
+        </p:txBody>
+      </p:sp>
+      <p:sp>
+        <p:nvSpPr>
+          <p:cNvPr id="3" name="Content Placeholder 2"/>
           <p:cNvSpPr>
             <a:spLocks noGrp="1"/>
           </p:cNvSpPr>
@@ -1724,8 +1565,8 @@
         </p:nvSpPr>
         <p:spPr>
           <a:xfrm>
-            <a:off x="838200" y="1825625"/>
-            <a:ext cx="5181600" cy="4351338"/>
+            <a:off x="1039455" y="2779007"/>
+            <a:ext cx="6425724" cy="6623703"/>
           </a:xfrm>
         </p:spPr>
         <p:txBody>
@@ -1765,19 +1606,13 @@
               <a:rPr lang="en-GB"/>
               <a:t>Fifth level</a:t>
             </a:r>
-            <a:endParaRPr lang="es-ES"/>
-          </a:p>
-        </p:txBody>
-      </p:sp>
-      <p:sp>
-        <p:nvSpPr>
-          <p:cNvPr id="4" name="Content Placeholder 3">
-            <a:extLst>
-              <a:ext uri="{FF2B5EF4-FFF2-40B4-BE49-F238E27FC236}">
-                <a16:creationId xmlns:a16="http://schemas.microsoft.com/office/drawing/2014/main" id="{96CD9157-1F50-3E4C-9227-015AFEBFD9B7}"/>
-              </a:ext>
-            </a:extLst>
-          </p:cNvPr>
+            <a:endParaRPr lang="en-US" dirty="0"/>
+          </a:p>
+        </p:txBody>
+      </p:sp>
+      <p:sp>
+        <p:nvSpPr>
+          <p:cNvPr id="4" name="Content Placeholder 3"/>
           <p:cNvSpPr>
             <a:spLocks noGrp="1"/>
           </p:cNvSpPr>
@@ -1787,8 +1622,8 @@
         </p:nvSpPr>
         <p:spPr>
           <a:xfrm>
-            <a:off x="6172200" y="1825625"/>
-            <a:ext cx="5181600" cy="4351338"/>
+            <a:off x="7654171" y="2779007"/>
+            <a:ext cx="6425724" cy="6623703"/>
           </a:xfrm>
         </p:spPr>
         <p:txBody>
@@ -1828,19 +1663,13 @@
               <a:rPr lang="en-GB"/>
               <a:t>Fifth level</a:t>
             </a:r>
-            <a:endParaRPr lang="es-ES"/>
-          </a:p>
-        </p:txBody>
-      </p:sp>
-      <p:sp>
-        <p:nvSpPr>
-          <p:cNvPr id="5" name="Date Placeholder 4">
-            <a:extLst>
-              <a:ext uri="{FF2B5EF4-FFF2-40B4-BE49-F238E27FC236}">
-                <a16:creationId xmlns:a16="http://schemas.microsoft.com/office/drawing/2014/main" id="{300F64DC-A4AF-1D4B-9199-FD57AC125170}"/>
-              </a:ext>
-            </a:extLst>
-          </p:cNvPr>
+            <a:endParaRPr lang="en-US" dirty="0"/>
+          </a:p>
+        </p:txBody>
+      </p:sp>
+      <p:sp>
+        <p:nvSpPr>
+          <p:cNvPr id="5" name="Date Placeholder 4"/>
           <p:cNvSpPr>
             <a:spLocks noGrp="1"/>
           </p:cNvSpPr>
@@ -1855,7 +1684,7 @@
           <a:p>
             <a:fld id="{F2878C72-540D-B747-AB9D-A738C0927A38}" type="datetimeFigureOut">
               <a:rPr lang="es-ES" smtClean="0"/>
-              <a:t>10/6/20</a:t>
+              <a:t>12/6/20</a:t>
             </a:fld>
             <a:endParaRPr lang="es-ES"/>
           </a:p>
@@ -1863,13 +1692,7 @@
       </p:sp>
       <p:sp>
         <p:nvSpPr>
-          <p:cNvPr id="6" name="Footer Placeholder 5">
-            <a:extLst>
-              <a:ext uri="{FF2B5EF4-FFF2-40B4-BE49-F238E27FC236}">
-                <a16:creationId xmlns:a16="http://schemas.microsoft.com/office/drawing/2014/main" id="{5B29A280-2304-4E40-A057-98252E947774}"/>
-              </a:ext>
-            </a:extLst>
-          </p:cNvPr>
+          <p:cNvPr id="6" name="Footer Placeholder 5"/>
           <p:cNvSpPr>
             <a:spLocks noGrp="1"/>
           </p:cNvSpPr>
@@ -1888,13 +1711,7 @@
       </p:sp>
       <p:sp>
         <p:nvSpPr>
-          <p:cNvPr id="7" name="Slide Number Placeholder 6">
-            <a:extLst>
-              <a:ext uri="{FF2B5EF4-FFF2-40B4-BE49-F238E27FC236}">
-                <a16:creationId xmlns:a16="http://schemas.microsoft.com/office/drawing/2014/main" id="{370CE267-C6A2-854D-8B5B-4A2B861528E2}"/>
-              </a:ext>
-            </a:extLst>
-          </p:cNvPr>
+          <p:cNvPr id="7" name="Slide Number Placeholder 6"/>
           <p:cNvSpPr>
             <a:spLocks noGrp="1"/>
           </p:cNvSpPr>
@@ -1918,7 +1735,7 @@
     </p:spTree>
     <p:extLst>
       <p:ext uri="{BB962C8B-B14F-4D97-AF65-F5344CB8AC3E}">
-        <p14:creationId xmlns:p14="http://schemas.microsoft.com/office/powerpoint/2010/main" val="1633621868"/>
+        <p14:creationId xmlns:p14="http://schemas.microsoft.com/office/powerpoint/2010/main" val="2040143635"/>
       </p:ext>
     </p:extLst>
   </p:cSld>
@@ -1947,13 +1764,7 @@
       </p:grpSpPr>
       <p:sp>
         <p:nvSpPr>
-          <p:cNvPr id="2" name="Title 1">
-            <a:extLst>
-              <a:ext uri="{FF2B5EF4-FFF2-40B4-BE49-F238E27FC236}">
-                <a16:creationId xmlns:a16="http://schemas.microsoft.com/office/drawing/2014/main" id="{7E1A47BF-1F8E-D34C-A458-D60991639867}"/>
-              </a:ext>
-            </a:extLst>
-          </p:cNvPr>
+          <p:cNvPr id="2" name="Title 1"/>
           <p:cNvSpPr>
             <a:spLocks noGrp="1"/>
           </p:cNvSpPr>
@@ -1963,8 +1774,8 @@
         </p:nvSpPr>
         <p:spPr>
           <a:xfrm>
-            <a:off x="839788" y="365125"/>
-            <a:ext cx="10515600" cy="1325563"/>
+            <a:off x="1041425" y="555804"/>
+            <a:ext cx="13040439" cy="2017801"/>
           </a:xfrm>
         </p:spPr>
         <p:txBody>
@@ -1975,19 +1786,13 @@
               <a:rPr lang="en-GB"/>
               <a:t>Click to edit Master title style</a:t>
             </a:r>
-            <a:endParaRPr lang="es-ES"/>
-          </a:p>
-        </p:txBody>
-      </p:sp>
-      <p:sp>
-        <p:nvSpPr>
-          <p:cNvPr id="3" name="Text Placeholder 2">
-            <a:extLst>
-              <a:ext uri="{FF2B5EF4-FFF2-40B4-BE49-F238E27FC236}">
-                <a16:creationId xmlns:a16="http://schemas.microsoft.com/office/drawing/2014/main" id="{5B23094A-D20F-6E47-9BC1-467E45F72627}"/>
-              </a:ext>
-            </a:extLst>
-          </p:cNvPr>
+            <a:endParaRPr lang="en-US" dirty="0"/>
+          </a:p>
+        </p:txBody>
+      </p:sp>
+      <p:sp>
+        <p:nvSpPr>
+          <p:cNvPr id="3" name="Text Placeholder 2"/>
           <p:cNvSpPr>
             <a:spLocks noGrp="1"/>
           </p:cNvSpPr>
@@ -1997,8 +1802,8 @@
         </p:nvSpPr>
         <p:spPr>
           <a:xfrm>
-            <a:off x="839788" y="1681163"/>
-            <a:ext cx="5157787" cy="823912"/>
+            <a:off x="1041426" y="2559104"/>
+            <a:ext cx="6396193" cy="1254177"/>
           </a:xfrm>
         </p:spPr>
         <p:txBody>
@@ -2006,39 +1811,39 @@
           <a:lstStyle>
             <a:lvl1pPr marL="0" indent="0">
               <a:buNone/>
-              <a:defRPr sz="2400" b="1"/>
+              <a:defRPr sz="3653" b="1"/>
             </a:lvl1pPr>
-            <a:lvl2pPr marL="457200" indent="0">
+            <a:lvl2pPr marL="695950" indent="0">
               <a:buNone/>
-              <a:defRPr sz="2000" b="1"/>
+              <a:defRPr sz="3044" b="1"/>
             </a:lvl2pPr>
-            <a:lvl3pPr marL="914400" indent="0">
+            <a:lvl3pPr marL="1391900" indent="0">
               <a:buNone/>
-              <a:defRPr sz="1800" b="1"/>
+              <a:defRPr sz="2740" b="1"/>
             </a:lvl3pPr>
-            <a:lvl4pPr marL="1371600" indent="0">
+            <a:lvl4pPr marL="2087850" indent="0">
               <a:buNone/>
-              <a:defRPr sz="1600" b="1"/>
+              <a:defRPr sz="2436" b="1"/>
             </a:lvl4pPr>
-            <a:lvl5pPr marL="1828800" indent="0">
+            <a:lvl5pPr marL="2783799" indent="0">
               <a:buNone/>
-              <a:defRPr sz="1600" b="1"/>
+              <a:defRPr sz="2436" b="1"/>
             </a:lvl5pPr>
-            <a:lvl6pPr marL="2286000" indent="0">
+            <a:lvl6pPr marL="3479749" indent="0">
               <a:buNone/>
-              <a:defRPr sz="1600" b="1"/>
+              <a:defRPr sz="2436" b="1"/>
             </a:lvl6pPr>
-            <a:lvl7pPr marL="2743200" indent="0">
+            <a:lvl7pPr marL="4175699" indent="0">
               <a:buNone/>
-              <a:defRPr sz="1600" b="1"/>
+              <a:defRPr sz="2436" b="1"/>
             </a:lvl7pPr>
-            <a:lvl8pPr marL="3200400" indent="0">
+            <a:lvl8pPr marL="4871649" indent="0">
               <a:buNone/>
-              <a:defRPr sz="1600" b="1"/>
+              <a:defRPr sz="2436" b="1"/>
             </a:lvl8pPr>
-            <a:lvl9pPr marL="3657600" indent="0">
+            <a:lvl9pPr marL="5567599" indent="0">
               <a:buNone/>
-              <a:defRPr sz="1600" b="1"/>
+              <a:defRPr sz="2436" b="1"/>
             </a:lvl9pPr>
           </a:lstStyle>
           <a:p>
@@ -2052,13 +1857,7 @@
       </p:sp>
       <p:sp>
         <p:nvSpPr>
-          <p:cNvPr id="4" name="Content Placeholder 3">
-            <a:extLst>
-              <a:ext uri="{FF2B5EF4-FFF2-40B4-BE49-F238E27FC236}">
-                <a16:creationId xmlns:a16="http://schemas.microsoft.com/office/drawing/2014/main" id="{0234A569-B87E-3D41-B5BB-353D05462283}"/>
-              </a:ext>
-            </a:extLst>
-          </p:cNvPr>
+          <p:cNvPr id="4" name="Content Placeholder 3"/>
           <p:cNvSpPr>
             <a:spLocks noGrp="1"/>
           </p:cNvSpPr>
@@ -2068,8 +1867,8 @@
         </p:nvSpPr>
         <p:spPr>
           <a:xfrm>
-            <a:off x="839788" y="2505075"/>
-            <a:ext cx="5157787" cy="3684588"/>
+            <a:off x="1041426" y="3813281"/>
+            <a:ext cx="6396193" cy="5608762"/>
           </a:xfrm>
         </p:spPr>
         <p:txBody>
@@ -2109,19 +1908,13 @@
               <a:rPr lang="en-GB"/>
               <a:t>Fifth level</a:t>
             </a:r>
-            <a:endParaRPr lang="es-ES"/>
-          </a:p>
-        </p:txBody>
-      </p:sp>
-      <p:sp>
-        <p:nvSpPr>
-          <p:cNvPr id="5" name="Text Placeholder 4">
-            <a:extLst>
-              <a:ext uri="{FF2B5EF4-FFF2-40B4-BE49-F238E27FC236}">
-                <a16:creationId xmlns:a16="http://schemas.microsoft.com/office/drawing/2014/main" id="{7194D6C5-9340-EC41-9ED6-ED45C7F71D4C}"/>
-              </a:ext>
-            </a:extLst>
-          </p:cNvPr>
+            <a:endParaRPr lang="en-US" dirty="0"/>
+          </a:p>
+        </p:txBody>
+      </p:sp>
+      <p:sp>
+        <p:nvSpPr>
+          <p:cNvPr id="5" name="Text Placeholder 4"/>
           <p:cNvSpPr>
             <a:spLocks noGrp="1"/>
           </p:cNvSpPr>
@@ -2131,8 +1924,8 @@
         </p:nvSpPr>
         <p:spPr>
           <a:xfrm>
-            <a:off x="6172200" y="1681163"/>
-            <a:ext cx="5183188" cy="823912"/>
+            <a:off x="7654172" y="2559104"/>
+            <a:ext cx="6427693" cy="1254177"/>
           </a:xfrm>
         </p:spPr>
         <p:txBody>
@@ -2140,39 +1933,39 @@
           <a:lstStyle>
             <a:lvl1pPr marL="0" indent="0">
               <a:buNone/>
-              <a:defRPr sz="2400" b="1"/>
+              <a:defRPr sz="3653" b="1"/>
             </a:lvl1pPr>
-            <a:lvl2pPr marL="457200" indent="0">
+            <a:lvl2pPr marL="695950" indent="0">
               <a:buNone/>
-              <a:defRPr sz="2000" b="1"/>
+              <a:defRPr sz="3044" b="1"/>
             </a:lvl2pPr>
-            <a:lvl3pPr marL="914400" indent="0">
+            <a:lvl3pPr marL="1391900" indent="0">
               <a:buNone/>
-              <a:defRPr sz="1800" b="1"/>
+              <a:defRPr sz="2740" b="1"/>
             </a:lvl3pPr>
-            <a:lvl4pPr marL="1371600" indent="0">
+            <a:lvl4pPr marL="2087850" indent="0">
               <a:buNone/>
-              <a:defRPr sz="1600" b="1"/>
+              <a:defRPr sz="2436" b="1"/>
             </a:lvl4pPr>
-            <a:lvl5pPr marL="1828800" indent="0">
+            <a:lvl5pPr marL="2783799" indent="0">
               <a:buNone/>
-              <a:defRPr sz="1600" b="1"/>
+              <a:defRPr sz="2436" b="1"/>
             </a:lvl5pPr>
-            <a:lvl6pPr marL="2286000" indent="0">
+            <a:lvl6pPr marL="3479749" indent="0">
               <a:buNone/>
-              <a:defRPr sz="1600" b="1"/>
+              <a:defRPr sz="2436" b="1"/>
             </a:lvl6pPr>
-            <a:lvl7pPr marL="2743200" indent="0">
+            <a:lvl7pPr marL="4175699" indent="0">
               <a:buNone/>
-              <a:defRPr sz="1600" b="1"/>
+              <a:defRPr sz="2436" b="1"/>
             </a:lvl7pPr>
-            <a:lvl8pPr marL="3200400" indent="0">
+            <a:lvl8pPr marL="4871649" indent="0">
               <a:buNone/>
-              <a:defRPr sz="1600" b="1"/>
+              <a:defRPr sz="2436" b="1"/>
             </a:lvl8pPr>
-            <a:lvl9pPr marL="3657600" indent="0">
+            <a:lvl9pPr marL="5567599" indent="0">
               <a:buNone/>
-              <a:defRPr sz="1600" b="1"/>
+              <a:defRPr sz="2436" b="1"/>
             </a:lvl9pPr>
           </a:lstStyle>
           <a:p>
@@ -2186,13 +1979,7 @@
       </p:sp>
       <p:sp>
         <p:nvSpPr>
-          <p:cNvPr id="6" name="Content Placeholder 5">
-            <a:extLst>
-              <a:ext uri="{FF2B5EF4-FFF2-40B4-BE49-F238E27FC236}">
-                <a16:creationId xmlns:a16="http://schemas.microsoft.com/office/drawing/2014/main" id="{E1D96FBD-0C9E-E546-9C8F-E63E187A4B59}"/>
-              </a:ext>
-            </a:extLst>
-          </p:cNvPr>
+          <p:cNvPr id="6" name="Content Placeholder 5"/>
           <p:cNvSpPr>
             <a:spLocks noGrp="1"/>
           </p:cNvSpPr>
@@ -2202,8 +1989,8 @@
         </p:nvSpPr>
         <p:spPr>
           <a:xfrm>
-            <a:off x="6172200" y="2505075"/>
-            <a:ext cx="5183188" cy="3684588"/>
+            <a:off x="7654172" y="3813281"/>
+            <a:ext cx="6427693" cy="5608762"/>
           </a:xfrm>
         </p:spPr>
         <p:txBody>
@@ -2243,19 +2030,13 @@
               <a:rPr lang="en-GB"/>
               <a:t>Fifth level</a:t>
             </a:r>
-            <a:endParaRPr lang="es-ES"/>
-          </a:p>
-        </p:txBody>
-      </p:sp>
-      <p:sp>
-        <p:nvSpPr>
-          <p:cNvPr id="7" name="Date Placeholder 6">
-            <a:extLst>
-              <a:ext uri="{FF2B5EF4-FFF2-40B4-BE49-F238E27FC236}">
-                <a16:creationId xmlns:a16="http://schemas.microsoft.com/office/drawing/2014/main" id="{6F28B36E-9CA1-5045-B794-8DCD7DC1E2B4}"/>
-              </a:ext>
-            </a:extLst>
-          </p:cNvPr>
+            <a:endParaRPr lang="en-US" dirty="0"/>
+          </a:p>
+        </p:txBody>
+      </p:sp>
+      <p:sp>
+        <p:nvSpPr>
+          <p:cNvPr id="7" name="Date Placeholder 6"/>
           <p:cNvSpPr>
             <a:spLocks noGrp="1"/>
           </p:cNvSpPr>
@@ -2270,7 +2051,7 @@
           <a:p>
             <a:fld id="{F2878C72-540D-B747-AB9D-A738C0927A38}" type="datetimeFigureOut">
               <a:rPr lang="es-ES" smtClean="0"/>
-              <a:t>10/6/20</a:t>
+              <a:t>12/6/20</a:t>
             </a:fld>
             <a:endParaRPr lang="es-ES"/>
           </a:p>
@@ -2278,13 +2059,7 @@
       </p:sp>
       <p:sp>
         <p:nvSpPr>
-          <p:cNvPr id="8" name="Footer Placeholder 7">
-            <a:extLst>
-              <a:ext uri="{FF2B5EF4-FFF2-40B4-BE49-F238E27FC236}">
-                <a16:creationId xmlns:a16="http://schemas.microsoft.com/office/drawing/2014/main" id="{D2F07A4D-BFD3-CD46-A445-DAA745CCE851}"/>
-              </a:ext>
-            </a:extLst>
-          </p:cNvPr>
+          <p:cNvPr id="8" name="Footer Placeholder 7"/>
           <p:cNvSpPr>
             <a:spLocks noGrp="1"/>
           </p:cNvSpPr>
@@ -2303,13 +2078,7 @@
       </p:sp>
       <p:sp>
         <p:nvSpPr>
-          <p:cNvPr id="9" name="Slide Number Placeholder 8">
-            <a:extLst>
-              <a:ext uri="{FF2B5EF4-FFF2-40B4-BE49-F238E27FC236}">
-                <a16:creationId xmlns:a16="http://schemas.microsoft.com/office/drawing/2014/main" id="{89B948B1-9565-9A42-8460-7B7186977638}"/>
-              </a:ext>
-            </a:extLst>
-          </p:cNvPr>
+          <p:cNvPr id="9" name="Slide Number Placeholder 8"/>
           <p:cNvSpPr>
             <a:spLocks noGrp="1"/>
           </p:cNvSpPr>
@@ -2333,7 +2102,7 @@
     </p:spTree>
     <p:extLst>
       <p:ext uri="{BB962C8B-B14F-4D97-AF65-F5344CB8AC3E}">
-        <p14:creationId xmlns:p14="http://schemas.microsoft.com/office/powerpoint/2010/main" val="3174227513"/>
+        <p14:creationId xmlns:p14="http://schemas.microsoft.com/office/powerpoint/2010/main" val="10436196"/>
       </p:ext>
     </p:extLst>
   </p:cSld>
@@ -2362,13 +2131,7 @@
       </p:grpSpPr>
       <p:sp>
         <p:nvSpPr>
-          <p:cNvPr id="2" name="Title 1">
-            <a:extLst>
-              <a:ext uri="{FF2B5EF4-FFF2-40B4-BE49-F238E27FC236}">
-                <a16:creationId xmlns:a16="http://schemas.microsoft.com/office/drawing/2014/main" id="{A48537B6-8600-9E4A-A529-1E478CAA5366}"/>
-              </a:ext>
-            </a:extLst>
-          </p:cNvPr>
+          <p:cNvPr id="2" name="Title 1"/>
           <p:cNvSpPr>
             <a:spLocks noGrp="1"/>
           </p:cNvSpPr>
@@ -2385,19 +2148,13 @@
               <a:rPr lang="en-GB"/>
               <a:t>Click to edit Master title style</a:t>
             </a:r>
-            <a:endParaRPr lang="es-ES"/>
-          </a:p>
-        </p:txBody>
-      </p:sp>
-      <p:sp>
-        <p:nvSpPr>
-          <p:cNvPr id="3" name="Date Placeholder 2">
-            <a:extLst>
-              <a:ext uri="{FF2B5EF4-FFF2-40B4-BE49-F238E27FC236}">
-                <a16:creationId xmlns:a16="http://schemas.microsoft.com/office/drawing/2014/main" id="{971C4D90-91D5-0444-BB8F-C0501AC4154F}"/>
-              </a:ext>
-            </a:extLst>
-          </p:cNvPr>
+            <a:endParaRPr lang="en-US" dirty="0"/>
+          </a:p>
+        </p:txBody>
+      </p:sp>
+      <p:sp>
+        <p:nvSpPr>
+          <p:cNvPr id="3" name="Date Placeholder 2"/>
           <p:cNvSpPr>
             <a:spLocks noGrp="1"/>
           </p:cNvSpPr>
@@ -2412,7 +2169,7 @@
           <a:p>
             <a:fld id="{F2878C72-540D-B747-AB9D-A738C0927A38}" type="datetimeFigureOut">
               <a:rPr lang="es-ES" smtClean="0"/>
-              <a:t>10/6/20</a:t>
+              <a:t>12/6/20</a:t>
             </a:fld>
             <a:endParaRPr lang="es-ES"/>
           </a:p>
@@ -2420,13 +2177,7 @@
       </p:sp>
       <p:sp>
         <p:nvSpPr>
-          <p:cNvPr id="4" name="Footer Placeholder 3">
-            <a:extLst>
-              <a:ext uri="{FF2B5EF4-FFF2-40B4-BE49-F238E27FC236}">
-                <a16:creationId xmlns:a16="http://schemas.microsoft.com/office/drawing/2014/main" id="{81F01CA8-48B3-D040-AE2F-1EA9FB87CF71}"/>
-              </a:ext>
-            </a:extLst>
-          </p:cNvPr>
+          <p:cNvPr id="4" name="Footer Placeholder 3"/>
           <p:cNvSpPr>
             <a:spLocks noGrp="1"/>
           </p:cNvSpPr>
@@ -2445,13 +2196,7 @@
       </p:sp>
       <p:sp>
         <p:nvSpPr>
-          <p:cNvPr id="5" name="Slide Number Placeholder 4">
-            <a:extLst>
-              <a:ext uri="{FF2B5EF4-FFF2-40B4-BE49-F238E27FC236}">
-                <a16:creationId xmlns:a16="http://schemas.microsoft.com/office/drawing/2014/main" id="{1E8D3AEF-BAE8-7942-B690-54144EE2168A}"/>
-              </a:ext>
-            </a:extLst>
-          </p:cNvPr>
+          <p:cNvPr id="5" name="Slide Number Placeholder 4"/>
           <p:cNvSpPr>
             <a:spLocks noGrp="1"/>
           </p:cNvSpPr>
@@ -2475,7 +2220,7 @@
     </p:spTree>
     <p:extLst>
       <p:ext uri="{BB962C8B-B14F-4D97-AF65-F5344CB8AC3E}">
-        <p14:creationId xmlns:p14="http://schemas.microsoft.com/office/powerpoint/2010/main" val="1998338959"/>
+        <p14:creationId xmlns:p14="http://schemas.microsoft.com/office/powerpoint/2010/main" val="2771104752"/>
       </p:ext>
     </p:extLst>
   </p:cSld>
@@ -2504,13 +2249,7 @@
       </p:grpSpPr>
       <p:sp>
         <p:nvSpPr>
-          <p:cNvPr id="2" name="Date Placeholder 1">
-            <a:extLst>
-              <a:ext uri="{FF2B5EF4-FFF2-40B4-BE49-F238E27FC236}">
-                <a16:creationId xmlns:a16="http://schemas.microsoft.com/office/drawing/2014/main" id="{DABCE679-A77C-DB4C-BD2A-931680F034EC}"/>
-              </a:ext>
-            </a:extLst>
-          </p:cNvPr>
+          <p:cNvPr id="2" name="Date Placeholder 1"/>
           <p:cNvSpPr>
             <a:spLocks noGrp="1"/>
           </p:cNvSpPr>
@@ -2525,7 +2264,7 @@
           <a:p>
             <a:fld id="{F2878C72-540D-B747-AB9D-A738C0927A38}" type="datetimeFigureOut">
               <a:rPr lang="es-ES" smtClean="0"/>
-              <a:t>10/6/20</a:t>
+              <a:t>12/6/20</a:t>
             </a:fld>
             <a:endParaRPr lang="es-ES"/>
           </a:p>
@@ -2533,13 +2272,7 @@
       </p:sp>
       <p:sp>
         <p:nvSpPr>
-          <p:cNvPr id="3" name="Footer Placeholder 2">
-            <a:extLst>
-              <a:ext uri="{FF2B5EF4-FFF2-40B4-BE49-F238E27FC236}">
-                <a16:creationId xmlns:a16="http://schemas.microsoft.com/office/drawing/2014/main" id="{AE4A6669-BFFC-6F46-B9EB-93C6B7B29A85}"/>
-              </a:ext>
-            </a:extLst>
-          </p:cNvPr>
+          <p:cNvPr id="3" name="Footer Placeholder 2"/>
           <p:cNvSpPr>
             <a:spLocks noGrp="1"/>
           </p:cNvSpPr>
@@ -2558,13 +2291,7 @@
       </p:sp>
       <p:sp>
         <p:nvSpPr>
-          <p:cNvPr id="4" name="Slide Number Placeholder 3">
-            <a:extLst>
-              <a:ext uri="{FF2B5EF4-FFF2-40B4-BE49-F238E27FC236}">
-                <a16:creationId xmlns:a16="http://schemas.microsoft.com/office/drawing/2014/main" id="{CC620B1D-648A-544B-BDC7-1BFD29C501DA}"/>
-              </a:ext>
-            </a:extLst>
-          </p:cNvPr>
+          <p:cNvPr id="4" name="Slide Number Placeholder 3"/>
           <p:cNvSpPr>
             <a:spLocks noGrp="1"/>
           </p:cNvSpPr>
@@ -2588,7 +2315,7 @@
     </p:spTree>
     <p:extLst>
       <p:ext uri="{BB962C8B-B14F-4D97-AF65-F5344CB8AC3E}">
-        <p14:creationId xmlns:p14="http://schemas.microsoft.com/office/powerpoint/2010/main" val="3099829391"/>
+        <p14:creationId xmlns:p14="http://schemas.microsoft.com/office/powerpoint/2010/main" val="1925354234"/>
       </p:ext>
     </p:extLst>
   </p:cSld>
@@ -2617,13 +2344,7 @@
       </p:grpSpPr>
       <p:sp>
         <p:nvSpPr>
-          <p:cNvPr id="2" name="Title 1">
-            <a:extLst>
-              <a:ext uri="{FF2B5EF4-FFF2-40B4-BE49-F238E27FC236}">
-                <a16:creationId xmlns:a16="http://schemas.microsoft.com/office/drawing/2014/main" id="{28245199-3B8F-3048-851A-728A8907D2AD}"/>
-              </a:ext>
-            </a:extLst>
-          </p:cNvPr>
+          <p:cNvPr id="2" name="Title 1"/>
           <p:cNvSpPr>
             <a:spLocks noGrp="1"/>
           </p:cNvSpPr>
@@ -2633,15 +2354,15 @@
         </p:nvSpPr>
         <p:spPr>
           <a:xfrm>
-            <a:off x="839788" y="457200"/>
-            <a:ext cx="3932237" cy="1600200"/>
+            <a:off x="1041425" y="695960"/>
+            <a:ext cx="4876384" cy="2435860"/>
           </a:xfrm>
         </p:spPr>
         <p:txBody>
           <a:bodyPr anchor="b"/>
           <a:lstStyle>
             <a:lvl1pPr>
-              <a:defRPr sz="3200"/>
+              <a:defRPr sz="4871"/>
             </a:lvl1pPr>
           </a:lstStyle>
           <a:p>
@@ -2649,19 +2370,13 @@
               <a:rPr lang="en-GB"/>
               <a:t>Click to edit Master title style</a:t>
             </a:r>
-            <a:endParaRPr lang="es-ES"/>
-          </a:p>
-        </p:txBody>
-      </p:sp>
-      <p:sp>
-        <p:nvSpPr>
-          <p:cNvPr id="3" name="Content Placeholder 2">
-            <a:extLst>
-              <a:ext uri="{FF2B5EF4-FFF2-40B4-BE49-F238E27FC236}">
-                <a16:creationId xmlns:a16="http://schemas.microsoft.com/office/drawing/2014/main" id="{A4761996-DECA-B34B-A542-F16E4F93881D}"/>
-              </a:ext>
-            </a:extLst>
-          </p:cNvPr>
+            <a:endParaRPr lang="en-US" dirty="0"/>
+          </a:p>
+        </p:txBody>
+      </p:sp>
+      <p:sp>
+        <p:nvSpPr>
+          <p:cNvPr id="3" name="Content Placeholder 2"/>
           <p:cNvSpPr>
             <a:spLocks noGrp="1"/>
           </p:cNvSpPr>
@@ -2671,39 +2386,39 @@
         </p:nvSpPr>
         <p:spPr>
           <a:xfrm>
-            <a:off x="5183188" y="987425"/>
-            <a:ext cx="6172200" cy="4873625"/>
+            <a:off x="6427693" y="1503083"/>
+            <a:ext cx="7654171" cy="7418740"/>
           </a:xfrm>
         </p:spPr>
         <p:txBody>
           <a:bodyPr/>
           <a:lstStyle>
             <a:lvl1pPr>
-              <a:defRPr sz="3200"/>
+              <a:defRPr sz="4871"/>
             </a:lvl1pPr>
             <a:lvl2pPr>
-              <a:defRPr sz="2800"/>
+              <a:defRPr sz="4262"/>
             </a:lvl2pPr>
             <a:lvl3pPr>
-              <a:defRPr sz="2400"/>
+              <a:defRPr sz="3653"/>
             </a:lvl3pPr>
             <a:lvl4pPr>
-              <a:defRPr sz="2000"/>
+              <a:defRPr sz="3044"/>
             </a:lvl4pPr>
             <a:lvl5pPr>
-              <a:defRPr sz="2000"/>
+              <a:defRPr sz="3044"/>
             </a:lvl5pPr>
             <a:lvl6pPr>
-              <a:defRPr sz="2000"/>
+              <a:defRPr sz="3044"/>
             </a:lvl6pPr>
             <a:lvl7pPr>
-              <a:defRPr sz="2000"/>
+              <a:defRPr sz="3044"/>
             </a:lvl7pPr>
             <a:lvl8pPr>
-              <a:defRPr sz="2000"/>
+              <a:defRPr sz="3044"/>
             </a:lvl8pPr>
             <a:lvl9pPr>
-              <a:defRPr sz="2000"/>
+              <a:defRPr sz="3044"/>
             </a:lvl9pPr>
           </a:lstStyle>
           <a:p>
@@ -2740,19 +2455,13 @@
               <a:rPr lang="en-GB"/>
               <a:t>Fifth level</a:t>
             </a:r>
-            <a:endParaRPr lang="es-ES"/>
-          </a:p>
-        </p:txBody>
-      </p:sp>
-      <p:sp>
-        <p:nvSpPr>
-          <p:cNvPr id="4" name="Text Placeholder 3">
-            <a:extLst>
-              <a:ext uri="{FF2B5EF4-FFF2-40B4-BE49-F238E27FC236}">
-                <a16:creationId xmlns:a16="http://schemas.microsoft.com/office/drawing/2014/main" id="{07025EFB-7061-5045-B961-ED5011A5F26A}"/>
-              </a:ext>
-            </a:extLst>
-          </p:cNvPr>
+            <a:endParaRPr lang="en-US" dirty="0"/>
+          </a:p>
+        </p:txBody>
+      </p:sp>
+      <p:sp>
+        <p:nvSpPr>
+          <p:cNvPr id="4" name="Text Placeholder 3"/>
           <p:cNvSpPr>
             <a:spLocks noGrp="1"/>
           </p:cNvSpPr>
@@ -2762,8 +2471,8 @@
         </p:nvSpPr>
         <p:spPr>
           <a:xfrm>
-            <a:off x="839788" y="2057400"/>
-            <a:ext cx="3932237" cy="3811588"/>
+            <a:off x="1041425" y="3131820"/>
+            <a:ext cx="4876384" cy="5802084"/>
           </a:xfrm>
         </p:spPr>
         <p:txBody>
@@ -2771,39 +2480,39 @@
           <a:lstStyle>
             <a:lvl1pPr marL="0" indent="0">
               <a:buNone/>
-              <a:defRPr sz="1600"/>
+              <a:defRPr sz="2436"/>
             </a:lvl1pPr>
-            <a:lvl2pPr marL="457200" indent="0">
+            <a:lvl2pPr marL="695950" indent="0">
               <a:buNone/>
-              <a:defRPr sz="1400"/>
+              <a:defRPr sz="2131"/>
             </a:lvl2pPr>
-            <a:lvl3pPr marL="914400" indent="0">
+            <a:lvl3pPr marL="1391900" indent="0">
               <a:buNone/>
-              <a:defRPr sz="1200"/>
+              <a:defRPr sz="1827"/>
             </a:lvl3pPr>
-            <a:lvl4pPr marL="1371600" indent="0">
+            <a:lvl4pPr marL="2087850" indent="0">
               <a:buNone/>
-              <a:defRPr sz="1000"/>
+              <a:defRPr sz="1522"/>
             </a:lvl4pPr>
-            <a:lvl5pPr marL="1828800" indent="0">
+            <a:lvl5pPr marL="2783799" indent="0">
               <a:buNone/>
-              <a:defRPr sz="1000"/>
+              <a:defRPr sz="1522"/>
             </a:lvl5pPr>
-            <a:lvl6pPr marL="2286000" indent="0">
+            <a:lvl6pPr marL="3479749" indent="0">
               <a:buNone/>
-              <a:defRPr sz="1000"/>
+              <a:defRPr sz="1522"/>
             </a:lvl6pPr>
-            <a:lvl7pPr marL="2743200" indent="0">
+            <a:lvl7pPr marL="4175699" indent="0">
               <a:buNone/>
-              <a:defRPr sz="1000"/>
+              <a:defRPr sz="1522"/>
             </a:lvl7pPr>
-            <a:lvl8pPr marL="3200400" indent="0">
+            <a:lvl8pPr marL="4871649" indent="0">
               <a:buNone/>
-              <a:defRPr sz="1000"/>
+              <a:defRPr sz="1522"/>
             </a:lvl8pPr>
-            <a:lvl9pPr marL="3657600" indent="0">
+            <a:lvl9pPr marL="5567599" indent="0">
               <a:buNone/>
-              <a:defRPr sz="1000"/>
+              <a:defRPr sz="1522"/>
             </a:lvl9pPr>
           </a:lstStyle>
           <a:p>
@@ -2817,13 +2526,7 @@
       </p:sp>
       <p:sp>
         <p:nvSpPr>
-          <p:cNvPr id="5" name="Date Placeholder 4">
-            <a:extLst>
-              <a:ext uri="{FF2B5EF4-FFF2-40B4-BE49-F238E27FC236}">
-                <a16:creationId xmlns:a16="http://schemas.microsoft.com/office/drawing/2014/main" id="{18485557-E8A7-3749-9A8C-DAD0B0A89580}"/>
-              </a:ext>
-            </a:extLst>
-          </p:cNvPr>
+          <p:cNvPr id="5" name="Date Placeholder 4"/>
           <p:cNvSpPr>
             <a:spLocks noGrp="1"/>
           </p:cNvSpPr>
@@ -2838,7 +2541,7 @@
           <a:p>
             <a:fld id="{F2878C72-540D-B747-AB9D-A738C0927A38}" type="datetimeFigureOut">
               <a:rPr lang="es-ES" smtClean="0"/>
-              <a:t>10/6/20</a:t>
+              <a:t>12/6/20</a:t>
             </a:fld>
             <a:endParaRPr lang="es-ES"/>
           </a:p>
@@ -2846,13 +2549,7 @@
       </p:sp>
       <p:sp>
         <p:nvSpPr>
-          <p:cNvPr id="6" name="Footer Placeholder 5">
-            <a:extLst>
-              <a:ext uri="{FF2B5EF4-FFF2-40B4-BE49-F238E27FC236}">
-                <a16:creationId xmlns:a16="http://schemas.microsoft.com/office/drawing/2014/main" id="{A5BEFCED-6E3F-5244-AB5E-F7A05AF92B29}"/>
-              </a:ext>
-            </a:extLst>
-          </p:cNvPr>
+          <p:cNvPr id="6" name="Footer Placeholder 5"/>
           <p:cNvSpPr>
             <a:spLocks noGrp="1"/>
           </p:cNvSpPr>
@@ -2871,13 +2568,7 @@
       </p:sp>
       <p:sp>
         <p:nvSpPr>
-          <p:cNvPr id="7" name="Slide Number Placeholder 6">
-            <a:extLst>
-              <a:ext uri="{FF2B5EF4-FFF2-40B4-BE49-F238E27FC236}">
-                <a16:creationId xmlns:a16="http://schemas.microsoft.com/office/drawing/2014/main" id="{5DF69C1F-5040-2847-8AEA-9BA7AC913023}"/>
-              </a:ext>
-            </a:extLst>
-          </p:cNvPr>
+          <p:cNvPr id="7" name="Slide Number Placeholder 6"/>
           <p:cNvSpPr>
             <a:spLocks noGrp="1"/>
           </p:cNvSpPr>
@@ -2901,7 +2592,7 @@
     </p:spTree>
     <p:extLst>
       <p:ext uri="{BB962C8B-B14F-4D97-AF65-F5344CB8AC3E}">
-        <p14:creationId xmlns:p14="http://schemas.microsoft.com/office/powerpoint/2010/main" val="606863405"/>
+        <p14:creationId xmlns:p14="http://schemas.microsoft.com/office/powerpoint/2010/main" val="2031301616"/>
       </p:ext>
     </p:extLst>
   </p:cSld>
@@ -2930,13 +2621,7 @@
       </p:grpSpPr>
       <p:sp>
         <p:nvSpPr>
-          <p:cNvPr id="2" name="Title 1">
-            <a:extLst>
-              <a:ext uri="{FF2B5EF4-FFF2-40B4-BE49-F238E27FC236}">
-                <a16:creationId xmlns:a16="http://schemas.microsoft.com/office/drawing/2014/main" id="{C041406D-09E9-B644-829D-A72C6E48A01B}"/>
-              </a:ext>
-            </a:extLst>
-          </p:cNvPr>
+          <p:cNvPr id="2" name="Title 1"/>
           <p:cNvSpPr>
             <a:spLocks noGrp="1"/>
           </p:cNvSpPr>
@@ -2946,15 +2631,15 @@
         </p:nvSpPr>
         <p:spPr>
           <a:xfrm>
-            <a:off x="839788" y="457200"/>
-            <a:ext cx="3932237" cy="1600200"/>
+            <a:off x="1041425" y="695960"/>
+            <a:ext cx="4876384" cy="2435860"/>
           </a:xfrm>
         </p:spPr>
         <p:txBody>
           <a:bodyPr anchor="b"/>
           <a:lstStyle>
             <a:lvl1pPr>
-              <a:defRPr sz="3200"/>
+              <a:defRPr sz="4871"/>
             </a:lvl1pPr>
           </a:lstStyle>
           <a:p>
@@ -2962,21 +2647,15 @@
               <a:rPr lang="en-GB"/>
               <a:t>Click to edit Master title style</a:t>
             </a:r>
-            <a:endParaRPr lang="es-ES"/>
-          </a:p>
-        </p:txBody>
-      </p:sp>
-      <p:sp>
-        <p:nvSpPr>
-          <p:cNvPr id="3" name="Picture Placeholder 2">
-            <a:extLst>
-              <a:ext uri="{FF2B5EF4-FFF2-40B4-BE49-F238E27FC236}">
-                <a16:creationId xmlns:a16="http://schemas.microsoft.com/office/drawing/2014/main" id="{7112D5F7-CCC3-5D44-AB26-79BAB88465FE}"/>
-              </a:ext>
-            </a:extLst>
-          </p:cNvPr>
-          <p:cNvSpPr>
-            <a:spLocks noGrp="1"/>
+            <a:endParaRPr lang="en-US" dirty="0"/>
+          </a:p>
+        </p:txBody>
+      </p:sp>
+      <p:sp>
+        <p:nvSpPr>
+          <p:cNvPr id="3" name="Picture Placeholder 2"/>
+          <p:cNvSpPr>
+            <a:spLocks noGrp="1" noChangeAspect="1"/>
           </p:cNvSpPr>
           <p:nvPr>
             <p:ph type="pic" idx="1"/>
@@ -2984,8 +2663,73 @@
         </p:nvSpPr>
         <p:spPr>
           <a:xfrm>
-            <a:off x="5183188" y="987425"/>
-            <a:ext cx="6172200" cy="4873625"/>
+            <a:off x="6427693" y="1503083"/>
+            <a:ext cx="7654171" cy="7418740"/>
+          </a:xfrm>
+        </p:spPr>
+        <p:txBody>
+          <a:bodyPr anchor="t"/>
+          <a:lstStyle>
+            <a:lvl1pPr marL="0" indent="0">
+              <a:buNone/>
+              <a:defRPr sz="4871"/>
+            </a:lvl1pPr>
+            <a:lvl2pPr marL="695950" indent="0">
+              <a:buNone/>
+              <a:defRPr sz="4262"/>
+            </a:lvl2pPr>
+            <a:lvl3pPr marL="1391900" indent="0">
+              <a:buNone/>
+              <a:defRPr sz="3653"/>
+            </a:lvl3pPr>
+            <a:lvl4pPr marL="2087850" indent="0">
+              <a:buNone/>
+              <a:defRPr sz="3044"/>
+            </a:lvl4pPr>
+            <a:lvl5pPr marL="2783799" indent="0">
+              <a:buNone/>
+              <a:defRPr sz="3044"/>
+            </a:lvl5pPr>
+            <a:lvl6pPr marL="3479749" indent="0">
+              <a:buNone/>
+              <a:defRPr sz="3044"/>
+            </a:lvl6pPr>
+            <a:lvl7pPr marL="4175699" indent="0">
+              <a:buNone/>
+              <a:defRPr sz="3044"/>
+            </a:lvl7pPr>
+            <a:lvl8pPr marL="4871649" indent="0">
+              <a:buNone/>
+              <a:defRPr sz="3044"/>
+            </a:lvl8pPr>
+            <a:lvl9pPr marL="5567599" indent="0">
+              <a:buNone/>
+              <a:defRPr sz="3044"/>
+            </a:lvl9pPr>
+          </a:lstStyle>
+          <a:p>
+            <a:r>
+              <a:rPr lang="en-GB"/>
+              <a:t>Click icon to add picture</a:t>
+            </a:r>
+            <a:endParaRPr lang="en-US" dirty="0"/>
+          </a:p>
+        </p:txBody>
+      </p:sp>
+      <p:sp>
+        <p:nvSpPr>
+          <p:cNvPr id="4" name="Text Placeholder 3"/>
+          <p:cNvSpPr>
+            <a:spLocks noGrp="1"/>
+          </p:cNvSpPr>
+          <p:nvPr>
+            <p:ph type="body" sz="half" idx="2"/>
+          </p:nvPr>
+        </p:nvSpPr>
+        <p:spPr>
+          <a:xfrm>
+            <a:off x="1041425" y="3131820"/>
+            <a:ext cx="4876384" cy="5802084"/>
           </a:xfrm>
         </p:spPr>
         <p:txBody>
@@ -2993,109 +2737,42 @@
           <a:lstStyle>
             <a:lvl1pPr marL="0" indent="0">
               <a:buNone/>
-              <a:defRPr sz="3200"/>
+              <a:defRPr sz="2436"/>
             </a:lvl1pPr>
-            <a:lvl2pPr marL="457200" indent="0">
+            <a:lvl2pPr marL="695950" indent="0">
               <a:buNone/>
-              <a:defRPr sz="2800"/>
+              <a:defRPr sz="2131"/>
             </a:lvl2pPr>
-            <a:lvl3pPr marL="914400" indent="0">
+            <a:lvl3pPr marL="1391900" indent="0">
               <a:buNone/>
-              <a:defRPr sz="2400"/>
+              <a:defRPr sz="1827"/>
             </a:lvl3pPr>
-            <a:lvl4pPr marL="1371600" indent="0">
+            <a:lvl4pPr marL="2087850" indent="0">
               <a:buNone/>
-              <a:defRPr sz="2000"/>
+              <a:defRPr sz="1522"/>
             </a:lvl4pPr>
-            <a:lvl5pPr marL="1828800" indent="0">
+            <a:lvl5pPr marL="2783799" indent="0">
               <a:buNone/>
-              <a:defRPr sz="2000"/>
+              <a:defRPr sz="1522"/>
             </a:lvl5pPr>
-            <a:lvl6pPr marL="2286000" indent="0">
+            <a:lvl6pPr marL="3479749" indent="0">
               <a:buNone/>
-              <a:defRPr sz="2000"/>
+              <a:defRPr sz="1522"/>
             </a:lvl6pPr>
-            <a:lvl7pPr marL="2743200" indent="0">
+            <a:lvl7pPr marL="4175699" indent="0">
               <a:buNone/>
-              <a:defRPr sz="2000"/>
+              <a:defRPr sz="1522"/>
             </a:lvl7pPr>
-            <a:lvl8pPr marL="3200400" indent="0">
+            <a:lvl8pPr marL="4871649" indent="0">
               <a:buNone/>
-              <a:defRPr sz="2000"/>
+              <a:defRPr sz="1522"/>
             </a:lvl8pPr>
-            <a:lvl9pPr marL="3657600" indent="0">
+            <a:lvl9pPr marL="5567599" indent="0">
               <a:buNone/>
-              <a:defRPr sz="2000"/>
+              <a:defRPr sz="1522"/>
             </a:lvl9pPr>
           </a:lstStyle>
           <a:p>
-            <a:endParaRPr lang="es-ES"/>
-          </a:p>
-        </p:txBody>
-      </p:sp>
-      <p:sp>
-        <p:nvSpPr>
-          <p:cNvPr id="4" name="Text Placeholder 3">
-            <a:extLst>
-              <a:ext uri="{FF2B5EF4-FFF2-40B4-BE49-F238E27FC236}">
-                <a16:creationId xmlns:a16="http://schemas.microsoft.com/office/drawing/2014/main" id="{7AD3EA5F-0D3B-5D42-B5B9-901399B545F2}"/>
-              </a:ext>
-            </a:extLst>
-          </p:cNvPr>
-          <p:cNvSpPr>
-            <a:spLocks noGrp="1"/>
-          </p:cNvSpPr>
-          <p:nvPr>
-            <p:ph type="body" sz="half" idx="2"/>
-          </p:nvPr>
-        </p:nvSpPr>
-        <p:spPr>
-          <a:xfrm>
-            <a:off x="839788" y="2057400"/>
-            <a:ext cx="3932237" cy="3811588"/>
-          </a:xfrm>
-        </p:spPr>
-        <p:txBody>
-          <a:bodyPr/>
-          <a:lstStyle>
-            <a:lvl1pPr marL="0" indent="0">
-              <a:buNone/>
-              <a:defRPr sz="1600"/>
-            </a:lvl1pPr>
-            <a:lvl2pPr marL="457200" indent="0">
-              <a:buNone/>
-              <a:defRPr sz="1400"/>
-            </a:lvl2pPr>
-            <a:lvl3pPr marL="914400" indent="0">
-              <a:buNone/>
-              <a:defRPr sz="1200"/>
-            </a:lvl3pPr>
-            <a:lvl4pPr marL="1371600" indent="0">
-              <a:buNone/>
-              <a:defRPr sz="1000"/>
-            </a:lvl4pPr>
-            <a:lvl5pPr marL="1828800" indent="0">
-              <a:buNone/>
-              <a:defRPr sz="1000"/>
-            </a:lvl5pPr>
-            <a:lvl6pPr marL="2286000" indent="0">
-              <a:buNone/>
-              <a:defRPr sz="1000"/>
-            </a:lvl6pPr>
-            <a:lvl7pPr marL="2743200" indent="0">
-              <a:buNone/>
-              <a:defRPr sz="1000"/>
-            </a:lvl7pPr>
-            <a:lvl8pPr marL="3200400" indent="0">
-              <a:buNone/>
-              <a:defRPr sz="1000"/>
-            </a:lvl8pPr>
-            <a:lvl9pPr marL="3657600" indent="0">
-              <a:buNone/>
-              <a:defRPr sz="1000"/>
-            </a:lvl9pPr>
-          </a:lstStyle>
-          <a:p>
             <a:pPr lvl="0"/>
             <a:r>
               <a:rPr lang="en-GB"/>
@@ -3106,13 +2783,7 @@
       </p:sp>
       <p:sp>
         <p:nvSpPr>
-          <p:cNvPr id="5" name="Date Placeholder 4">
-            <a:extLst>
-              <a:ext uri="{FF2B5EF4-FFF2-40B4-BE49-F238E27FC236}">
-                <a16:creationId xmlns:a16="http://schemas.microsoft.com/office/drawing/2014/main" id="{F21D5F0E-9CE2-F94F-8945-FDE5326A614D}"/>
-              </a:ext>
-            </a:extLst>
-          </p:cNvPr>
+          <p:cNvPr id="5" name="Date Placeholder 4"/>
           <p:cNvSpPr>
             <a:spLocks noGrp="1"/>
           </p:cNvSpPr>
@@ -3127,7 +2798,7 @@
           <a:p>
             <a:fld id="{F2878C72-540D-B747-AB9D-A738C0927A38}" type="datetimeFigureOut">
               <a:rPr lang="es-ES" smtClean="0"/>
-              <a:t>10/6/20</a:t>
+              <a:t>12/6/20</a:t>
             </a:fld>
             <a:endParaRPr lang="es-ES"/>
           </a:p>
@@ -3135,13 +2806,7 @@
       </p:sp>
       <p:sp>
         <p:nvSpPr>
-          <p:cNvPr id="6" name="Footer Placeholder 5">
-            <a:extLst>
-              <a:ext uri="{FF2B5EF4-FFF2-40B4-BE49-F238E27FC236}">
-                <a16:creationId xmlns:a16="http://schemas.microsoft.com/office/drawing/2014/main" id="{A01790F1-DC56-EA47-A5DE-5E15D15A66BA}"/>
-              </a:ext>
-            </a:extLst>
-          </p:cNvPr>
+          <p:cNvPr id="6" name="Footer Placeholder 5"/>
           <p:cNvSpPr>
             <a:spLocks noGrp="1"/>
           </p:cNvSpPr>
@@ -3160,13 +2825,7 @@
       </p:sp>
       <p:sp>
         <p:nvSpPr>
-          <p:cNvPr id="7" name="Slide Number Placeholder 6">
-            <a:extLst>
-              <a:ext uri="{FF2B5EF4-FFF2-40B4-BE49-F238E27FC236}">
-                <a16:creationId xmlns:a16="http://schemas.microsoft.com/office/drawing/2014/main" id="{606F698B-FB08-3045-8D68-BB8C7311B0A6}"/>
-              </a:ext>
-            </a:extLst>
-          </p:cNvPr>
+          <p:cNvPr id="7" name="Slide Number Placeholder 6"/>
           <p:cNvSpPr>
             <a:spLocks noGrp="1"/>
           </p:cNvSpPr>
@@ -3190,7 +2849,7 @@
     </p:spTree>
     <p:extLst>
       <p:ext uri="{BB962C8B-B14F-4D97-AF65-F5344CB8AC3E}">
-        <p14:creationId xmlns:p14="http://schemas.microsoft.com/office/powerpoint/2010/main" val="1157588269"/>
+        <p14:creationId xmlns:p14="http://schemas.microsoft.com/office/powerpoint/2010/main" val="2946001199"/>
       </p:ext>
     </p:extLst>
   </p:cSld>
@@ -3224,13 +2883,7 @@
       </p:grpSpPr>
       <p:sp>
         <p:nvSpPr>
-          <p:cNvPr id="2" name="Title Placeholder 1">
-            <a:extLst>
-              <a:ext uri="{FF2B5EF4-FFF2-40B4-BE49-F238E27FC236}">
-                <a16:creationId xmlns:a16="http://schemas.microsoft.com/office/drawing/2014/main" id="{64FF73C7-B3D4-9843-82FE-B6F01796B019}"/>
-              </a:ext>
-            </a:extLst>
-          </p:cNvPr>
+          <p:cNvPr id="2" name="Title Placeholder 1"/>
           <p:cNvSpPr>
             <a:spLocks noGrp="1"/>
           </p:cNvSpPr>
@@ -3240,8 +2893,8 @@
         </p:nvSpPr>
         <p:spPr>
           <a:xfrm>
-            <a:off x="838200" y="365125"/>
-            <a:ext cx="10515600" cy="1325563"/>
+            <a:off x="1039456" y="555804"/>
+            <a:ext cx="13040439" cy="2017801"/>
           </a:xfrm>
           <a:prstGeom prst="rect">
             <a:avLst/>
@@ -3257,19 +2910,13 @@
               <a:rPr lang="en-GB"/>
               <a:t>Click to edit Master title style</a:t>
             </a:r>
-            <a:endParaRPr lang="es-ES"/>
-          </a:p>
-        </p:txBody>
-      </p:sp>
-      <p:sp>
-        <p:nvSpPr>
-          <p:cNvPr id="3" name="Text Placeholder 2">
-            <a:extLst>
-              <a:ext uri="{FF2B5EF4-FFF2-40B4-BE49-F238E27FC236}">
-                <a16:creationId xmlns:a16="http://schemas.microsoft.com/office/drawing/2014/main" id="{4BA904DC-1C14-E241-BE3B-9DFEAC08350E}"/>
-              </a:ext>
-            </a:extLst>
-          </p:cNvPr>
+            <a:endParaRPr lang="en-US" dirty="0"/>
+          </a:p>
+        </p:txBody>
+      </p:sp>
+      <p:sp>
+        <p:nvSpPr>
+          <p:cNvPr id="3" name="Text Placeholder 2"/>
           <p:cNvSpPr>
             <a:spLocks noGrp="1"/>
           </p:cNvSpPr>
@@ -3279,8 +2926,8 @@
         </p:nvSpPr>
         <p:spPr>
           <a:xfrm>
-            <a:off x="838200" y="1825625"/>
-            <a:ext cx="10515600" cy="4351338"/>
+            <a:off x="1039456" y="2779007"/>
+            <a:ext cx="13040439" cy="6623703"/>
           </a:xfrm>
           <a:prstGeom prst="rect">
             <a:avLst/>
@@ -3325,19 +2972,13 @@
               <a:rPr lang="en-GB"/>
               <a:t>Fifth level</a:t>
             </a:r>
-            <a:endParaRPr lang="es-ES"/>
-          </a:p>
-        </p:txBody>
-      </p:sp>
-      <p:sp>
-        <p:nvSpPr>
-          <p:cNvPr id="4" name="Date Placeholder 3">
-            <a:extLst>
-              <a:ext uri="{FF2B5EF4-FFF2-40B4-BE49-F238E27FC236}">
-                <a16:creationId xmlns:a16="http://schemas.microsoft.com/office/drawing/2014/main" id="{7004B276-CC05-6846-BCB8-1C4DDF661043}"/>
-              </a:ext>
-            </a:extLst>
-          </p:cNvPr>
+            <a:endParaRPr lang="en-US" dirty="0"/>
+          </a:p>
+        </p:txBody>
+      </p:sp>
+      <p:sp>
+        <p:nvSpPr>
+          <p:cNvPr id="4" name="Date Placeholder 3"/>
           <p:cNvSpPr>
             <a:spLocks noGrp="1"/>
           </p:cNvSpPr>
@@ -3347,8 +2988,8 @@
         </p:nvSpPr>
         <p:spPr>
           <a:xfrm>
-            <a:off x="838200" y="6356350"/>
-            <a:ext cx="2743200" cy="365125"/>
+            <a:off x="1039455" y="9675780"/>
+            <a:ext cx="3401854" cy="555801"/>
           </a:xfrm>
           <a:prstGeom prst="rect">
             <a:avLst/>
@@ -3358,7 +2999,7 @@
           <a:bodyPr vert="horz" lIns="91440" tIns="45720" rIns="91440" bIns="45720" rtlCol="0" anchor="ctr"/>
           <a:lstStyle>
             <a:lvl1pPr algn="l">
-              <a:defRPr sz="1200">
+              <a:defRPr sz="1827">
                 <a:solidFill>
                   <a:schemeClr val="tx1">
                     <a:tint val="75000"/>
@@ -3370,7 +3011,7 @@
           <a:p>
             <a:fld id="{F2878C72-540D-B747-AB9D-A738C0927A38}" type="datetimeFigureOut">
               <a:rPr lang="es-ES" smtClean="0"/>
-              <a:t>10/6/20</a:t>
+              <a:t>12/6/20</a:t>
             </a:fld>
             <a:endParaRPr lang="es-ES"/>
           </a:p>
@@ -3378,13 +3019,7 @@
       </p:sp>
       <p:sp>
         <p:nvSpPr>
-          <p:cNvPr id="5" name="Footer Placeholder 4">
-            <a:extLst>
-              <a:ext uri="{FF2B5EF4-FFF2-40B4-BE49-F238E27FC236}">
-                <a16:creationId xmlns:a16="http://schemas.microsoft.com/office/drawing/2014/main" id="{324F5F99-4E17-A347-A6CF-19CC66298808}"/>
-              </a:ext>
-            </a:extLst>
-          </p:cNvPr>
+          <p:cNvPr id="5" name="Footer Placeholder 4"/>
           <p:cNvSpPr>
             <a:spLocks noGrp="1"/>
           </p:cNvSpPr>
@@ -3394,8 +3029,8 @@
         </p:nvSpPr>
         <p:spPr>
           <a:xfrm>
-            <a:off x="4038600" y="6356350"/>
-            <a:ext cx="4114800" cy="365125"/>
+            <a:off x="5008285" y="9675780"/>
+            <a:ext cx="5102781" cy="555801"/>
           </a:xfrm>
           <a:prstGeom prst="rect">
             <a:avLst/>
@@ -3405,7 +3040,7 @@
           <a:bodyPr vert="horz" lIns="91440" tIns="45720" rIns="91440" bIns="45720" rtlCol="0" anchor="ctr"/>
           <a:lstStyle>
             <a:lvl1pPr algn="ctr">
-              <a:defRPr sz="1200">
+              <a:defRPr sz="1827">
                 <a:solidFill>
                   <a:schemeClr val="tx1">
                     <a:tint val="75000"/>
@@ -3421,13 +3056,7 @@
       </p:sp>
       <p:sp>
         <p:nvSpPr>
-          <p:cNvPr id="6" name="Slide Number Placeholder 5">
-            <a:extLst>
-              <a:ext uri="{FF2B5EF4-FFF2-40B4-BE49-F238E27FC236}">
-                <a16:creationId xmlns:a16="http://schemas.microsoft.com/office/drawing/2014/main" id="{613DB963-DD10-B543-947D-8FD52A19EF88}"/>
-              </a:ext>
-            </a:extLst>
-          </p:cNvPr>
+          <p:cNvPr id="6" name="Slide Number Placeholder 5"/>
           <p:cNvSpPr>
             <a:spLocks noGrp="1"/>
           </p:cNvSpPr>
@@ -3437,8 +3066,8 @@
         </p:nvSpPr>
         <p:spPr>
           <a:xfrm>
-            <a:off x="8610600" y="6356350"/>
-            <a:ext cx="2743200" cy="365125"/>
+            <a:off x="10678041" y="9675780"/>
+            <a:ext cx="3401854" cy="555801"/>
           </a:xfrm>
           <a:prstGeom prst="rect">
             <a:avLst/>
@@ -3448,7 +3077,7 @@
           <a:bodyPr vert="horz" lIns="91440" tIns="45720" rIns="91440" bIns="45720" rtlCol="0" anchor="ctr"/>
           <a:lstStyle>
             <a:lvl1pPr algn="r">
-              <a:defRPr sz="1200">
+              <a:defRPr sz="1827">
                 <a:solidFill>
                   <a:schemeClr val="tx1">
                     <a:tint val="75000"/>
@@ -3469,27 +3098,27 @@
     </p:spTree>
     <p:extLst>
       <p:ext uri="{BB962C8B-B14F-4D97-AF65-F5344CB8AC3E}">
-        <p14:creationId xmlns:p14="http://schemas.microsoft.com/office/powerpoint/2010/main" val="257100654"/>
+        <p14:creationId xmlns:p14="http://schemas.microsoft.com/office/powerpoint/2010/main" val="3453750033"/>
       </p:ext>
     </p:extLst>
   </p:cSld>
   <p:clrMap bg1="lt1" tx1="dk1" bg2="lt2" tx2="dk2" accent1="accent1" accent2="accent2" accent3="accent3" accent4="accent4" accent5="accent5" accent6="accent6" hlink="hlink" folHlink="folHlink"/>
   <p:sldLayoutIdLst>
-    <p:sldLayoutId id="2147483649" r:id="rId1"/>
-    <p:sldLayoutId id="2147483650" r:id="rId2"/>
-    <p:sldLayoutId id="2147483651" r:id="rId3"/>
-    <p:sldLayoutId id="2147483652" r:id="rId4"/>
-    <p:sldLayoutId id="2147483653" r:id="rId5"/>
-    <p:sldLayoutId id="2147483654" r:id="rId6"/>
-    <p:sldLayoutId id="2147483655" r:id="rId7"/>
-    <p:sldLayoutId id="2147483656" r:id="rId8"/>
-    <p:sldLayoutId id="2147483657" r:id="rId9"/>
-    <p:sldLayoutId id="2147483658" r:id="rId10"/>
-    <p:sldLayoutId id="2147483659" r:id="rId11"/>
+    <p:sldLayoutId id="2147483661" r:id="rId1"/>
+    <p:sldLayoutId id="2147483662" r:id="rId2"/>
+    <p:sldLayoutId id="2147483663" r:id="rId3"/>
+    <p:sldLayoutId id="2147483664" r:id="rId4"/>
+    <p:sldLayoutId id="2147483665" r:id="rId5"/>
+    <p:sldLayoutId id="2147483666" r:id="rId6"/>
+    <p:sldLayoutId id="2147483667" r:id="rId7"/>
+    <p:sldLayoutId id="2147483668" r:id="rId8"/>
+    <p:sldLayoutId id="2147483669" r:id="rId9"/>
+    <p:sldLayoutId id="2147483670" r:id="rId10"/>
+    <p:sldLayoutId id="2147483671" r:id="rId11"/>
   </p:sldLayoutIdLst>
   <p:txStyles>
     <p:titleStyle>
-      <a:lvl1pPr algn="l" defTabSz="914400" rtl="0" eaLnBrk="1" latinLnBrk="0" hangingPunct="1">
+      <a:lvl1pPr algn="l" defTabSz="1391900" rtl="0" eaLnBrk="1" latinLnBrk="0" hangingPunct="1">
         <a:lnSpc>
           <a:spcPct val="90000"/>
         </a:lnSpc>
@@ -3497,7 +3126,7 @@
           <a:spcPct val="0"/>
         </a:spcBef>
         <a:buNone/>
-        <a:defRPr sz="4400" kern="1200">
+        <a:defRPr sz="6698" kern="1200">
           <a:solidFill>
             <a:schemeClr val="tx1"/>
           </a:solidFill>
@@ -3508,16 +3137,16 @@
       </a:lvl1pPr>
     </p:titleStyle>
     <p:bodyStyle>
-      <a:lvl1pPr marL="228600" indent="-228600" algn="l" defTabSz="914400" rtl="0" eaLnBrk="1" latinLnBrk="0" hangingPunct="1">
+      <a:lvl1pPr marL="347975" indent="-347975" algn="l" defTabSz="1391900" rtl="0" eaLnBrk="1" latinLnBrk="0" hangingPunct="1">
         <a:lnSpc>
           <a:spcPct val="90000"/>
         </a:lnSpc>
         <a:spcBef>
-          <a:spcPts val="1000"/>
+          <a:spcPts val="1522"/>
         </a:spcBef>
         <a:buFont typeface="Arial" panose="020B0604020202020204" pitchFamily="34" charset="0"/>
         <a:buChar char="•"/>
-        <a:defRPr sz="2800" kern="1200">
+        <a:defRPr sz="4262" kern="1200">
           <a:solidFill>
             <a:schemeClr val="tx1"/>
           </a:solidFill>
@@ -3526,16 +3155,16 @@
           <a:cs typeface="+mn-cs"/>
         </a:defRPr>
       </a:lvl1pPr>
-      <a:lvl2pPr marL="685800" indent="-228600" algn="l" defTabSz="914400" rtl="0" eaLnBrk="1" latinLnBrk="0" hangingPunct="1">
+      <a:lvl2pPr marL="1043925" indent="-347975" algn="l" defTabSz="1391900" rtl="0" eaLnBrk="1" latinLnBrk="0" hangingPunct="1">
         <a:lnSpc>
           <a:spcPct val="90000"/>
         </a:lnSpc>
         <a:spcBef>
-          <a:spcPts val="500"/>
+          <a:spcPts val="761"/>
         </a:spcBef>
         <a:buFont typeface="Arial" panose="020B0604020202020204" pitchFamily="34" charset="0"/>
         <a:buChar char="•"/>
-        <a:defRPr sz="2400" kern="1200">
+        <a:defRPr sz="3653" kern="1200">
           <a:solidFill>
             <a:schemeClr val="tx1"/>
           </a:solidFill>
@@ -3544,16 +3173,16 @@
           <a:cs typeface="+mn-cs"/>
         </a:defRPr>
       </a:lvl2pPr>
-      <a:lvl3pPr marL="1143000" indent="-228600" algn="l" defTabSz="914400" rtl="0" eaLnBrk="1" latinLnBrk="0" hangingPunct="1">
+      <a:lvl3pPr marL="1739875" indent="-347975" algn="l" defTabSz="1391900" rtl="0" eaLnBrk="1" latinLnBrk="0" hangingPunct="1">
         <a:lnSpc>
           <a:spcPct val="90000"/>
         </a:lnSpc>
         <a:spcBef>
-          <a:spcPts val="500"/>
+          <a:spcPts val="761"/>
         </a:spcBef>
         <a:buFont typeface="Arial" panose="020B0604020202020204" pitchFamily="34" charset="0"/>
         <a:buChar char="•"/>
-        <a:defRPr sz="2000" kern="1200">
+        <a:defRPr sz="3044" kern="1200">
           <a:solidFill>
             <a:schemeClr val="tx1"/>
           </a:solidFill>
@@ -3562,16 +3191,16 @@
           <a:cs typeface="+mn-cs"/>
         </a:defRPr>
       </a:lvl3pPr>
-      <a:lvl4pPr marL="1600200" indent="-228600" algn="l" defTabSz="914400" rtl="0" eaLnBrk="1" latinLnBrk="0" hangingPunct="1">
+      <a:lvl4pPr marL="2435824" indent="-347975" algn="l" defTabSz="1391900" rtl="0" eaLnBrk="1" latinLnBrk="0" hangingPunct="1">
         <a:lnSpc>
           <a:spcPct val="90000"/>
         </a:lnSpc>
         <a:spcBef>
-          <a:spcPts val="500"/>
+          <a:spcPts val="761"/>
         </a:spcBef>
         <a:buFont typeface="Arial" panose="020B0604020202020204" pitchFamily="34" charset="0"/>
         <a:buChar char="•"/>
-        <a:defRPr sz="1800" kern="1200">
+        <a:defRPr sz="2740" kern="1200">
           <a:solidFill>
             <a:schemeClr val="tx1"/>
           </a:solidFill>
@@ -3580,16 +3209,16 @@
           <a:cs typeface="+mn-cs"/>
         </a:defRPr>
       </a:lvl4pPr>
-      <a:lvl5pPr marL="2057400" indent="-228600" algn="l" defTabSz="914400" rtl="0" eaLnBrk="1" latinLnBrk="0" hangingPunct="1">
+      <a:lvl5pPr marL="3131774" indent="-347975" algn="l" defTabSz="1391900" rtl="0" eaLnBrk="1" latinLnBrk="0" hangingPunct="1">
         <a:lnSpc>
           <a:spcPct val="90000"/>
         </a:lnSpc>
         <a:spcBef>
-          <a:spcPts val="500"/>
+          <a:spcPts val="761"/>
         </a:spcBef>
         <a:buFont typeface="Arial" panose="020B0604020202020204" pitchFamily="34" charset="0"/>
         <a:buChar char="•"/>
-        <a:defRPr sz="1800" kern="1200">
+        <a:defRPr sz="2740" kern="1200">
           <a:solidFill>
             <a:schemeClr val="tx1"/>
           </a:solidFill>
@@ -3598,16 +3227,16 @@
           <a:cs typeface="+mn-cs"/>
         </a:defRPr>
       </a:lvl5pPr>
-      <a:lvl6pPr marL="2514600" indent="-228600" algn="l" defTabSz="914400" rtl="0" eaLnBrk="1" latinLnBrk="0" hangingPunct="1">
+      <a:lvl6pPr marL="3827724" indent="-347975" algn="l" defTabSz="1391900" rtl="0" eaLnBrk="1" latinLnBrk="0" hangingPunct="1">
         <a:lnSpc>
           <a:spcPct val="90000"/>
         </a:lnSpc>
         <a:spcBef>
-          <a:spcPts val="500"/>
+          <a:spcPts val="761"/>
         </a:spcBef>
         <a:buFont typeface="Arial" panose="020B0604020202020204" pitchFamily="34" charset="0"/>
         <a:buChar char="•"/>
-        <a:defRPr sz="1800" kern="1200">
+        <a:defRPr sz="2740" kern="1200">
           <a:solidFill>
             <a:schemeClr val="tx1"/>
           </a:solidFill>
@@ -3616,16 +3245,16 @@
           <a:cs typeface="+mn-cs"/>
         </a:defRPr>
       </a:lvl6pPr>
-      <a:lvl7pPr marL="2971800" indent="-228600" algn="l" defTabSz="914400" rtl="0" eaLnBrk="1" latinLnBrk="0" hangingPunct="1">
+      <a:lvl7pPr marL="4523674" indent="-347975" algn="l" defTabSz="1391900" rtl="0" eaLnBrk="1" latinLnBrk="0" hangingPunct="1">
         <a:lnSpc>
           <a:spcPct val="90000"/>
         </a:lnSpc>
         <a:spcBef>
-          <a:spcPts val="500"/>
+          <a:spcPts val="761"/>
         </a:spcBef>
         <a:buFont typeface="Arial" panose="020B0604020202020204" pitchFamily="34" charset="0"/>
         <a:buChar char="•"/>
-        <a:defRPr sz="1800" kern="1200">
+        <a:defRPr sz="2740" kern="1200">
           <a:solidFill>
             <a:schemeClr val="tx1"/>
           </a:solidFill>
@@ -3634,16 +3263,16 @@
           <a:cs typeface="+mn-cs"/>
         </a:defRPr>
       </a:lvl7pPr>
-      <a:lvl8pPr marL="3429000" indent="-228600" algn="l" defTabSz="914400" rtl="0" eaLnBrk="1" latinLnBrk="0" hangingPunct="1">
+      <a:lvl8pPr marL="5219624" indent="-347975" algn="l" defTabSz="1391900" rtl="0" eaLnBrk="1" latinLnBrk="0" hangingPunct="1">
         <a:lnSpc>
           <a:spcPct val="90000"/>
         </a:lnSpc>
         <a:spcBef>
-          <a:spcPts val="500"/>
+          <a:spcPts val="761"/>
         </a:spcBef>
         <a:buFont typeface="Arial" panose="020B0604020202020204" pitchFamily="34" charset="0"/>
         <a:buChar char="•"/>
-        <a:defRPr sz="1800" kern="1200">
+        <a:defRPr sz="2740" kern="1200">
           <a:solidFill>
             <a:schemeClr val="tx1"/>
           </a:solidFill>
@@ -3652,16 +3281,16 @@
           <a:cs typeface="+mn-cs"/>
         </a:defRPr>
       </a:lvl8pPr>
-      <a:lvl9pPr marL="3886200" indent="-228600" algn="l" defTabSz="914400" rtl="0" eaLnBrk="1" latinLnBrk="0" hangingPunct="1">
+      <a:lvl9pPr marL="5915574" indent="-347975" algn="l" defTabSz="1391900" rtl="0" eaLnBrk="1" latinLnBrk="0" hangingPunct="1">
         <a:lnSpc>
           <a:spcPct val="90000"/>
         </a:lnSpc>
         <a:spcBef>
-          <a:spcPts val="500"/>
+          <a:spcPts val="761"/>
         </a:spcBef>
         <a:buFont typeface="Arial" panose="020B0604020202020204" pitchFamily="34" charset="0"/>
         <a:buChar char="•"/>
-        <a:defRPr sz="1800" kern="1200">
+        <a:defRPr sz="2740" kern="1200">
           <a:solidFill>
             <a:schemeClr val="tx1"/>
           </a:solidFill>
@@ -3673,10 +3302,10 @@
     </p:bodyStyle>
     <p:otherStyle>
       <a:defPPr>
-        <a:defRPr lang="es-ES"/>
+        <a:defRPr lang="en-US"/>
       </a:defPPr>
-      <a:lvl1pPr marL="0" algn="l" defTabSz="914400" rtl="0" eaLnBrk="1" latinLnBrk="0" hangingPunct="1">
-        <a:defRPr sz="1800" kern="1200">
+      <a:lvl1pPr marL="0" algn="l" defTabSz="1391900" rtl="0" eaLnBrk="1" latinLnBrk="0" hangingPunct="1">
+        <a:defRPr sz="2740" kern="1200">
           <a:solidFill>
             <a:schemeClr val="tx1"/>
           </a:solidFill>
@@ -3685,8 +3314,8 @@
           <a:cs typeface="+mn-cs"/>
         </a:defRPr>
       </a:lvl1pPr>
-      <a:lvl2pPr marL="457200" algn="l" defTabSz="914400" rtl="0" eaLnBrk="1" latinLnBrk="0" hangingPunct="1">
-        <a:defRPr sz="1800" kern="1200">
+      <a:lvl2pPr marL="695950" algn="l" defTabSz="1391900" rtl="0" eaLnBrk="1" latinLnBrk="0" hangingPunct="1">
+        <a:defRPr sz="2740" kern="1200">
           <a:solidFill>
             <a:schemeClr val="tx1"/>
           </a:solidFill>
@@ -3695,8 +3324,8 @@
           <a:cs typeface="+mn-cs"/>
         </a:defRPr>
       </a:lvl2pPr>
-      <a:lvl3pPr marL="914400" algn="l" defTabSz="914400" rtl="0" eaLnBrk="1" latinLnBrk="0" hangingPunct="1">
-        <a:defRPr sz="1800" kern="1200">
+      <a:lvl3pPr marL="1391900" algn="l" defTabSz="1391900" rtl="0" eaLnBrk="1" latinLnBrk="0" hangingPunct="1">
+        <a:defRPr sz="2740" kern="1200">
           <a:solidFill>
             <a:schemeClr val="tx1"/>
           </a:solidFill>
@@ -3705,8 +3334,8 @@
           <a:cs typeface="+mn-cs"/>
         </a:defRPr>
       </a:lvl3pPr>
-      <a:lvl4pPr marL="1371600" algn="l" defTabSz="914400" rtl="0" eaLnBrk="1" latinLnBrk="0" hangingPunct="1">
-        <a:defRPr sz="1800" kern="1200">
+      <a:lvl4pPr marL="2087850" algn="l" defTabSz="1391900" rtl="0" eaLnBrk="1" latinLnBrk="0" hangingPunct="1">
+        <a:defRPr sz="2740" kern="1200">
           <a:solidFill>
             <a:schemeClr val="tx1"/>
           </a:solidFill>
@@ -3715,8 +3344,8 @@
           <a:cs typeface="+mn-cs"/>
         </a:defRPr>
       </a:lvl4pPr>
-      <a:lvl5pPr marL="1828800" algn="l" defTabSz="914400" rtl="0" eaLnBrk="1" latinLnBrk="0" hangingPunct="1">
-        <a:defRPr sz="1800" kern="1200">
+      <a:lvl5pPr marL="2783799" algn="l" defTabSz="1391900" rtl="0" eaLnBrk="1" latinLnBrk="0" hangingPunct="1">
+        <a:defRPr sz="2740" kern="1200">
           <a:solidFill>
             <a:schemeClr val="tx1"/>
           </a:solidFill>
@@ -3725,8 +3354,8 @@
           <a:cs typeface="+mn-cs"/>
         </a:defRPr>
       </a:lvl5pPr>
-      <a:lvl6pPr marL="2286000" algn="l" defTabSz="914400" rtl="0" eaLnBrk="1" latinLnBrk="0" hangingPunct="1">
-        <a:defRPr sz="1800" kern="1200">
+      <a:lvl6pPr marL="3479749" algn="l" defTabSz="1391900" rtl="0" eaLnBrk="1" latinLnBrk="0" hangingPunct="1">
+        <a:defRPr sz="2740" kern="1200">
           <a:solidFill>
             <a:schemeClr val="tx1"/>
           </a:solidFill>
@@ -3735,8 +3364,8 @@
           <a:cs typeface="+mn-cs"/>
         </a:defRPr>
       </a:lvl6pPr>
-      <a:lvl7pPr marL="2743200" algn="l" defTabSz="914400" rtl="0" eaLnBrk="1" latinLnBrk="0" hangingPunct="1">
-        <a:defRPr sz="1800" kern="1200">
+      <a:lvl7pPr marL="4175699" algn="l" defTabSz="1391900" rtl="0" eaLnBrk="1" latinLnBrk="0" hangingPunct="1">
+        <a:defRPr sz="2740" kern="1200">
           <a:solidFill>
             <a:schemeClr val="tx1"/>
           </a:solidFill>
@@ -3745,8 +3374,8 @@
           <a:cs typeface="+mn-cs"/>
         </a:defRPr>
       </a:lvl7pPr>
-      <a:lvl8pPr marL="3200400" algn="l" defTabSz="914400" rtl="0" eaLnBrk="1" latinLnBrk="0" hangingPunct="1">
-        <a:defRPr sz="1800" kern="1200">
+      <a:lvl8pPr marL="4871649" algn="l" defTabSz="1391900" rtl="0" eaLnBrk="1" latinLnBrk="0" hangingPunct="1">
+        <a:defRPr sz="2740" kern="1200">
           <a:solidFill>
             <a:schemeClr val="tx1"/>
           </a:solidFill>
@@ -3755,8 +3384,8 @@
           <a:cs typeface="+mn-cs"/>
         </a:defRPr>
       </a:lvl8pPr>
-      <a:lvl9pPr marL="3657600" algn="l" defTabSz="914400" rtl="0" eaLnBrk="1" latinLnBrk="0" hangingPunct="1">
-        <a:defRPr sz="1800" kern="1200">
+      <a:lvl9pPr marL="5567599" algn="l" defTabSz="1391900" rtl="0" eaLnBrk="1" latinLnBrk="0" hangingPunct="1">
+        <a:defRPr sz="2740" kern="1200">
           <a:solidFill>
             <a:schemeClr val="tx1"/>
           </a:solidFill>
@@ -3787,6 +3416,74 @@
           <a:chExt cx="0" cy="0"/>
         </a:xfrm>
       </p:grpSpPr>
+      <p:pic>
+        <p:nvPicPr>
+          <p:cNvPr id="5" name="Picture 4">
+            <a:extLst>
+              <a:ext uri="{FF2B5EF4-FFF2-40B4-BE49-F238E27FC236}">
+                <a16:creationId xmlns:a16="http://schemas.microsoft.com/office/drawing/2014/main" id="{C1FE5BC9-FCC5-3E46-B223-6931924D1A80}"/>
+              </a:ext>
+            </a:extLst>
+          </p:cNvPr>
+          <p:cNvPicPr>
+            <a:picLocks noChangeAspect="1"/>
+          </p:cNvPicPr>
+          <p:nvPr/>
+        </p:nvPicPr>
+        <p:blipFill>
+          <a:blip r:embed="rId3"/>
+          <a:stretch>
+            <a:fillRect/>
+          </a:stretch>
+        </p:blipFill>
+        <p:spPr>
+          <a:xfrm>
+            <a:off x="723930" y="796723"/>
+            <a:ext cx="8429262" cy="7928343"/>
+          </a:xfrm>
+          <a:prstGeom prst="rect">
+            <a:avLst/>
+          </a:prstGeom>
+        </p:spPr>
+      </p:pic>
+      <p:sp>
+        <p:nvSpPr>
+          <p:cNvPr id="80" name="TextBox 79">
+            <a:extLst>
+              <a:ext uri="{FF2B5EF4-FFF2-40B4-BE49-F238E27FC236}">
+                <a16:creationId xmlns:a16="http://schemas.microsoft.com/office/drawing/2014/main" id="{533D2B7C-E247-C04A-942D-0D7096FF3392}"/>
+              </a:ext>
+            </a:extLst>
+          </p:cNvPr>
+          <p:cNvSpPr txBox="1"/>
+          <p:nvPr/>
+        </p:nvSpPr>
+        <p:spPr>
+          <a:xfrm>
+            <a:off x="155674" y="0"/>
+            <a:ext cx="475475" cy="584775"/>
+          </a:xfrm>
+          <a:prstGeom prst="rect">
+            <a:avLst/>
+          </a:prstGeom>
+          <a:noFill/>
+        </p:spPr>
+        <p:txBody>
+          <a:bodyPr wrap="square" rtlCol="0">
+            <a:spAutoFit/>
+          </a:bodyPr>
+          <a:lstStyle/>
+          <a:p>
+            <a:r>
+              <a:rPr lang="es-ES" sz="3200" b="1" dirty="0">
+                <a:latin typeface="Arial" panose="020B0604020202020204" pitchFamily="34" charset="0"/>
+                <a:cs typeface="Arial" panose="020B0604020202020204" pitchFamily="34" charset="0"/>
+              </a:rPr>
+              <a:t>a</a:t>
+            </a:r>
+          </a:p>
+        </p:txBody>
+      </p:sp>
       <p:cxnSp>
         <p:nvCxnSpPr>
           <p:cNvPr id="56" name="Straight Connector 55">
@@ -3804,9 +3501,9 @@
           <p:nvPr/>
         </p:nvCxnSpPr>
         <p:spPr>
-          <a:xfrm flipH="1">
-            <a:off x="7712803" y="1723524"/>
-            <a:ext cx="5809" cy="3592716"/>
+          <a:xfrm>
+            <a:off x="10892480" y="1700690"/>
+            <a:ext cx="0" cy="5469908"/>
           </a:xfrm>
           <a:prstGeom prst="line">
             <a:avLst/>
@@ -3846,13 +3543,15 @@
           </p:cNvPr>
           <p:cNvCxnSpPr>
             <a:cxnSpLocks/>
+            <a:stCxn id="9" idx="2"/>
+            <a:endCxn id="12" idx="0"/>
           </p:cNvCxnSpPr>
           <p:nvPr/>
         </p:nvCxnSpPr>
         <p:spPr>
-          <a:xfrm>
-            <a:off x="7026723" y="1660124"/>
-            <a:ext cx="1" cy="1507876"/>
+          <a:xfrm flipH="1">
+            <a:off x="9848223" y="1684154"/>
+            <a:ext cx="1" cy="2490362"/>
           </a:xfrm>
           <a:prstGeom prst="line">
             <a:avLst/>
@@ -3881,36 +3580,6 @@
           </a:fontRef>
         </p:style>
       </p:cxnSp>
-      <p:pic>
-        <p:nvPicPr>
-          <p:cNvPr id="5" name="Picture 4">
-            <a:extLst>
-              <a:ext uri="{FF2B5EF4-FFF2-40B4-BE49-F238E27FC236}">
-                <a16:creationId xmlns:a16="http://schemas.microsoft.com/office/drawing/2014/main" id="{C1FE5BC9-FCC5-3E46-B223-6931924D1A80}"/>
-              </a:ext>
-            </a:extLst>
-          </p:cNvPr>
-          <p:cNvPicPr>
-            <a:picLocks noChangeAspect="1"/>
-          </p:cNvPicPr>
-          <p:nvPr/>
-        </p:nvPicPr>
-        <p:blipFill>
-          <a:blip r:embed="rId3"/>
-          <a:stretch>
-            <a:fillRect/>
-          </a:stretch>
-        </p:blipFill>
-        <p:spPr>
-          <a:xfrm>
-            <a:off x="129713" y="585371"/>
-            <a:ext cx="6197600" cy="5829300"/>
-          </a:xfrm>
-          <a:prstGeom prst="rect">
-            <a:avLst/>
-          </a:prstGeom>
-        </p:spPr>
-      </p:pic>
       <p:sp>
         <p:nvSpPr>
           <p:cNvPr id="8" name="TextBox 7">
@@ -3925,7 +3594,7 @@
         </p:nvSpPr>
         <p:spPr>
           <a:xfrm>
-            <a:off x="6739743" y="2348564"/>
+            <a:off x="9549013" y="3360146"/>
             <a:ext cx="609462" cy="307777"/>
           </a:xfrm>
           <a:prstGeom prst="rect">
@@ -3976,8 +3645,8 @@
         </p:nvSpPr>
         <p:spPr>
           <a:xfrm>
-            <a:off x="6427928" y="1292637"/>
-            <a:ext cx="1020021" cy="430887"/>
+            <a:off x="9338213" y="1160934"/>
+            <a:ext cx="1020021" cy="523220"/>
           </a:xfrm>
           <a:prstGeom prst="rect">
             <a:avLst/>
@@ -3994,28 +3663,28 @@
           <a:p>
             <a:pPr algn="ctr"/>
             <a:r>
-              <a:rPr lang="es-ES" sz="1100" b="1" dirty="0" err="1">
+              <a:rPr lang="es-ES" sz="1400" b="1" dirty="0" err="1">
                 <a:latin typeface="Arial" panose="020B0604020202020204" pitchFamily="34" charset="0"/>
                 <a:cs typeface="Arial" panose="020B0604020202020204" pitchFamily="34" charset="0"/>
               </a:rPr>
               <a:t>Climate</a:t>
             </a:r>
             <a:r>
-              <a:rPr lang="es-ES" sz="1100" b="1" dirty="0">
+              <a:rPr lang="es-ES" sz="1400" b="1" dirty="0">
                 <a:latin typeface="Arial" panose="020B0604020202020204" pitchFamily="34" charset="0"/>
                 <a:cs typeface="Arial" panose="020B0604020202020204" pitchFamily="34" charset="0"/>
               </a:rPr>
               <a:t> </a:t>
             </a:r>
             <a:r>
-              <a:rPr lang="es-ES" sz="1100" b="1" dirty="0" err="1">
+              <a:rPr lang="es-ES" sz="1400" b="1" dirty="0" err="1">
                 <a:latin typeface="Arial" panose="020B0604020202020204" pitchFamily="34" charset="0"/>
                 <a:cs typeface="Arial" panose="020B0604020202020204" pitchFamily="34" charset="0"/>
               </a:rPr>
               <a:t>impacts</a:t>
             </a:r>
             <a:r>
-              <a:rPr lang="es-ES" sz="1100" b="1" dirty="0">
+              <a:rPr lang="es-ES" sz="1400" b="1" dirty="0">
                 <a:latin typeface="Arial" panose="020B0604020202020204" pitchFamily="34" charset="0"/>
                 <a:cs typeface="Arial" panose="020B0604020202020204" pitchFamily="34" charset="0"/>
               </a:rPr>
@@ -4038,8 +3707,8 @@
         </p:nvSpPr>
         <p:spPr>
           <a:xfrm>
-            <a:off x="6305268" y="3123780"/>
-            <a:ext cx="1460656" cy="461665"/>
+            <a:off x="9194839" y="4174516"/>
+            <a:ext cx="1306768" cy="738664"/>
           </a:xfrm>
           <a:prstGeom prst="rect">
             <a:avLst/>
@@ -4054,7 +3723,7 @@
           <a:p>
             <a:pPr algn="ctr"/>
             <a:r>
-              <a:rPr lang="es-ES" sz="1200" b="1" dirty="0">
+              <a:rPr lang="es-ES" sz="1400" b="1" dirty="0">
                 <a:latin typeface="Arial" panose="020B0604020202020204" pitchFamily="34" charset="0"/>
                 <a:cs typeface="Arial" panose="020B0604020202020204" pitchFamily="34" charset="0"/>
               </a:rPr>
@@ -4064,27 +3733,30 @@
           <a:p>
             <a:pPr algn="ctr"/>
             <a:r>
-              <a:rPr lang="es-ES" sz="1200" b="1" dirty="0" err="1">
+              <a:rPr lang="es-ES" sz="1400" b="1" dirty="0" err="1">
                 <a:latin typeface="Arial" panose="020B0604020202020204" pitchFamily="34" charset="0"/>
                 <a:cs typeface="Arial" panose="020B0604020202020204" pitchFamily="34" charset="0"/>
               </a:rPr>
               <a:t>site</a:t>
             </a:r>
             <a:r>
-              <a:rPr lang="es-ES" sz="1200" b="1" dirty="0">
+              <a:rPr lang="es-ES" sz="1400" b="1" dirty="0">
                 <a:latin typeface="Arial" panose="020B0604020202020204" pitchFamily="34" charset="0"/>
                 <a:cs typeface="Arial" panose="020B0604020202020204" pitchFamily="34" charset="0"/>
               </a:rPr>
               <a:t> </a:t>
             </a:r>
-            <a:r>
-              <a:rPr lang="es-ES" sz="1200" b="1" dirty="0" err="1">
+          </a:p>
+          <a:p>
+            <a:pPr algn="ctr"/>
+            <a:r>
+              <a:rPr lang="es-ES" sz="1400" b="1" dirty="0" err="1">
                 <a:latin typeface="Arial" panose="020B0604020202020204" pitchFamily="34" charset="0"/>
                 <a:cs typeface="Arial" panose="020B0604020202020204" pitchFamily="34" charset="0"/>
               </a:rPr>
               <a:t>chronologies</a:t>
             </a:r>
-            <a:endParaRPr lang="es-ES" sz="1200" b="1" dirty="0">
+            <a:endParaRPr lang="es-ES" sz="1400" b="1" dirty="0">
               <a:latin typeface="Arial" panose="020B0604020202020204" pitchFamily="34" charset="0"/>
               <a:cs typeface="Arial" panose="020B0604020202020204" pitchFamily="34" charset="0"/>
             </a:endParaRPr>
@@ -4105,8 +3777,8 @@
         </p:nvSpPr>
         <p:spPr>
           <a:xfrm>
-            <a:off x="7087964" y="1292637"/>
-            <a:ext cx="1261295" cy="430887"/>
+            <a:off x="10151734" y="1177470"/>
+            <a:ext cx="1481492" cy="523220"/>
           </a:xfrm>
           <a:prstGeom prst="rect">
             <a:avLst/>
@@ -4121,34 +3793,34 @@
           <a:p>
             <a:pPr algn="ctr"/>
             <a:r>
-              <a:rPr lang="es-ES" sz="1100" b="1" dirty="0">
+              <a:rPr lang="es-ES" sz="1400" b="1" dirty="0">
                 <a:latin typeface="Arial" panose="020B0604020202020204" pitchFamily="34" charset="0"/>
                 <a:cs typeface="Arial" panose="020B0604020202020204" pitchFamily="34" charset="0"/>
               </a:rPr>
               <a:t>Non-</a:t>
             </a:r>
             <a:r>
-              <a:rPr lang="es-ES" sz="1100" b="1" dirty="0" err="1">
+              <a:rPr lang="es-ES" sz="1400" b="1" dirty="0" err="1">
                 <a:latin typeface="Arial" panose="020B0604020202020204" pitchFamily="34" charset="0"/>
                 <a:cs typeface="Arial" panose="020B0604020202020204" pitchFamily="34" charset="0"/>
               </a:rPr>
               <a:t>climatic</a:t>
             </a:r>
             <a:r>
-              <a:rPr lang="es-ES" sz="1100" b="1" dirty="0">
+              <a:rPr lang="es-ES" sz="1400" b="1" dirty="0">
                 <a:latin typeface="Arial" panose="020B0604020202020204" pitchFamily="34" charset="0"/>
                 <a:cs typeface="Arial" panose="020B0604020202020204" pitchFamily="34" charset="0"/>
               </a:rPr>
               <a:t> </a:t>
             </a:r>
             <a:r>
-              <a:rPr lang="es-ES" sz="1100" b="1" dirty="0" err="1">
+              <a:rPr lang="es-ES" sz="1400" b="1" dirty="0" err="1">
                 <a:latin typeface="Arial" panose="020B0604020202020204" pitchFamily="34" charset="0"/>
                 <a:cs typeface="Arial" panose="020B0604020202020204" pitchFamily="34" charset="0"/>
               </a:rPr>
               <a:t>disturbances</a:t>
             </a:r>
-            <a:endParaRPr lang="es-ES" sz="1100" b="1" dirty="0">
+            <a:endParaRPr lang="es-ES" sz="1400" b="1" dirty="0">
               <a:latin typeface="Arial" panose="020B0604020202020204" pitchFamily="34" charset="0"/>
               <a:cs typeface="Arial" panose="020B0604020202020204" pitchFamily="34" charset="0"/>
             </a:endParaRPr>
@@ -4169,7 +3841,7 @@
         </p:nvSpPr>
         <p:spPr>
           <a:xfrm>
-            <a:off x="6568445" y="2725337"/>
+            <a:off x="9436096" y="3822196"/>
             <a:ext cx="217234" cy="217234"/>
           </a:xfrm>
           <a:prstGeom prst="ellipse">
@@ -4229,7 +3901,7 @@
         </p:nvSpPr>
         <p:spPr>
           <a:xfrm>
-            <a:off x="9499796" y="2831923"/>
+            <a:off x="12495756" y="3930813"/>
             <a:ext cx="217234" cy="217234"/>
           </a:xfrm>
           <a:prstGeom prst="ellipse">
@@ -4289,8 +3961,8 @@
         </p:nvSpPr>
         <p:spPr>
           <a:xfrm>
-            <a:off x="6997962" y="4307746"/>
-            <a:ext cx="1441299" cy="553998"/>
+            <a:off x="10069236" y="5858984"/>
+            <a:ext cx="1664238" cy="738664"/>
           </a:xfrm>
           <a:prstGeom prst="rect">
             <a:avLst/>
@@ -4307,7 +3979,7 @@
           <a:p>
             <a:pPr algn="ctr"/>
             <a:r>
-              <a:rPr lang="es-ES" sz="1200" b="1" dirty="0">
+              <a:rPr lang="es-ES" sz="1400" b="1" dirty="0">
                 <a:latin typeface="Arial" panose="020B0604020202020204" pitchFamily="34" charset="0"/>
                 <a:cs typeface="Arial" panose="020B0604020202020204" pitchFamily="34" charset="0"/>
               </a:rPr>
@@ -4317,27 +3989,27 @@
           <a:p>
             <a:pPr algn="ctr"/>
             <a:r>
-              <a:rPr lang="es-ES" sz="900" b="1" dirty="0" err="1">
+              <a:rPr lang="es-ES" sz="1400" b="1" dirty="0" err="1">
                 <a:latin typeface="Arial" panose="020B0604020202020204" pitchFamily="34" charset="0"/>
                 <a:cs typeface="Arial" panose="020B0604020202020204" pitchFamily="34" charset="0"/>
               </a:rPr>
               <a:t>site-disturbance</a:t>
             </a:r>
             <a:r>
-              <a:rPr lang="es-ES" sz="900" b="1" dirty="0">
+              <a:rPr lang="es-ES" sz="1400" b="1" dirty="0">
                 <a:latin typeface="Arial" panose="020B0604020202020204" pitchFamily="34" charset="0"/>
                 <a:cs typeface="Arial" panose="020B0604020202020204" pitchFamily="34" charset="0"/>
               </a:rPr>
               <a:t> </a:t>
             </a:r>
             <a:r>
-              <a:rPr lang="es-ES" sz="900" b="1" dirty="0" err="1">
+              <a:rPr lang="es-ES" sz="1400" b="1" dirty="0" err="1">
                 <a:latin typeface="Arial" panose="020B0604020202020204" pitchFamily="34" charset="0"/>
                 <a:cs typeface="Arial" panose="020B0604020202020204" pitchFamily="34" charset="0"/>
               </a:rPr>
               <a:t>chronologies</a:t>
             </a:r>
-            <a:endParaRPr lang="es-ES" sz="900" b="1" dirty="0">
+            <a:endParaRPr lang="es-ES" sz="1400" b="1" dirty="0">
               <a:latin typeface="Arial" panose="020B0604020202020204" pitchFamily="34" charset="0"/>
               <a:cs typeface="Arial" panose="020B0604020202020204" pitchFamily="34" charset="0"/>
             </a:endParaRPr>
@@ -4358,8 +4030,8 @@
         </p:nvSpPr>
         <p:spPr>
           <a:xfrm>
-            <a:off x="6379266" y="5316240"/>
-            <a:ext cx="2667074" cy="646331"/>
+            <a:off x="9764846" y="7170598"/>
+            <a:ext cx="2255268" cy="954107"/>
           </a:xfrm>
           <a:prstGeom prst="rect">
             <a:avLst/>
@@ -4374,42 +4046,42 @@
           <a:p>
             <a:pPr algn="ctr"/>
             <a:r>
-              <a:rPr lang="es-ES" sz="1200" b="1" dirty="0" err="1">
+              <a:rPr lang="es-ES" sz="1400" b="1" dirty="0" err="1">
                 <a:latin typeface="Arial" panose="020B0604020202020204" pitchFamily="34" charset="0"/>
                 <a:cs typeface="Arial" panose="020B0604020202020204" pitchFamily="34" charset="0"/>
               </a:rPr>
               <a:t>Review</a:t>
             </a:r>
             <a:r>
-              <a:rPr lang="es-ES" sz="1200" b="1" dirty="0">
+              <a:rPr lang="es-ES" sz="1400" b="1" dirty="0">
                 <a:latin typeface="Arial" panose="020B0604020202020204" pitchFamily="34" charset="0"/>
                 <a:cs typeface="Arial" panose="020B0604020202020204" pitchFamily="34" charset="0"/>
               </a:rPr>
               <a:t> of </a:t>
             </a:r>
             <a:r>
-              <a:rPr lang="es-ES" sz="1200" b="1" dirty="0" err="1">
+              <a:rPr lang="es-ES" sz="1400" b="1" dirty="0" err="1">
                 <a:latin typeface="Arial" panose="020B0604020202020204" pitchFamily="34" charset="0"/>
                 <a:cs typeface="Arial" panose="020B0604020202020204" pitchFamily="34" charset="0"/>
               </a:rPr>
               <a:t>historical</a:t>
             </a:r>
             <a:r>
-              <a:rPr lang="es-ES" sz="1200" b="1" dirty="0">
+              <a:rPr lang="es-ES" sz="1400" b="1" dirty="0">
                 <a:latin typeface="Arial" panose="020B0604020202020204" pitchFamily="34" charset="0"/>
                 <a:cs typeface="Arial" panose="020B0604020202020204" pitchFamily="34" charset="0"/>
               </a:rPr>
               <a:t> </a:t>
             </a:r>
             <a:r>
-              <a:rPr lang="es-ES" sz="1200" b="1" dirty="0" err="1">
+              <a:rPr lang="es-ES" sz="1400" b="1" dirty="0" err="1">
                 <a:latin typeface="Arial" panose="020B0604020202020204" pitchFamily="34" charset="0"/>
                 <a:cs typeface="Arial" panose="020B0604020202020204" pitchFamily="34" charset="0"/>
               </a:rPr>
               <a:t>documents</a:t>
             </a:r>
             <a:r>
-              <a:rPr lang="es-ES" sz="1200" b="1" dirty="0">
+              <a:rPr lang="es-ES" sz="1400" b="1" dirty="0">
                 <a:latin typeface="Arial" panose="020B0604020202020204" pitchFamily="34" charset="0"/>
                 <a:cs typeface="Arial" panose="020B0604020202020204" pitchFamily="34" charset="0"/>
               </a:rPr>
@@ -4419,62 +4091,62 @@
           <a:p>
             <a:pPr algn="ctr"/>
             <a:r>
-              <a:rPr lang="es-ES" sz="1200" b="1" dirty="0">
+              <a:rPr lang="es-ES" sz="1400" b="1" dirty="0">
                 <a:latin typeface="Arial" panose="020B0604020202020204" pitchFamily="34" charset="0"/>
                 <a:cs typeface="Arial" panose="020B0604020202020204" pitchFamily="34" charset="0"/>
               </a:rPr>
               <a:t>to </a:t>
             </a:r>
             <a:r>
-              <a:rPr lang="es-ES" sz="1200" b="1" dirty="0" err="1">
+              <a:rPr lang="es-ES" sz="1400" b="1" dirty="0" err="1">
                 <a:latin typeface="Arial" panose="020B0604020202020204" pitchFamily="34" charset="0"/>
                 <a:cs typeface="Arial" panose="020B0604020202020204" pitchFamily="34" charset="0"/>
               </a:rPr>
               <a:t>infer</a:t>
             </a:r>
             <a:r>
-              <a:rPr lang="es-ES" sz="1200" b="1" dirty="0">
+              <a:rPr lang="es-ES" sz="1400" b="1" dirty="0">
                 <a:latin typeface="Arial" panose="020B0604020202020204" pitchFamily="34" charset="0"/>
                 <a:cs typeface="Arial" panose="020B0604020202020204" pitchFamily="34" charset="0"/>
               </a:rPr>
               <a:t> </a:t>
             </a:r>
             <a:r>
-              <a:rPr lang="es-ES" sz="1200" b="1" dirty="0" err="1">
+              <a:rPr lang="es-ES" sz="1400" b="1" dirty="0" err="1">
                 <a:latin typeface="Arial" panose="020B0604020202020204" pitchFamily="34" charset="0"/>
                 <a:cs typeface="Arial" panose="020B0604020202020204" pitchFamily="34" charset="0"/>
               </a:rPr>
               <a:t>anthropogenic</a:t>
             </a:r>
             <a:r>
-              <a:rPr lang="es-ES" sz="1200" b="1" dirty="0">
+              <a:rPr lang="es-ES" sz="1400" b="1" dirty="0">
                 <a:latin typeface="Arial" panose="020B0604020202020204" pitchFamily="34" charset="0"/>
                 <a:cs typeface="Arial" panose="020B0604020202020204" pitchFamily="34" charset="0"/>
               </a:rPr>
               <a:t> </a:t>
             </a:r>
             <a:r>
-              <a:rPr lang="es-ES" sz="1200" b="1" dirty="0" err="1">
+              <a:rPr lang="es-ES" sz="1400" b="1" dirty="0" err="1">
                 <a:latin typeface="Arial" panose="020B0604020202020204" pitchFamily="34" charset="0"/>
                 <a:cs typeface="Arial" panose="020B0604020202020204" pitchFamily="34" charset="0"/>
               </a:rPr>
               <a:t>alteration</a:t>
             </a:r>
             <a:r>
-              <a:rPr lang="es-ES" sz="1200" b="1" dirty="0">
+              <a:rPr lang="es-ES" sz="1400" b="1" dirty="0">
                 <a:latin typeface="Arial" panose="020B0604020202020204" pitchFamily="34" charset="0"/>
                 <a:cs typeface="Arial" panose="020B0604020202020204" pitchFamily="34" charset="0"/>
               </a:rPr>
               <a:t> of </a:t>
             </a:r>
             <a:r>
-              <a:rPr lang="es-ES" sz="1200" b="1" dirty="0" err="1">
+              <a:rPr lang="es-ES" sz="1400" b="1" dirty="0" err="1">
                 <a:latin typeface="Arial" panose="020B0604020202020204" pitchFamily="34" charset="0"/>
                 <a:cs typeface="Arial" panose="020B0604020202020204" pitchFamily="34" charset="0"/>
               </a:rPr>
               <a:t>habitat</a:t>
             </a:r>
-            <a:endParaRPr lang="es-ES" sz="1200" b="1" dirty="0">
+            <a:endParaRPr lang="es-ES" sz="1400" b="1" dirty="0">
               <a:latin typeface="Arial" panose="020B0604020202020204" pitchFamily="34" charset="0"/>
               <a:cs typeface="Arial" panose="020B0604020202020204" pitchFamily="34" charset="0"/>
             </a:endParaRPr>
@@ -4493,14 +4165,13 @@
           <p:cNvCxnSpPr>
             <a:cxnSpLocks/>
             <a:stCxn id="62" idx="2"/>
-            <a:endCxn id="68" idx="0"/>
           </p:cNvCxnSpPr>
           <p:nvPr/>
         </p:nvCxnSpPr>
         <p:spPr>
           <a:xfrm>
-            <a:off x="8989303" y="1651086"/>
-            <a:ext cx="6162" cy="1973287"/>
+            <a:off x="12116653" y="1700690"/>
+            <a:ext cx="9424" cy="3022574"/>
           </a:xfrm>
           <a:prstGeom prst="line">
             <a:avLst/>
@@ -4543,8 +4214,8 @@
         </p:nvSpPr>
         <p:spPr>
           <a:xfrm>
-            <a:off x="8358655" y="1389476"/>
-            <a:ext cx="1261295" cy="261610"/>
+            <a:off x="11486005" y="1177470"/>
+            <a:ext cx="1261295" cy="523220"/>
           </a:xfrm>
           <a:prstGeom prst="rect">
             <a:avLst/>
@@ -4559,20 +4230,23 @@
           <a:p>
             <a:pPr algn="ctr"/>
             <a:r>
-              <a:rPr lang="es-ES" sz="1100" b="1" dirty="0">
-                <a:latin typeface="Arial" panose="020B0604020202020204" pitchFamily="34" charset="0"/>
-                <a:cs typeface="Arial" panose="020B0604020202020204" pitchFamily="34" charset="0"/>
-              </a:rPr>
-              <a:t>Short-</a:t>
-            </a:r>
-            <a:r>
-              <a:rPr lang="es-ES" sz="1100" b="1" dirty="0" err="1">
+              <a:rPr lang="es-ES" sz="1400" b="1" dirty="0">
+                <a:latin typeface="Arial" panose="020B0604020202020204" pitchFamily="34" charset="0"/>
+                <a:cs typeface="Arial" panose="020B0604020202020204" pitchFamily="34" charset="0"/>
+              </a:rPr>
+              <a:t>Short</a:t>
+            </a:r>
+          </a:p>
+          <a:p>
+            <a:pPr algn="ctr"/>
+            <a:r>
+              <a:rPr lang="es-ES" sz="1400" b="1" dirty="0" err="1">
                 <a:latin typeface="Arial" panose="020B0604020202020204" pitchFamily="34" charset="0"/>
                 <a:cs typeface="Arial" panose="020B0604020202020204" pitchFamily="34" charset="0"/>
               </a:rPr>
               <a:t>term</a:t>
             </a:r>
-            <a:endParaRPr lang="es-ES" sz="1100" b="1" dirty="0">
+            <a:endParaRPr lang="es-ES" sz="1400" b="1" dirty="0">
               <a:latin typeface="Arial" panose="020B0604020202020204" pitchFamily="34" charset="0"/>
               <a:cs typeface="Arial" panose="020B0604020202020204" pitchFamily="34" charset="0"/>
             </a:endParaRPr>
@@ -4593,8 +4267,8 @@
         </p:nvSpPr>
         <p:spPr>
           <a:xfrm>
-            <a:off x="9621670" y="1389476"/>
-            <a:ext cx="1261295" cy="261610"/>
+            <a:off x="12487104" y="1177470"/>
+            <a:ext cx="1261295" cy="523220"/>
           </a:xfrm>
           <a:prstGeom prst="rect">
             <a:avLst/>
@@ -4609,20 +4283,23 @@
           <a:p>
             <a:pPr algn="ctr"/>
             <a:r>
-              <a:rPr lang="es-ES" sz="1100" b="1" dirty="0">
-                <a:latin typeface="Arial" panose="020B0604020202020204" pitchFamily="34" charset="0"/>
-                <a:cs typeface="Arial" panose="020B0604020202020204" pitchFamily="34" charset="0"/>
-              </a:rPr>
-              <a:t>Long-</a:t>
-            </a:r>
-            <a:r>
-              <a:rPr lang="es-ES" sz="1100" b="1" dirty="0" err="1">
+              <a:rPr lang="es-ES" sz="1400" b="1" dirty="0">
+                <a:latin typeface="Arial" panose="020B0604020202020204" pitchFamily="34" charset="0"/>
+                <a:cs typeface="Arial" panose="020B0604020202020204" pitchFamily="34" charset="0"/>
+              </a:rPr>
+              <a:t>Long</a:t>
+            </a:r>
+          </a:p>
+          <a:p>
+            <a:pPr algn="ctr"/>
+            <a:r>
+              <a:rPr lang="es-ES" sz="1400" b="1" dirty="0" err="1">
                 <a:latin typeface="Arial" panose="020B0604020202020204" pitchFamily="34" charset="0"/>
                 <a:cs typeface="Arial" panose="020B0604020202020204" pitchFamily="34" charset="0"/>
               </a:rPr>
               <a:t>term</a:t>
             </a:r>
-            <a:endParaRPr lang="es-ES" sz="1100" b="1" dirty="0">
+            <a:endParaRPr lang="es-ES" sz="1400" b="1" dirty="0">
               <a:latin typeface="Arial" panose="020B0604020202020204" pitchFamily="34" charset="0"/>
               <a:cs typeface="Arial" panose="020B0604020202020204" pitchFamily="34" charset="0"/>
             </a:endParaRPr>
@@ -4643,8 +4320,8 @@
         </p:nvSpPr>
         <p:spPr>
           <a:xfrm>
-            <a:off x="7044474" y="664253"/>
-            <a:ext cx="960519" cy="338554"/>
+            <a:off x="10131206" y="639418"/>
+            <a:ext cx="1056700" cy="369332"/>
           </a:xfrm>
           <a:prstGeom prst="rect">
             <a:avLst/>
@@ -4658,13 +4335,13 @@
           <a:lstStyle/>
           <a:p>
             <a:r>
-              <a:rPr lang="es-ES" sz="1600" b="1" dirty="0" err="1">
+              <a:rPr lang="es-ES" b="1" dirty="0" err="1">
                 <a:latin typeface="Arial" panose="020B0604020202020204" pitchFamily="34" charset="0"/>
                 <a:cs typeface="Arial" panose="020B0604020202020204" pitchFamily="34" charset="0"/>
               </a:rPr>
               <a:t>Impacts</a:t>
             </a:r>
-            <a:endParaRPr lang="es-ES" sz="1600" b="1" dirty="0">
+            <a:endParaRPr lang="es-ES" b="1" dirty="0">
               <a:latin typeface="Arial" panose="020B0604020202020204" pitchFamily="34" charset="0"/>
               <a:cs typeface="Arial" panose="020B0604020202020204" pitchFamily="34" charset="0"/>
             </a:endParaRPr>
@@ -4685,8 +4362,8 @@
         </p:nvSpPr>
         <p:spPr>
           <a:xfrm>
-            <a:off x="10062588" y="664253"/>
-            <a:ext cx="1276311" cy="338554"/>
+            <a:off x="12747300" y="639418"/>
+            <a:ext cx="1415772" cy="369332"/>
           </a:xfrm>
           <a:prstGeom prst="rect">
             <a:avLst/>
@@ -4700,90 +4377,11 @@
           <a:lstStyle/>
           <a:p>
             <a:r>
-              <a:rPr lang="es-ES" sz="1600" b="1" dirty="0">
+              <a:rPr lang="es-ES" b="1" dirty="0">
                 <a:latin typeface="Arial" panose="020B0604020202020204" pitchFamily="34" charset="0"/>
                 <a:cs typeface="Arial" panose="020B0604020202020204" pitchFamily="34" charset="0"/>
               </a:rPr>
               <a:t>Responses</a:t>
-            </a:r>
-          </a:p>
-        </p:txBody>
-      </p:sp>
-      <p:sp>
-        <p:nvSpPr>
-          <p:cNvPr id="67" name="TextBox 66">
-            <a:extLst>
-              <a:ext uri="{FF2B5EF4-FFF2-40B4-BE49-F238E27FC236}">
-                <a16:creationId xmlns:a16="http://schemas.microsoft.com/office/drawing/2014/main" id="{CAD93BFD-9E37-B942-8602-2D59FA5087DD}"/>
-              </a:ext>
-            </a:extLst>
-          </p:cNvPr>
-          <p:cNvSpPr txBox="1"/>
-          <p:nvPr/>
-        </p:nvSpPr>
-        <p:spPr>
-          <a:xfrm>
-            <a:off x="8235534" y="1785826"/>
-            <a:ext cx="1481496" cy="584775"/>
-          </a:xfrm>
-          <a:prstGeom prst="rect">
-            <a:avLst/>
-          </a:prstGeom>
-          <a:solidFill>
-            <a:schemeClr val="bg1"/>
-          </a:solidFill>
-        </p:spPr>
-        <p:txBody>
-          <a:bodyPr wrap="none" rtlCol="0">
-            <a:spAutoFit/>
-          </a:bodyPr>
-          <a:lstStyle/>
-          <a:p>
-            <a:pPr algn="ctr"/>
-            <a:r>
-              <a:rPr lang="es-ES" sz="1200" b="1" dirty="0">
-                <a:latin typeface="Arial" panose="020B0604020202020204" pitchFamily="34" charset="0"/>
-                <a:cs typeface="Arial" panose="020B0604020202020204" pitchFamily="34" charset="0"/>
-              </a:rPr>
-              <a:t>EVI </a:t>
-            </a:r>
-          </a:p>
-          <a:p>
-            <a:pPr algn="ctr"/>
-            <a:r>
-              <a:rPr lang="es-ES" sz="1200" b="1" dirty="0" err="1">
-                <a:latin typeface="Arial" panose="020B0604020202020204" pitchFamily="34" charset="0"/>
-                <a:cs typeface="Arial" panose="020B0604020202020204" pitchFamily="34" charset="0"/>
-              </a:rPr>
-              <a:t>resilience</a:t>
-            </a:r>
-            <a:r>
-              <a:rPr lang="es-ES" sz="1200" b="1" dirty="0">
-                <a:latin typeface="Arial" panose="020B0604020202020204" pitchFamily="34" charset="0"/>
-                <a:cs typeface="Arial" panose="020B0604020202020204" pitchFamily="34" charset="0"/>
-              </a:rPr>
-              <a:t> </a:t>
-            </a:r>
-            <a:r>
-              <a:rPr lang="es-ES" sz="1200" b="1" dirty="0" err="1">
-                <a:latin typeface="Arial" panose="020B0604020202020204" pitchFamily="34" charset="0"/>
-                <a:cs typeface="Arial" panose="020B0604020202020204" pitchFamily="34" charset="0"/>
-              </a:rPr>
-              <a:t>metrics</a:t>
-            </a:r>
-            <a:endParaRPr lang="es-ES" sz="1200" b="1" dirty="0">
-              <a:latin typeface="Arial" panose="020B0604020202020204" pitchFamily="34" charset="0"/>
-              <a:cs typeface="Arial" panose="020B0604020202020204" pitchFamily="34" charset="0"/>
-            </a:endParaRPr>
-          </a:p>
-          <a:p>
-            <a:pPr algn="ctr"/>
-            <a:r>
-              <a:rPr lang="es-ES" sz="1200" b="1" baseline="-25000" dirty="0">
-                <a:latin typeface="Arial" panose="020B0604020202020204" pitchFamily="34" charset="0"/>
-                <a:cs typeface="Arial" panose="020B0604020202020204" pitchFamily="34" charset="0"/>
-              </a:rPr>
-              <a:t>2005, 2012</a:t>
             </a:r>
           </a:p>
         </p:txBody>
@@ -4802,8 +4400,8 @@
         </p:nvSpPr>
         <p:spPr>
           <a:xfrm>
-            <a:off x="8198612" y="3624373"/>
-            <a:ext cx="1593705" cy="584775"/>
+            <a:off x="11596124" y="4796152"/>
+            <a:ext cx="1059906" cy="1025922"/>
           </a:xfrm>
           <a:prstGeom prst="rect">
             <a:avLst/>
@@ -4820,7 +4418,7 @@
           <a:p>
             <a:pPr algn="ctr"/>
             <a:r>
-              <a:rPr lang="es-ES" sz="1200" b="1" dirty="0">
+              <a:rPr lang="es-ES" sz="1400" b="1" dirty="0">
                 <a:latin typeface="Arial" panose="020B0604020202020204" pitchFamily="34" charset="0"/>
                 <a:cs typeface="Arial" panose="020B0604020202020204" pitchFamily="34" charset="0"/>
               </a:rPr>
@@ -4830,27 +4428,30 @@
           <a:p>
             <a:pPr algn="ctr"/>
             <a:r>
-              <a:rPr lang="es-ES" sz="1200" b="1" dirty="0" err="1">
+              <a:rPr lang="es-ES" sz="1400" b="1" dirty="0" err="1">
                 <a:latin typeface="Arial" panose="020B0604020202020204" pitchFamily="34" charset="0"/>
                 <a:cs typeface="Arial" panose="020B0604020202020204" pitchFamily="34" charset="0"/>
               </a:rPr>
               <a:t>resilience</a:t>
             </a:r>
             <a:r>
-              <a:rPr lang="es-ES" sz="1200" b="1" dirty="0">
+              <a:rPr lang="es-ES" sz="1400" b="1" dirty="0">
                 <a:latin typeface="Arial" panose="020B0604020202020204" pitchFamily="34" charset="0"/>
                 <a:cs typeface="Arial" panose="020B0604020202020204" pitchFamily="34" charset="0"/>
               </a:rPr>
               <a:t> </a:t>
             </a:r>
-            <a:r>
-              <a:rPr lang="es-ES" sz="1200" b="1" dirty="0" err="1">
+          </a:p>
+          <a:p>
+            <a:pPr algn="ctr"/>
+            <a:r>
+              <a:rPr lang="es-ES" sz="1400" b="1" dirty="0" err="1">
                 <a:latin typeface="Arial" panose="020B0604020202020204" pitchFamily="34" charset="0"/>
                 <a:cs typeface="Arial" panose="020B0604020202020204" pitchFamily="34" charset="0"/>
               </a:rPr>
               <a:t>metrics</a:t>
             </a:r>
-            <a:endParaRPr lang="es-ES" sz="1200" b="1" dirty="0">
+            <a:endParaRPr lang="es-ES" sz="1400" b="1" dirty="0">
               <a:latin typeface="Arial" panose="020B0604020202020204" pitchFamily="34" charset="0"/>
               <a:cs typeface="Arial" panose="020B0604020202020204" pitchFamily="34" charset="0"/>
             </a:endParaRPr>
@@ -4858,56 +4459,59 @@
           <a:p>
             <a:pPr algn="ctr"/>
             <a:r>
-              <a:rPr lang="es-ES" sz="1200" b="1" baseline="-25000" dirty="0" err="1">
+              <a:rPr lang="es-ES" sz="1400" b="1" baseline="-25000" dirty="0" err="1">
                 <a:latin typeface="Arial" panose="020B0604020202020204" pitchFamily="34" charset="0"/>
                 <a:cs typeface="Arial" panose="020B0604020202020204" pitchFamily="34" charset="0"/>
               </a:rPr>
               <a:t>most</a:t>
             </a:r>
             <a:r>
-              <a:rPr lang="es-ES" sz="1200" b="1" baseline="-25000" dirty="0">
+              <a:rPr lang="es-ES" sz="1400" b="1" baseline="-25000" dirty="0">
                 <a:latin typeface="Arial" panose="020B0604020202020204" pitchFamily="34" charset="0"/>
                 <a:cs typeface="Arial" panose="020B0604020202020204" pitchFamily="34" charset="0"/>
               </a:rPr>
               <a:t> </a:t>
             </a:r>
             <a:r>
-              <a:rPr lang="es-ES" sz="1200" b="1" baseline="-25000" dirty="0" err="1">
+              <a:rPr lang="es-ES" sz="1400" b="1" baseline="-25000" dirty="0" err="1">
                 <a:latin typeface="Arial" panose="020B0604020202020204" pitchFamily="34" charset="0"/>
                 <a:cs typeface="Arial" panose="020B0604020202020204" pitchFamily="34" charset="0"/>
               </a:rPr>
               <a:t>severe</a:t>
             </a:r>
             <a:r>
-              <a:rPr lang="es-ES" sz="1200" b="1" baseline="-25000" dirty="0">
+              <a:rPr lang="es-ES" sz="1400" b="1" baseline="-25000" dirty="0">
                 <a:latin typeface="Arial" panose="020B0604020202020204" pitchFamily="34" charset="0"/>
                 <a:cs typeface="Arial" panose="020B0604020202020204" pitchFamily="34" charset="0"/>
               </a:rPr>
               <a:t> </a:t>
             </a:r>
-            <a:r>
-              <a:rPr lang="es-ES" sz="1200" b="1" baseline="-25000" dirty="0" err="1">
+          </a:p>
+          <a:p>
+            <a:pPr algn="ctr"/>
+            <a:r>
+              <a:rPr lang="es-ES" sz="1400" b="1" baseline="-25000" dirty="0" err="1">
                 <a:latin typeface="Arial" panose="020B0604020202020204" pitchFamily="34" charset="0"/>
                 <a:cs typeface="Arial" panose="020B0604020202020204" pitchFamily="34" charset="0"/>
               </a:rPr>
               <a:t>droughts</a:t>
             </a:r>
             <a:r>
-              <a:rPr lang="es-ES" sz="1200" b="1" baseline="-25000" dirty="0">
+              <a:rPr lang="es-ES" sz="1400" b="1" baseline="-25000" dirty="0">
                 <a:latin typeface="Arial" panose="020B0604020202020204" pitchFamily="34" charset="0"/>
                 <a:cs typeface="Arial" panose="020B0604020202020204" pitchFamily="34" charset="0"/>
               </a:rPr>
               <a:t> (</a:t>
             </a:r>
             <a:r>
-              <a:rPr lang="es-ES" sz="1200" b="1" i="1" baseline="-25000" dirty="0">
+              <a:rPr lang="es-ES" sz="1400" b="1" i="1" baseline="-25000" dirty="0">
                 <a:latin typeface="Arial" panose="020B0604020202020204" pitchFamily="34" charset="0"/>
                 <a:cs typeface="Arial" panose="020B0604020202020204" pitchFamily="34" charset="0"/>
               </a:rPr>
               <a:t>n=8</a:t>
             </a:r>
             <a:r>
-              <a:rPr lang="es-ES" sz="1200" b="1" baseline="-25000" dirty="0">
+              <a:rPr lang="es-ES" sz="1400" b="1" baseline="-25000" dirty="0">
                 <a:latin typeface="Arial" panose="020B0604020202020204" pitchFamily="34" charset="0"/>
                 <a:cs typeface="Arial" panose="020B0604020202020204" pitchFamily="34" charset="0"/>
               </a:rPr>
@@ -4928,13 +4532,14 @@
           <p:cNvCxnSpPr>
             <a:cxnSpLocks/>
             <a:stCxn id="63" idx="2"/>
+            <a:endCxn id="77" idx="0"/>
           </p:cNvCxnSpPr>
           <p:nvPr/>
         </p:nvCxnSpPr>
         <p:spPr>
           <a:xfrm>
-            <a:off x="10252318" y="1651086"/>
-            <a:ext cx="23221" cy="2327229"/>
+            <a:off x="13117752" y="1700690"/>
+            <a:ext cx="11610" cy="3095462"/>
           </a:xfrm>
           <a:prstGeom prst="line">
             <a:avLst/>
@@ -4965,68 +4570,6 @@
       </p:cxnSp>
       <p:sp>
         <p:nvSpPr>
-          <p:cNvPr id="71" name="TextBox 70">
-            <a:extLst>
-              <a:ext uri="{FF2B5EF4-FFF2-40B4-BE49-F238E27FC236}">
-                <a16:creationId xmlns:a16="http://schemas.microsoft.com/office/drawing/2014/main" id="{724B4DF6-8817-6746-ABF4-A81E06F1A82E}"/>
-              </a:ext>
-            </a:extLst>
-          </p:cNvPr>
-          <p:cNvSpPr txBox="1"/>
-          <p:nvPr/>
-        </p:nvSpPr>
-        <p:spPr>
-          <a:xfrm>
-            <a:off x="9639426" y="1805596"/>
-            <a:ext cx="1261884" cy="461665"/>
-          </a:xfrm>
-          <a:prstGeom prst="rect">
-            <a:avLst/>
-          </a:prstGeom>
-          <a:solidFill>
-            <a:schemeClr val="bg1"/>
-          </a:solidFill>
-        </p:spPr>
-        <p:txBody>
-          <a:bodyPr wrap="none" rtlCol="0">
-            <a:spAutoFit/>
-          </a:bodyPr>
-          <a:lstStyle/>
-          <a:p>
-            <a:pPr algn="ctr"/>
-            <a:r>
-              <a:rPr lang="es-ES" sz="1200" b="1" dirty="0">
-                <a:latin typeface="Arial" panose="020B0604020202020204" pitchFamily="34" charset="0"/>
-                <a:cs typeface="Arial" panose="020B0604020202020204" pitchFamily="34" charset="0"/>
-              </a:rPr>
-              <a:t>Mann-Kendall </a:t>
-            </a:r>
-          </a:p>
-          <a:p>
-            <a:pPr algn="ctr"/>
-            <a:r>
-              <a:rPr lang="es-ES" sz="1200" b="1" dirty="0">
-                <a:latin typeface="Arial" panose="020B0604020202020204" pitchFamily="34" charset="0"/>
-                <a:cs typeface="Arial" panose="020B0604020202020204" pitchFamily="34" charset="0"/>
-              </a:rPr>
-              <a:t>temporal </a:t>
-            </a:r>
-            <a:r>
-              <a:rPr lang="es-ES" sz="1200" b="1" dirty="0" err="1">
-                <a:latin typeface="Arial" panose="020B0604020202020204" pitchFamily="34" charset="0"/>
-                <a:cs typeface="Arial" panose="020B0604020202020204" pitchFamily="34" charset="0"/>
-              </a:rPr>
-              <a:t>trend</a:t>
-            </a:r>
-            <a:endParaRPr lang="es-ES" sz="1200" b="1" dirty="0">
-              <a:latin typeface="Arial" panose="020B0604020202020204" pitchFamily="34" charset="0"/>
-              <a:cs typeface="Arial" panose="020B0604020202020204" pitchFamily="34" charset="0"/>
-            </a:endParaRPr>
-          </a:p>
-        </p:txBody>
-      </p:sp>
-      <p:sp>
-        <p:nvSpPr>
           <p:cNvPr id="77" name="TextBox 76">
             <a:extLst>
               <a:ext uri="{FF2B5EF4-FFF2-40B4-BE49-F238E27FC236}">
@@ -5039,8 +4582,8 @@
         </p:nvSpPr>
         <p:spPr>
           <a:xfrm>
-            <a:off x="9824494" y="3747483"/>
-            <a:ext cx="876250" cy="461665"/>
+            <a:off x="12575360" y="4796152"/>
+            <a:ext cx="1108003" cy="738664"/>
           </a:xfrm>
           <a:prstGeom prst="rect">
             <a:avLst/>
@@ -5057,61 +4600,30 @@
           <a:p>
             <a:pPr algn="ctr"/>
             <a:r>
-              <a:rPr lang="es-ES" sz="1200" b="1" dirty="0">
-                <a:latin typeface="Arial" panose="020B0604020202020204" pitchFamily="34" charset="0"/>
-                <a:cs typeface="Arial" panose="020B0604020202020204" pitchFamily="34" charset="0"/>
-              </a:rPr>
-              <a:t>Temporal </a:t>
-            </a:r>
-            <a:r>
-              <a:rPr lang="es-ES" sz="1200" b="1" dirty="0" err="1">
+              <a:rPr lang="es-ES" sz="1400" b="1" dirty="0" err="1">
+                <a:latin typeface="Arial" panose="020B0604020202020204" pitchFamily="34" charset="0"/>
+                <a:cs typeface="Arial" panose="020B0604020202020204" pitchFamily="34" charset="0"/>
+              </a:rPr>
+              <a:t>Parametric</a:t>
+            </a:r>
+            <a:r>
+              <a:rPr lang="es-ES" sz="1400" b="1" dirty="0">
+                <a:latin typeface="Arial" panose="020B0604020202020204" pitchFamily="34" charset="0"/>
+                <a:cs typeface="Arial" panose="020B0604020202020204" pitchFamily="34" charset="0"/>
+              </a:rPr>
+              <a:t> temporal </a:t>
+            </a:r>
+            <a:r>
+              <a:rPr lang="es-ES" sz="1400" b="1" dirty="0" err="1">
                 <a:latin typeface="Arial" panose="020B0604020202020204" pitchFamily="34" charset="0"/>
                 <a:cs typeface="Arial" panose="020B0604020202020204" pitchFamily="34" charset="0"/>
               </a:rPr>
               <a:t>trend</a:t>
             </a:r>
-            <a:endParaRPr lang="es-ES" sz="1200" b="1" baseline="-25000" dirty="0">
+            <a:endParaRPr lang="es-ES" sz="1400" b="1" baseline="-25000" dirty="0">
               <a:latin typeface="Arial" panose="020B0604020202020204" pitchFamily="34" charset="0"/>
               <a:cs typeface="Arial" panose="020B0604020202020204" pitchFamily="34" charset="0"/>
             </a:endParaRPr>
-          </a:p>
-        </p:txBody>
-      </p:sp>
-      <p:sp>
-        <p:nvSpPr>
-          <p:cNvPr id="80" name="TextBox 79">
-            <a:extLst>
-              <a:ext uri="{FF2B5EF4-FFF2-40B4-BE49-F238E27FC236}">
-                <a16:creationId xmlns:a16="http://schemas.microsoft.com/office/drawing/2014/main" id="{533D2B7C-E247-C04A-942D-0D7096FF3392}"/>
-              </a:ext>
-            </a:extLst>
-          </p:cNvPr>
-          <p:cNvSpPr txBox="1"/>
-          <p:nvPr/>
-        </p:nvSpPr>
-        <p:spPr>
-          <a:xfrm>
-            <a:off x="-26634" y="-130191"/>
-            <a:ext cx="412292" cy="584775"/>
-          </a:xfrm>
-          <a:prstGeom prst="rect">
-            <a:avLst/>
-          </a:prstGeom>
-          <a:noFill/>
-        </p:spPr>
-        <p:txBody>
-          <a:bodyPr wrap="none" rtlCol="0">
-            <a:spAutoFit/>
-          </a:bodyPr>
-          <a:lstStyle/>
-          <a:p>
-            <a:r>
-              <a:rPr lang="es-ES" sz="3200" b="1" dirty="0">
-                <a:latin typeface="Arial" panose="020B0604020202020204" pitchFamily="34" charset="0"/>
-                <a:cs typeface="Arial" panose="020B0604020202020204" pitchFamily="34" charset="0"/>
-              </a:rPr>
-              <a:t>a</a:t>
-            </a:r>
           </a:p>
         </p:txBody>
       </p:sp>
@@ -5129,7 +4641,7 @@
         </p:nvSpPr>
         <p:spPr>
           <a:xfrm>
-            <a:off x="6530192" y="-67518"/>
+            <a:off x="9705862" y="0"/>
             <a:ext cx="434734" cy="584775"/>
           </a:xfrm>
           <a:prstGeom prst="rect">
@@ -5167,7 +4679,7 @@
         </p:nvSpPr>
         <p:spPr>
           <a:xfrm>
-            <a:off x="11453630" y="4100531"/>
+            <a:off x="14449590" y="5199421"/>
             <a:ext cx="217234" cy="217234"/>
           </a:xfrm>
           <a:prstGeom prst="ellipse">
@@ -5226,9 +4738,9 @@
           <p:nvPr/>
         </p:nvSpPr>
         <p:spPr>
-          <a:xfrm>
-            <a:off x="10298133" y="2486136"/>
-            <a:ext cx="2468517" cy="646331"/>
+          <a:xfrm rot="16200000">
+            <a:off x="13226229" y="3158763"/>
+            <a:ext cx="2468517" cy="738664"/>
           </a:xfrm>
           <a:prstGeom prst="rect">
             <a:avLst/>
@@ -5243,14 +4755,14 @@
           <a:p>
             <a:pPr algn="ctr"/>
             <a:r>
-              <a:rPr lang="es-ES" sz="1200" b="1" dirty="0" err="1">
+              <a:rPr lang="es-ES" sz="1400" b="1" dirty="0" err="1">
                 <a:latin typeface="Arial" panose="020B0604020202020204" pitchFamily="34" charset="0"/>
                 <a:cs typeface="Arial" panose="020B0604020202020204" pitchFamily="34" charset="0"/>
               </a:rPr>
               <a:t>Comparison</a:t>
             </a:r>
             <a:r>
-              <a:rPr lang="es-ES" sz="1200" b="1" dirty="0">
+              <a:rPr lang="es-ES" sz="1400" b="1" dirty="0">
                 <a:latin typeface="Arial" panose="020B0604020202020204" pitchFamily="34" charset="0"/>
                 <a:cs typeface="Arial" panose="020B0604020202020204" pitchFamily="34" charset="0"/>
               </a:rPr>
@@ -5260,13 +4772,13 @@
           <a:p>
             <a:pPr algn="ctr"/>
             <a:r>
-              <a:rPr lang="es-ES" sz="1200" b="1" dirty="0" err="1">
+              <a:rPr lang="es-ES" sz="1400" b="1" dirty="0" err="1">
                 <a:latin typeface="Arial" panose="020B0604020202020204" pitchFamily="34" charset="0"/>
                 <a:cs typeface="Arial" panose="020B0604020202020204" pitchFamily="34" charset="0"/>
               </a:rPr>
               <a:t>between</a:t>
             </a:r>
-            <a:endParaRPr lang="es-ES" sz="1200" b="1" dirty="0">
+            <a:endParaRPr lang="es-ES" sz="1400" b="1" dirty="0">
               <a:latin typeface="Arial" panose="020B0604020202020204" pitchFamily="34" charset="0"/>
               <a:cs typeface="Arial" panose="020B0604020202020204" pitchFamily="34" charset="0"/>
             </a:endParaRPr>
@@ -5274,13 +4786,13 @@
           <a:p>
             <a:pPr algn="ctr"/>
             <a:r>
-              <a:rPr lang="es-ES" sz="1200" b="1" dirty="0" err="1">
+              <a:rPr lang="es-ES" sz="1400" b="1" dirty="0" err="1">
                 <a:latin typeface="Arial" panose="020B0604020202020204" pitchFamily="34" charset="0"/>
                 <a:cs typeface="Arial" panose="020B0604020202020204" pitchFamily="34" charset="0"/>
               </a:rPr>
               <a:t>populations</a:t>
             </a:r>
-            <a:endParaRPr lang="es-ES" sz="1200" b="1" dirty="0">
+            <a:endParaRPr lang="es-ES" sz="1400" b="1" dirty="0">
               <a:latin typeface="Arial" panose="020B0604020202020204" pitchFamily="34" charset="0"/>
               <a:cs typeface="Arial" panose="020B0604020202020204" pitchFamily="34" charset="0"/>
             </a:endParaRPr>
@@ -5301,8 +4813,8 @@
         </p:nvSpPr>
         <p:spPr>
           <a:xfrm>
-            <a:off x="10823760" y="1098248"/>
-            <a:ext cx="1368240" cy="230832"/>
+            <a:off x="13853722" y="5909765"/>
+            <a:ext cx="1368240" cy="461665"/>
           </a:xfrm>
           <a:prstGeom prst="rect">
             <a:avLst/>
@@ -5317,27 +4829,30 @@
           <a:p>
             <a:pPr algn="ctr"/>
             <a:r>
-              <a:rPr lang="es-ES" sz="900" i="1" dirty="0" err="1">
+              <a:rPr lang="es-ES" sz="1200" i="1" dirty="0" err="1">
                 <a:latin typeface="Arial" panose="020B0604020202020204" pitchFamily="34" charset="0"/>
                 <a:cs typeface="Arial" panose="020B0604020202020204" pitchFamily="34" charset="0"/>
               </a:rPr>
               <a:t>within</a:t>
             </a:r>
             <a:r>
-              <a:rPr lang="es-ES" sz="900" i="1" dirty="0">
+              <a:rPr lang="es-ES" sz="1200" i="1" dirty="0">
                 <a:latin typeface="Arial" panose="020B0604020202020204" pitchFamily="34" charset="0"/>
                 <a:cs typeface="Arial" panose="020B0604020202020204" pitchFamily="34" charset="0"/>
               </a:rPr>
               <a:t> </a:t>
             </a:r>
-            <a:r>
-              <a:rPr lang="es-ES" sz="900" i="1" dirty="0" err="1">
+          </a:p>
+          <a:p>
+            <a:pPr algn="ctr"/>
+            <a:r>
+              <a:rPr lang="es-ES" sz="1200" i="1" dirty="0" err="1">
                 <a:latin typeface="Arial" panose="020B0604020202020204" pitchFamily="34" charset="0"/>
                 <a:cs typeface="Arial" panose="020B0604020202020204" pitchFamily="34" charset="0"/>
               </a:rPr>
               <a:t>rear-edge</a:t>
             </a:r>
-            <a:endParaRPr lang="es-ES" sz="900" i="1" dirty="0">
+            <a:endParaRPr lang="es-ES" sz="1200" i="1" dirty="0">
               <a:latin typeface="Arial" panose="020B0604020202020204" pitchFamily="34" charset="0"/>
               <a:cs typeface="Arial" panose="020B0604020202020204" pitchFamily="34" charset="0"/>
             </a:endParaRPr>
@@ -5346,10 +4861,10 @@
       </p:sp>
       <p:sp>
         <p:nvSpPr>
-          <p:cNvPr id="97" name="Rounded Rectangle 96">
+          <p:cNvPr id="98" name="Rounded Rectangle 97">
             <a:extLst>
               <a:ext uri="{FF2B5EF4-FFF2-40B4-BE49-F238E27FC236}">
-                <a16:creationId xmlns:a16="http://schemas.microsoft.com/office/drawing/2014/main" id="{50FA2174-EC81-DD48-B62A-0FBB3FA3917F}"/>
+                <a16:creationId xmlns:a16="http://schemas.microsoft.com/office/drawing/2014/main" id="{D7039D1B-1706-3D4E-9A57-31A8A67D5E65}"/>
               </a:ext>
             </a:extLst>
           </p:cNvPr>
@@ -5358,8 +4873,8 @@
         </p:nvSpPr>
         <p:spPr>
           <a:xfrm>
-            <a:off x="8255061" y="1330306"/>
-            <a:ext cx="2667074" cy="3114932"/>
+            <a:off x="14021689" y="1177470"/>
+            <a:ext cx="968351" cy="4701252"/>
           </a:xfrm>
           <a:prstGeom prst="roundRect">
             <a:avLst>
@@ -5401,10 +4916,10 @@
       </p:sp>
       <p:sp>
         <p:nvSpPr>
-          <p:cNvPr id="98" name="Rounded Rectangle 97">
+          <p:cNvPr id="48" name="Oval 47">
             <a:extLst>
               <a:ext uri="{FF2B5EF4-FFF2-40B4-BE49-F238E27FC236}">
-                <a16:creationId xmlns:a16="http://schemas.microsoft.com/office/drawing/2014/main" id="{D7039D1B-1706-3D4E-9A57-31A8A67D5E65}"/>
+                <a16:creationId xmlns:a16="http://schemas.microsoft.com/office/drawing/2014/main" id="{6769A7F4-70A4-B248-93C8-C3334D16AFEA}"/>
               </a:ext>
             </a:extLst>
           </p:cNvPr>
@@ -5413,20 +4928,19 @@
         </p:nvSpPr>
         <p:spPr>
           <a:xfrm>
-            <a:off x="11025728" y="1334494"/>
-            <a:ext cx="1073039" cy="3114932"/>
-          </a:xfrm>
-          <a:prstGeom prst="roundRect">
-            <a:avLst>
-              <a:gd name="adj" fmla="val 1878"/>
-            </a:avLst>
+            <a:off x="10351027" y="6740402"/>
+            <a:ext cx="217234" cy="217234"/>
+          </a:xfrm>
+          <a:prstGeom prst="ellipse">
+            <a:avLst/>
           </a:prstGeom>
-          <a:noFill/>
-          <a:ln w="19050">
-            <a:solidFill>
-              <a:schemeClr val="tx2"/>
-            </a:solidFill>
-            <a:prstDash val="sysDot"/>
+          <a:solidFill>
+            <a:schemeClr val="bg1">
+              <a:lumMod val="75000"/>
+            </a:schemeClr>
+          </a:solidFill>
+          <a:ln>
+            <a:noFill/>
           </a:ln>
         </p:spPr>
         <p:style>
@@ -5450,16 +4964,140 @@
           <a:lstStyle/>
           <a:p>
             <a:pPr algn="ctr"/>
-            <a:endParaRPr lang="es-ES"/>
-          </a:p>
-        </p:txBody>
-      </p:sp>
-      <p:sp>
-        <p:nvSpPr>
-          <p:cNvPr id="99" name="TextBox 98">
+            <a:r>
+              <a:rPr lang="es-ES" sz="1200" b="1" dirty="0">
+                <a:latin typeface="Arial" panose="020B0604020202020204" pitchFamily="34" charset="0"/>
+                <a:cs typeface="Arial" panose="020B0604020202020204" pitchFamily="34" charset="0"/>
+              </a:rPr>
+              <a:t>2</a:t>
+            </a:r>
+          </a:p>
+        </p:txBody>
+      </p:sp>
+      <p:pic>
+        <p:nvPicPr>
+          <p:cNvPr id="33" name="Picture 32">
             <a:extLst>
               <a:ext uri="{FF2B5EF4-FFF2-40B4-BE49-F238E27FC236}">
-                <a16:creationId xmlns:a16="http://schemas.microsoft.com/office/drawing/2014/main" id="{F27CACFD-2682-9340-9D9F-3FC7F15BD5A4}"/>
+                <a16:creationId xmlns:a16="http://schemas.microsoft.com/office/drawing/2014/main" id="{19883FF3-060E-DF41-B64A-BE1BDA98AB77}"/>
+              </a:ext>
+            </a:extLst>
+          </p:cNvPr>
+          <p:cNvPicPr>
+            <a:picLocks noChangeAspect="1"/>
+          </p:cNvPicPr>
+          <p:nvPr/>
+        </p:nvPicPr>
+        <p:blipFill>
+          <a:blip r:embed="rId4">
+            <a:duotone>
+              <a:schemeClr val="accent5">
+                <a:shade val="45000"/>
+                <a:satMod val="135000"/>
+              </a:schemeClr>
+              <a:prstClr val="white"/>
+            </a:duotone>
+            <a:alphaModFix amt="72000"/>
+            <a:extLst>
+              <a:ext uri="{BEBA8EAE-BF5A-486C-A8C5-ECC9F3942E4B}">
+                <a14:imgProps xmlns:a14="http://schemas.microsoft.com/office/drawing/2010/main">
+                  <a14:imgLayer r:embed="rId5">
+                    <a14:imgEffect>
+                      <a14:colorTemperature colorTemp="11200"/>
+                    </a14:imgEffect>
+                  </a14:imgLayer>
+                </a14:imgProps>
+              </a:ext>
+            </a:extLst>
+          </a:blip>
+          <a:stretch>
+            <a:fillRect/>
+          </a:stretch>
+        </p:blipFill>
+        <p:spPr>
+          <a:xfrm rot="21137798">
+            <a:off x="5242138" y="2334737"/>
+            <a:ext cx="971340" cy="971340"/>
+          </a:xfrm>
+          <a:prstGeom prst="rect">
+            <a:avLst/>
+          </a:prstGeom>
+        </p:spPr>
+      </p:pic>
+      <p:pic>
+        <p:nvPicPr>
+          <p:cNvPr id="4" name="Picture 3">
+            <a:extLst>
+              <a:ext uri="{FF2B5EF4-FFF2-40B4-BE49-F238E27FC236}">
+                <a16:creationId xmlns:a16="http://schemas.microsoft.com/office/drawing/2014/main" id="{7D1C4210-8C8C-4C40-A5FB-788F82358D0D}"/>
+              </a:ext>
+            </a:extLst>
+          </p:cNvPr>
+          <p:cNvPicPr>
+            <a:picLocks noChangeAspect="1"/>
+          </p:cNvPicPr>
+          <p:nvPr/>
+        </p:nvPicPr>
+        <p:blipFill>
+          <a:blip r:embed="rId6"/>
+          <a:stretch>
+            <a:fillRect/>
+          </a:stretch>
+        </p:blipFill>
+        <p:spPr>
+          <a:xfrm>
+            <a:off x="272675" y="4545692"/>
+            <a:ext cx="1172310" cy="1333030"/>
+          </a:xfrm>
+          <a:prstGeom prst="rect">
+            <a:avLst/>
+          </a:prstGeom>
+        </p:spPr>
+      </p:pic>
+      <p:pic>
+        <p:nvPicPr>
+          <p:cNvPr id="11" name="Picture 10">
+            <a:extLst>
+              <a:ext uri="{FF2B5EF4-FFF2-40B4-BE49-F238E27FC236}">
+                <a16:creationId xmlns:a16="http://schemas.microsoft.com/office/drawing/2014/main" id="{3C43374F-0E38-0F4A-8343-FE946A1E9FC2}"/>
+              </a:ext>
+            </a:extLst>
+          </p:cNvPr>
+          <p:cNvPicPr>
+            <a:picLocks noChangeAspect="1"/>
+          </p:cNvPicPr>
+          <p:nvPr/>
+        </p:nvPicPr>
+        <p:blipFill rotWithShape="1">
+          <a:blip r:embed="rId7">
+            <a:duotone>
+              <a:schemeClr val="accent2">
+                <a:shade val="45000"/>
+                <a:satMod val="135000"/>
+              </a:schemeClr>
+              <a:prstClr val="white"/>
+            </a:duotone>
+            <a:alphaModFix/>
+          </a:blip>
+          <a:srcRect l="12682" t="3378" r="5989" b="5767"/>
+          <a:stretch/>
+        </p:blipFill>
+        <p:spPr>
+          <a:xfrm>
+            <a:off x="60164" y="7050496"/>
+            <a:ext cx="565083" cy="873628"/>
+          </a:xfrm>
+          <a:prstGeom prst="rect">
+            <a:avLst/>
+          </a:prstGeom>
+        </p:spPr>
+      </p:pic>
+      <p:sp>
+        <p:nvSpPr>
+          <p:cNvPr id="67" name="TextBox 66">
+            <a:extLst>
+              <a:ext uri="{FF2B5EF4-FFF2-40B4-BE49-F238E27FC236}">
+                <a16:creationId xmlns:a16="http://schemas.microsoft.com/office/drawing/2014/main" id="{CAD93BFD-9E37-B942-8602-2D59FA5087DD}"/>
               </a:ext>
             </a:extLst>
           </p:cNvPr>
@@ -5468,48 +5106,145 @@
         </p:nvSpPr>
         <p:spPr>
           <a:xfrm>
-            <a:off x="8935830" y="1112244"/>
-            <a:ext cx="1368240" cy="230832"/>
+            <a:off x="11586667" y="2483667"/>
+            <a:ext cx="1059906" cy="882293"/>
           </a:xfrm>
           <a:prstGeom prst="rect">
             <a:avLst/>
           </a:prstGeom>
-          <a:noFill/>
-        </p:spPr>
-        <p:txBody>
-          <a:bodyPr wrap="square" rtlCol="0">
+          <a:solidFill>
+            <a:schemeClr val="bg1"/>
+          </a:solidFill>
+        </p:spPr>
+        <p:txBody>
+          <a:bodyPr wrap="none" rtlCol="0">
             <a:spAutoFit/>
           </a:bodyPr>
           <a:lstStyle/>
           <a:p>
             <a:pPr algn="ctr"/>
             <a:r>
-              <a:rPr lang="es-ES" sz="900" i="1" dirty="0">
-                <a:latin typeface="Arial" panose="020B0604020202020204" pitchFamily="34" charset="0"/>
-                <a:cs typeface="Arial" panose="020B0604020202020204" pitchFamily="34" charset="0"/>
-              </a:rPr>
-              <a:t>at </a:t>
-            </a:r>
-            <a:r>
-              <a:rPr lang="es-ES" sz="900" i="1" dirty="0" err="1">
-                <a:latin typeface="Arial" panose="020B0604020202020204" pitchFamily="34" charset="0"/>
-                <a:cs typeface="Arial" panose="020B0604020202020204" pitchFamily="34" charset="0"/>
-              </a:rPr>
-              <a:t>rear-edge</a:t>
-            </a:r>
-            <a:endParaRPr lang="es-ES" sz="900" i="1" dirty="0">
+              <a:rPr lang="es-ES" sz="1400" b="1" dirty="0">
+                <a:latin typeface="Arial" panose="020B0604020202020204" pitchFamily="34" charset="0"/>
+                <a:cs typeface="Arial" panose="020B0604020202020204" pitchFamily="34" charset="0"/>
+              </a:rPr>
+              <a:t>EVI </a:t>
+            </a:r>
+          </a:p>
+          <a:p>
+            <a:pPr algn="ctr"/>
+            <a:r>
+              <a:rPr lang="es-ES" sz="1400" b="1" dirty="0" err="1">
+                <a:latin typeface="Arial" panose="020B0604020202020204" pitchFamily="34" charset="0"/>
+                <a:cs typeface="Arial" panose="020B0604020202020204" pitchFamily="34" charset="0"/>
+              </a:rPr>
+              <a:t>resilience</a:t>
+            </a:r>
+            <a:r>
+              <a:rPr lang="es-ES" sz="1400" b="1" dirty="0">
+                <a:latin typeface="Arial" panose="020B0604020202020204" pitchFamily="34" charset="0"/>
+                <a:cs typeface="Arial" panose="020B0604020202020204" pitchFamily="34" charset="0"/>
+              </a:rPr>
+              <a:t> </a:t>
+            </a:r>
+          </a:p>
+          <a:p>
+            <a:pPr algn="ctr"/>
+            <a:r>
+              <a:rPr lang="es-ES" sz="1400" b="1" dirty="0" err="1">
+                <a:latin typeface="Arial" panose="020B0604020202020204" pitchFamily="34" charset="0"/>
+                <a:cs typeface="Arial" panose="020B0604020202020204" pitchFamily="34" charset="0"/>
+              </a:rPr>
+              <a:t>metrics</a:t>
+            </a:r>
+            <a:endParaRPr lang="es-ES" sz="1400" b="1" dirty="0">
               <a:latin typeface="Arial" panose="020B0604020202020204" pitchFamily="34" charset="0"/>
               <a:cs typeface="Arial" panose="020B0604020202020204" pitchFamily="34" charset="0"/>
             </a:endParaRPr>
           </a:p>
-        </p:txBody>
-      </p:sp>
-      <p:sp>
-        <p:nvSpPr>
-          <p:cNvPr id="48" name="Oval 47">
+          <a:p>
+            <a:pPr algn="ctr"/>
+            <a:r>
+              <a:rPr lang="es-ES" sz="1400" b="1" baseline="-25000" dirty="0">
+                <a:latin typeface="Arial" panose="020B0604020202020204" pitchFamily="34" charset="0"/>
+                <a:cs typeface="Arial" panose="020B0604020202020204" pitchFamily="34" charset="0"/>
+              </a:rPr>
+              <a:t>2005, 2012</a:t>
+            </a:r>
+          </a:p>
+        </p:txBody>
+      </p:sp>
+      <p:sp>
+        <p:nvSpPr>
+          <p:cNvPr id="71" name="TextBox 70">
             <a:extLst>
               <a:ext uri="{FF2B5EF4-FFF2-40B4-BE49-F238E27FC236}">
-                <a16:creationId xmlns:a16="http://schemas.microsoft.com/office/drawing/2014/main" id="{6769A7F4-70A4-B248-93C8-C3334D16AFEA}"/>
+                <a16:creationId xmlns:a16="http://schemas.microsoft.com/office/drawing/2014/main" id="{724B4DF6-8817-6746-ABF4-A81E06F1A82E}"/>
+              </a:ext>
+            </a:extLst>
+          </p:cNvPr>
+          <p:cNvSpPr txBox="1"/>
+          <p:nvPr/>
+        </p:nvSpPr>
+        <p:spPr>
+          <a:xfrm>
+            <a:off x="12488961" y="2514710"/>
+            <a:ext cx="1406154" cy="738664"/>
+          </a:xfrm>
+          <a:prstGeom prst="rect">
+            <a:avLst/>
+          </a:prstGeom>
+          <a:solidFill>
+            <a:schemeClr val="bg1"/>
+          </a:solidFill>
+        </p:spPr>
+        <p:txBody>
+          <a:bodyPr wrap="none" rtlCol="0">
+            <a:spAutoFit/>
+          </a:bodyPr>
+          <a:lstStyle/>
+          <a:p>
+            <a:pPr algn="ctr"/>
+            <a:r>
+              <a:rPr lang="es-ES" sz="1400" b="1" dirty="0">
+                <a:latin typeface="Arial" panose="020B0604020202020204" pitchFamily="34" charset="0"/>
+                <a:cs typeface="Arial" panose="020B0604020202020204" pitchFamily="34" charset="0"/>
+              </a:rPr>
+              <a:t>Mann-Kendall </a:t>
+            </a:r>
+          </a:p>
+          <a:p>
+            <a:pPr algn="ctr"/>
+            <a:r>
+              <a:rPr lang="es-ES" sz="1400" b="1" dirty="0">
+                <a:latin typeface="Arial" panose="020B0604020202020204" pitchFamily="34" charset="0"/>
+                <a:cs typeface="Arial" panose="020B0604020202020204" pitchFamily="34" charset="0"/>
+              </a:rPr>
+              <a:t>temporal </a:t>
+            </a:r>
+          </a:p>
+          <a:p>
+            <a:pPr algn="ctr"/>
+            <a:r>
+              <a:rPr lang="es-ES" sz="1400" b="1" dirty="0" err="1">
+                <a:latin typeface="Arial" panose="020B0604020202020204" pitchFamily="34" charset="0"/>
+                <a:cs typeface="Arial" panose="020B0604020202020204" pitchFamily="34" charset="0"/>
+              </a:rPr>
+              <a:t>trend</a:t>
+            </a:r>
+            <a:endParaRPr lang="es-ES" sz="1400" b="1" dirty="0">
+              <a:latin typeface="Arial" panose="020B0604020202020204" pitchFamily="34" charset="0"/>
+              <a:cs typeface="Arial" panose="020B0604020202020204" pitchFamily="34" charset="0"/>
+            </a:endParaRPr>
+          </a:p>
+        </p:txBody>
+      </p:sp>
+      <p:sp>
+        <p:nvSpPr>
+          <p:cNvPr id="97" name="Rounded Rectangle 96">
+            <a:extLst>
+              <a:ext uri="{FF2B5EF4-FFF2-40B4-BE49-F238E27FC236}">
+                <a16:creationId xmlns:a16="http://schemas.microsoft.com/office/drawing/2014/main" id="{50FA2174-EC81-DD48-B62A-0FBB3FA3917F}"/>
               </a:ext>
             </a:extLst>
           </p:cNvPr>
@@ -5518,19 +5253,20 @@
         </p:nvSpPr>
         <p:spPr>
           <a:xfrm>
-            <a:off x="7074690" y="4977516"/>
-            <a:ext cx="217234" cy="217234"/>
-          </a:xfrm>
-          <a:prstGeom prst="ellipse">
-            <a:avLst/>
+            <a:off x="11604987" y="1177470"/>
+            <a:ext cx="2313108" cy="4701253"/>
+          </a:xfrm>
+          <a:prstGeom prst="roundRect">
+            <a:avLst>
+              <a:gd name="adj" fmla="val 1878"/>
+            </a:avLst>
           </a:prstGeom>
-          <a:solidFill>
-            <a:schemeClr val="bg1">
-              <a:lumMod val="75000"/>
-            </a:schemeClr>
-          </a:solidFill>
-          <a:ln>
-            <a:noFill/>
+          <a:noFill/>
+          <a:ln w="19050">
+            <a:solidFill>
+              <a:schemeClr val="tx2"/>
+            </a:solidFill>
+            <a:prstDash val="sysDot"/>
           </a:ln>
         </p:spPr>
         <p:style>
@@ -5554,13 +5290,442 @@
           <a:lstStyle/>
           <a:p>
             <a:pPr algn="ctr"/>
-            <a:r>
-              <a:rPr lang="es-ES" sz="1200" b="1" dirty="0">
-                <a:latin typeface="Arial" panose="020B0604020202020204" pitchFamily="34" charset="0"/>
-                <a:cs typeface="Arial" panose="020B0604020202020204" pitchFamily="34" charset="0"/>
-              </a:rPr>
-              <a:t>2</a:t>
-            </a:r>
+            <a:endParaRPr lang="es-ES"/>
+          </a:p>
+        </p:txBody>
+      </p:sp>
+      <p:sp>
+        <p:nvSpPr>
+          <p:cNvPr id="66" name="TextBox 65">
+            <a:extLst>
+              <a:ext uri="{FF2B5EF4-FFF2-40B4-BE49-F238E27FC236}">
+                <a16:creationId xmlns:a16="http://schemas.microsoft.com/office/drawing/2014/main" id="{2738D0A9-37EB-8948-8D09-CA4D4734ED68}"/>
+              </a:ext>
+            </a:extLst>
+          </p:cNvPr>
+          <p:cNvSpPr txBox="1"/>
+          <p:nvPr/>
+        </p:nvSpPr>
+        <p:spPr>
+          <a:xfrm>
+            <a:off x="12028870" y="5920426"/>
+            <a:ext cx="1368240" cy="276999"/>
+          </a:xfrm>
+          <a:prstGeom prst="rect">
+            <a:avLst/>
+          </a:prstGeom>
+          <a:noFill/>
+        </p:spPr>
+        <p:txBody>
+          <a:bodyPr wrap="square" rtlCol="0">
+            <a:spAutoFit/>
+          </a:bodyPr>
+          <a:lstStyle/>
+          <a:p>
+            <a:pPr algn="ctr"/>
+            <a:r>
+              <a:rPr lang="es-ES" sz="1200" i="1" dirty="0">
+                <a:latin typeface="Arial" panose="020B0604020202020204" pitchFamily="34" charset="0"/>
+                <a:cs typeface="Arial" panose="020B0604020202020204" pitchFamily="34" charset="0"/>
+              </a:rPr>
+              <a:t>at </a:t>
+            </a:r>
+            <a:r>
+              <a:rPr lang="es-ES" sz="1200" i="1" dirty="0" err="1">
+                <a:latin typeface="Arial" panose="020B0604020202020204" pitchFamily="34" charset="0"/>
+                <a:cs typeface="Arial" panose="020B0604020202020204" pitchFamily="34" charset="0"/>
+              </a:rPr>
+              <a:t>rear-edge</a:t>
+            </a:r>
+            <a:endParaRPr lang="es-ES" sz="1200" i="1" dirty="0">
+              <a:latin typeface="Arial" panose="020B0604020202020204" pitchFamily="34" charset="0"/>
+              <a:cs typeface="Arial" panose="020B0604020202020204" pitchFamily="34" charset="0"/>
+            </a:endParaRPr>
+          </a:p>
+        </p:txBody>
+      </p:sp>
+      <p:sp>
+        <p:nvSpPr>
+          <p:cNvPr id="72" name="Oval 71">
+            <a:extLst>
+              <a:ext uri="{FF2B5EF4-FFF2-40B4-BE49-F238E27FC236}">
+                <a16:creationId xmlns:a16="http://schemas.microsoft.com/office/drawing/2014/main" id="{B5E87CA7-6218-154B-9792-59745688FF88}"/>
+              </a:ext>
+            </a:extLst>
+          </p:cNvPr>
+          <p:cNvSpPr/>
+          <p:nvPr/>
+        </p:nvSpPr>
+        <p:spPr>
+          <a:xfrm>
+            <a:off x="7419159" y="1741074"/>
+            <a:ext cx="217234" cy="217234"/>
+          </a:xfrm>
+          <a:prstGeom prst="ellipse">
+            <a:avLst/>
+          </a:prstGeom>
+          <a:noFill/>
+          <a:ln>
+            <a:solidFill>
+              <a:schemeClr val="tx2"/>
+            </a:solidFill>
+          </a:ln>
+        </p:spPr>
+        <p:style>
+          <a:lnRef idx="2">
+            <a:schemeClr val="accent1">
+              <a:shade val="50000"/>
+            </a:schemeClr>
+          </a:lnRef>
+          <a:fillRef idx="1">
+            <a:schemeClr val="accent1"/>
+          </a:fillRef>
+          <a:effectRef idx="0">
+            <a:schemeClr val="accent1"/>
+          </a:effectRef>
+          <a:fontRef idx="minor">
+            <a:schemeClr val="lt1"/>
+          </a:fontRef>
+        </p:style>
+        <p:txBody>
+          <a:bodyPr rtlCol="0" anchor="ctr"/>
+          <a:lstStyle/>
+          <a:p>
+            <a:pPr algn="ctr"/>
+            <a:endParaRPr lang="es-ES" sz="1200" b="1" dirty="0">
+              <a:latin typeface="Arial" panose="020B0604020202020204" pitchFamily="34" charset="0"/>
+              <a:cs typeface="Arial" panose="020B0604020202020204" pitchFamily="34" charset="0"/>
+            </a:endParaRPr>
+          </a:p>
+        </p:txBody>
+      </p:sp>
+      <p:sp>
+        <p:nvSpPr>
+          <p:cNvPr id="73" name="Oval 72">
+            <a:extLst>
+              <a:ext uri="{FF2B5EF4-FFF2-40B4-BE49-F238E27FC236}">
+                <a16:creationId xmlns:a16="http://schemas.microsoft.com/office/drawing/2014/main" id="{AE1D944B-7257-7248-9B89-A27A7AE7A753}"/>
+              </a:ext>
+            </a:extLst>
+          </p:cNvPr>
+          <p:cNvSpPr/>
+          <p:nvPr/>
+        </p:nvSpPr>
+        <p:spPr>
+          <a:xfrm>
+            <a:off x="7848075" y="1741074"/>
+            <a:ext cx="217234" cy="217234"/>
+          </a:xfrm>
+          <a:prstGeom prst="ellipse">
+            <a:avLst/>
+          </a:prstGeom>
+          <a:noFill/>
+          <a:ln>
+            <a:solidFill>
+              <a:schemeClr val="tx2"/>
+            </a:solidFill>
+          </a:ln>
+        </p:spPr>
+        <p:style>
+          <a:lnRef idx="2">
+            <a:schemeClr val="accent1">
+              <a:shade val="50000"/>
+            </a:schemeClr>
+          </a:lnRef>
+          <a:fillRef idx="1">
+            <a:schemeClr val="accent1"/>
+          </a:fillRef>
+          <a:effectRef idx="0">
+            <a:schemeClr val="accent1"/>
+          </a:effectRef>
+          <a:fontRef idx="minor">
+            <a:schemeClr val="lt1"/>
+          </a:fontRef>
+        </p:style>
+        <p:txBody>
+          <a:bodyPr rtlCol="0" anchor="ctr"/>
+          <a:lstStyle/>
+          <a:p>
+            <a:pPr algn="ctr"/>
+            <a:endParaRPr lang="es-ES" sz="1200" b="1" dirty="0">
+              <a:latin typeface="Arial" panose="020B0604020202020204" pitchFamily="34" charset="0"/>
+              <a:cs typeface="Arial" panose="020B0604020202020204" pitchFamily="34" charset="0"/>
+            </a:endParaRPr>
+          </a:p>
+        </p:txBody>
+      </p:sp>
+      <p:sp>
+        <p:nvSpPr>
+          <p:cNvPr id="74" name="Oval 73">
+            <a:extLst>
+              <a:ext uri="{FF2B5EF4-FFF2-40B4-BE49-F238E27FC236}">
+                <a16:creationId xmlns:a16="http://schemas.microsoft.com/office/drawing/2014/main" id="{B7BE14C7-7FEA-B944-A1F7-6D8D32DC1A3D}"/>
+              </a:ext>
+            </a:extLst>
+          </p:cNvPr>
+          <p:cNvSpPr/>
+          <p:nvPr/>
+        </p:nvSpPr>
+        <p:spPr>
+          <a:xfrm>
+            <a:off x="6777984" y="1741074"/>
+            <a:ext cx="217234" cy="217234"/>
+          </a:xfrm>
+          <a:prstGeom prst="ellipse">
+            <a:avLst/>
+          </a:prstGeom>
+          <a:noFill/>
+          <a:ln>
+            <a:solidFill>
+              <a:schemeClr val="tx2"/>
+            </a:solidFill>
+          </a:ln>
+        </p:spPr>
+        <p:style>
+          <a:lnRef idx="2">
+            <a:schemeClr val="accent1">
+              <a:shade val="50000"/>
+            </a:schemeClr>
+          </a:lnRef>
+          <a:fillRef idx="1">
+            <a:schemeClr val="accent1"/>
+          </a:fillRef>
+          <a:effectRef idx="0">
+            <a:schemeClr val="accent1"/>
+          </a:effectRef>
+          <a:fontRef idx="minor">
+            <a:schemeClr val="lt1"/>
+          </a:fontRef>
+        </p:style>
+        <p:txBody>
+          <a:bodyPr rtlCol="0" anchor="ctr"/>
+          <a:lstStyle/>
+          <a:p>
+            <a:pPr algn="ctr"/>
+            <a:endParaRPr lang="es-ES" sz="1200" b="1" dirty="0">
+              <a:latin typeface="Arial" panose="020B0604020202020204" pitchFamily="34" charset="0"/>
+              <a:cs typeface="Arial" panose="020B0604020202020204" pitchFamily="34" charset="0"/>
+            </a:endParaRPr>
+          </a:p>
+        </p:txBody>
+      </p:sp>
+      <p:sp>
+        <p:nvSpPr>
+          <p:cNvPr id="75" name="Oval 74">
+            <a:extLst>
+              <a:ext uri="{FF2B5EF4-FFF2-40B4-BE49-F238E27FC236}">
+                <a16:creationId xmlns:a16="http://schemas.microsoft.com/office/drawing/2014/main" id="{5E6F740D-5295-7B4D-83B5-70DBA9B3A2AB}"/>
+              </a:ext>
+            </a:extLst>
+          </p:cNvPr>
+          <p:cNvSpPr/>
+          <p:nvPr/>
+        </p:nvSpPr>
+        <p:spPr>
+          <a:xfrm>
+            <a:off x="6193378" y="1741074"/>
+            <a:ext cx="217234" cy="217234"/>
+          </a:xfrm>
+          <a:prstGeom prst="ellipse">
+            <a:avLst/>
+          </a:prstGeom>
+          <a:noFill/>
+          <a:ln>
+            <a:solidFill>
+              <a:schemeClr val="tx2"/>
+            </a:solidFill>
+          </a:ln>
+        </p:spPr>
+        <p:style>
+          <a:lnRef idx="2">
+            <a:schemeClr val="accent1">
+              <a:shade val="50000"/>
+            </a:schemeClr>
+          </a:lnRef>
+          <a:fillRef idx="1">
+            <a:schemeClr val="accent1"/>
+          </a:fillRef>
+          <a:effectRef idx="0">
+            <a:schemeClr val="accent1"/>
+          </a:effectRef>
+          <a:fontRef idx="minor">
+            <a:schemeClr val="lt1"/>
+          </a:fontRef>
+        </p:style>
+        <p:txBody>
+          <a:bodyPr rtlCol="0" anchor="ctr"/>
+          <a:lstStyle/>
+          <a:p>
+            <a:pPr algn="ctr"/>
+            <a:endParaRPr lang="es-ES" sz="1200" b="1" dirty="0">
+              <a:latin typeface="Arial" panose="020B0604020202020204" pitchFamily="34" charset="0"/>
+              <a:cs typeface="Arial" panose="020B0604020202020204" pitchFamily="34" charset="0"/>
+            </a:endParaRPr>
+          </a:p>
+        </p:txBody>
+      </p:sp>
+      <p:sp>
+        <p:nvSpPr>
+          <p:cNvPr id="76" name="Oval 75">
+            <a:extLst>
+              <a:ext uri="{FF2B5EF4-FFF2-40B4-BE49-F238E27FC236}">
+                <a16:creationId xmlns:a16="http://schemas.microsoft.com/office/drawing/2014/main" id="{80692670-016B-A844-863C-358CFA1C61AB}"/>
+              </a:ext>
+            </a:extLst>
+          </p:cNvPr>
+          <p:cNvSpPr/>
+          <p:nvPr/>
+        </p:nvSpPr>
+        <p:spPr>
+          <a:xfrm>
+            <a:off x="3671615" y="1749699"/>
+            <a:ext cx="217234" cy="217234"/>
+          </a:xfrm>
+          <a:prstGeom prst="ellipse">
+            <a:avLst/>
+          </a:prstGeom>
+          <a:noFill/>
+          <a:ln>
+            <a:solidFill>
+              <a:schemeClr val="tx2"/>
+            </a:solidFill>
+          </a:ln>
+        </p:spPr>
+        <p:style>
+          <a:lnRef idx="2">
+            <a:schemeClr val="accent1">
+              <a:shade val="50000"/>
+            </a:schemeClr>
+          </a:lnRef>
+          <a:fillRef idx="1">
+            <a:schemeClr val="accent1"/>
+          </a:fillRef>
+          <a:effectRef idx="0">
+            <a:schemeClr val="accent1"/>
+          </a:effectRef>
+          <a:fontRef idx="minor">
+            <a:schemeClr val="lt1"/>
+          </a:fontRef>
+        </p:style>
+        <p:txBody>
+          <a:bodyPr rtlCol="0" anchor="ctr"/>
+          <a:lstStyle/>
+          <a:p>
+            <a:pPr algn="ctr"/>
+            <a:endParaRPr lang="es-ES" sz="1200" b="1" dirty="0">
+              <a:latin typeface="Arial" panose="020B0604020202020204" pitchFamily="34" charset="0"/>
+              <a:cs typeface="Arial" panose="020B0604020202020204" pitchFamily="34" charset="0"/>
+            </a:endParaRPr>
+          </a:p>
+        </p:txBody>
+      </p:sp>
+      <p:sp>
+        <p:nvSpPr>
+          <p:cNvPr id="78" name="Oval 77">
+            <a:extLst>
+              <a:ext uri="{FF2B5EF4-FFF2-40B4-BE49-F238E27FC236}">
+                <a16:creationId xmlns:a16="http://schemas.microsoft.com/office/drawing/2014/main" id="{3712D66B-E74A-CA47-9050-4BB6AA596934}"/>
+              </a:ext>
+            </a:extLst>
+          </p:cNvPr>
+          <p:cNvSpPr/>
+          <p:nvPr/>
+        </p:nvSpPr>
+        <p:spPr>
+          <a:xfrm>
+            <a:off x="2365163" y="1749699"/>
+            <a:ext cx="217234" cy="217234"/>
+          </a:xfrm>
+          <a:prstGeom prst="ellipse">
+            <a:avLst/>
+          </a:prstGeom>
+          <a:noFill/>
+          <a:ln>
+            <a:solidFill>
+              <a:schemeClr val="tx2"/>
+            </a:solidFill>
+          </a:ln>
+        </p:spPr>
+        <p:style>
+          <a:lnRef idx="2">
+            <a:schemeClr val="accent1">
+              <a:shade val="50000"/>
+            </a:schemeClr>
+          </a:lnRef>
+          <a:fillRef idx="1">
+            <a:schemeClr val="accent1"/>
+          </a:fillRef>
+          <a:effectRef idx="0">
+            <a:schemeClr val="accent1"/>
+          </a:effectRef>
+          <a:fontRef idx="minor">
+            <a:schemeClr val="lt1"/>
+          </a:fontRef>
+        </p:style>
+        <p:txBody>
+          <a:bodyPr rtlCol="0" anchor="ctr"/>
+          <a:lstStyle/>
+          <a:p>
+            <a:pPr algn="ctr"/>
+            <a:endParaRPr lang="es-ES" sz="1200" b="1" dirty="0">
+              <a:latin typeface="Arial" panose="020B0604020202020204" pitchFamily="34" charset="0"/>
+              <a:cs typeface="Arial" panose="020B0604020202020204" pitchFamily="34" charset="0"/>
+            </a:endParaRPr>
+          </a:p>
+        </p:txBody>
+      </p:sp>
+      <p:sp>
+        <p:nvSpPr>
+          <p:cNvPr id="79" name="Oval 78">
+            <a:extLst>
+              <a:ext uri="{FF2B5EF4-FFF2-40B4-BE49-F238E27FC236}">
+                <a16:creationId xmlns:a16="http://schemas.microsoft.com/office/drawing/2014/main" id="{9B987929-C6F1-B14E-BDD3-3BD278540995}"/>
+              </a:ext>
+            </a:extLst>
+          </p:cNvPr>
+          <p:cNvSpPr/>
+          <p:nvPr/>
+        </p:nvSpPr>
+        <p:spPr>
+          <a:xfrm>
+            <a:off x="5944754" y="1730441"/>
+            <a:ext cx="217234" cy="217234"/>
+          </a:xfrm>
+          <a:prstGeom prst="ellipse">
+            <a:avLst/>
+          </a:prstGeom>
+          <a:noFill/>
+          <a:ln>
+            <a:solidFill>
+              <a:schemeClr val="tx2"/>
+            </a:solidFill>
+          </a:ln>
+        </p:spPr>
+        <p:style>
+          <a:lnRef idx="2">
+            <a:schemeClr val="accent1">
+              <a:shade val="50000"/>
+            </a:schemeClr>
+          </a:lnRef>
+          <a:fillRef idx="1">
+            <a:schemeClr val="accent1"/>
+          </a:fillRef>
+          <a:effectRef idx="0">
+            <a:schemeClr val="accent1"/>
+          </a:effectRef>
+          <a:fontRef idx="minor">
+            <a:schemeClr val="lt1"/>
+          </a:fontRef>
+        </p:style>
+        <p:txBody>
+          <a:bodyPr rtlCol="0" anchor="ctr"/>
+          <a:lstStyle/>
+          <a:p>
+            <a:pPr algn="ctr"/>
+            <a:endParaRPr lang="es-ES" sz="1200" b="1" dirty="0">
+              <a:latin typeface="Arial" panose="020B0604020202020204" pitchFamily="34" charset="0"/>
+              <a:cs typeface="Arial" panose="020B0604020202020204" pitchFamily="34" charset="0"/>
+            </a:endParaRPr>
           </a:p>
         </p:txBody>
       </p:sp>
@@ -5580,7 +5745,7 @@
 <file path=ppt/theme/theme1.xml><?xml version="1.0" encoding="utf-8"?>
 <a:theme xmlns:a="http://schemas.openxmlformats.org/drawingml/2006/main" name="Office Theme">
   <a:themeElements>
-    <a:clrScheme name="Office">
+    <a:clrScheme name="Office Theme">
       <a:dk1>
         <a:sysClr val="windowText" lastClr="000000"/>
       </a:dk1>
@@ -5618,7 +5783,7 @@
         <a:srgbClr val="954F72"/>
       </a:folHlink>
     </a:clrScheme>
-    <a:fontScheme name="Office">
+    <a:fontScheme name="Office Theme">
       <a:majorFont>
         <a:latin typeface="Calibri Light" panose="020F0302020204030204"/>
         <a:ea typeface=""/>
@@ -5653,23 +5818,6 @@
         <a:font script="Viet" typeface="Times New Roman"/>
         <a:font script="Uigh" typeface="Microsoft Uighur"/>
         <a:font script="Geor" typeface="Sylfaen"/>
-        <a:font script="Armn" typeface="Arial"/>
-        <a:font script="Bugi" typeface="Leelawadee UI"/>
-        <a:font script="Bopo" typeface="Microsoft JhengHei"/>
-        <a:font script="Java" typeface="Javanese Text"/>
-        <a:font script="Lisu" typeface="Segoe UI"/>
-        <a:font script="Mymr" typeface="Myanmar Text"/>
-        <a:font script="Nkoo" typeface="Ebrima"/>
-        <a:font script="Olck" typeface="Nirmala UI"/>
-        <a:font script="Osma" typeface="Ebrima"/>
-        <a:font script="Phag" typeface="Phagspa"/>
-        <a:font script="Syrn" typeface="Estrangelo Edessa"/>
-        <a:font script="Syrj" typeface="Estrangelo Edessa"/>
-        <a:font script="Syre" typeface="Estrangelo Edessa"/>
-        <a:font script="Sora" typeface="Nirmala UI"/>
-        <a:font script="Tale" typeface="Microsoft Tai Le"/>
-        <a:font script="Talu" typeface="Microsoft New Tai Lue"/>
-        <a:font script="Tfng" typeface="Ebrima"/>
       </a:majorFont>
       <a:minorFont>
         <a:latin typeface="Calibri" panose="020F0502020204030204"/>
@@ -5705,26 +5853,9 @@
         <a:font script="Viet" typeface="Arial"/>
         <a:font script="Uigh" typeface="Microsoft Uighur"/>
         <a:font script="Geor" typeface="Sylfaen"/>
-        <a:font script="Armn" typeface="Arial"/>
-        <a:font script="Bugi" typeface="Leelawadee UI"/>
-        <a:font script="Bopo" typeface="Microsoft JhengHei"/>
-        <a:font script="Java" typeface="Javanese Text"/>
-        <a:font script="Lisu" typeface="Segoe UI"/>
-        <a:font script="Mymr" typeface="Myanmar Text"/>
-        <a:font script="Nkoo" typeface="Ebrima"/>
-        <a:font script="Olck" typeface="Nirmala UI"/>
-        <a:font script="Osma" typeface="Ebrima"/>
-        <a:font script="Phag" typeface="Phagspa"/>
-        <a:font script="Syrn" typeface="Estrangelo Edessa"/>
-        <a:font script="Syrj" typeface="Estrangelo Edessa"/>
-        <a:font script="Syre" typeface="Estrangelo Edessa"/>
-        <a:font script="Sora" typeface="Nirmala UI"/>
-        <a:font script="Tale" typeface="Microsoft Tai Le"/>
-        <a:font script="Talu" typeface="Microsoft New Tai Lue"/>
-        <a:font script="Tfng" typeface="Ebrima"/>
       </a:minorFont>
     </a:fontScheme>
-    <a:fmtScheme name="Office">
+    <a:fmtScheme name="Office Theme">
       <a:fillStyleLst>
         <a:solidFill>
           <a:schemeClr val="phClr"/>

</xml_diff>